<commit_message>
Some updates following feedback
</commit_message>
<xml_diff>
--- a/program/Project Descriptions and Plans/CV32E40Pv2/CV32E40P v2 Project Concept June 28 2021.pptx
+++ b/program/Project Descriptions and Plans/CV32E40Pv2/CV32E40P v2 Project Concept June 28 2021.pptx
@@ -845,8 +845,8 @@
   </pc:docChgLst>
   <pc:docChgLst>
     <pc:chgData name="Pascal Gouedo" userId="c3fafed6-2a32-40a5-b2ae-6f0e8f66f71f" providerId="ADAL" clId="{C8C5D83B-22CD-4B58-82EE-82E592045465}"/>
-    <pc:docChg chg="modSld">
-      <pc:chgData name="Pascal Gouedo" userId="c3fafed6-2a32-40a5-b2ae-6f0e8f66f71f" providerId="ADAL" clId="{C8C5D83B-22CD-4B58-82EE-82E592045465}" dt="2021-06-28T11:47:33.643" v="3" actId="1076"/>
+    <pc:docChg chg="undo custSel modSld">
+      <pc:chgData name="Pascal Gouedo" userId="c3fafed6-2a32-40a5-b2ae-6f0e8f66f71f" providerId="ADAL" clId="{C8C5D83B-22CD-4B58-82EE-82E592045465}" dt="2021-06-28T13:48:15.520" v="23" actId="20577"/>
       <pc:docMkLst>
         <pc:docMk/>
       </pc:docMkLst>
@@ -862,6 +862,21 @@
             <pc:docMk/>
             <pc:sldMk cId="1617653679" sldId="258"/>
             <ac:spMk id="5" creationId="{00000000-0000-0000-0000-000000000000}"/>
+          </ac:spMkLst>
+        </pc:spChg>
+      </pc:sldChg>
+      <pc:sldChg chg="modSp mod">
+        <pc:chgData name="Pascal Gouedo" userId="c3fafed6-2a32-40a5-b2ae-6f0e8f66f71f" providerId="ADAL" clId="{C8C5D83B-22CD-4B58-82EE-82E592045465}" dt="2021-06-28T13:48:15.520" v="23" actId="20577"/>
+        <pc:sldMkLst>
+          <pc:docMk/>
+          <pc:sldMk cId="443237431" sldId="341"/>
+        </pc:sldMkLst>
+        <pc:spChg chg="mod">
+          <ac:chgData name="Pascal Gouedo" userId="c3fafed6-2a32-40a5-b2ae-6f0e8f66f71f" providerId="ADAL" clId="{C8C5D83B-22CD-4B58-82EE-82E592045465}" dt="2021-06-28T13:48:15.520" v="23" actId="20577"/>
+          <ac:spMkLst>
+            <pc:docMk/>
+            <pc:sldMk cId="443237431" sldId="341"/>
+            <ac:spMk id="5" creationId="{E833259D-8347-41B9-B62A-A29C8EFBC877}"/>
           </ac:spMkLst>
         </pc:spChg>
       </pc:sldChg>
@@ -12749,7 +12764,15 @@
             </a:pPr>
             <a:r>
               <a:rPr lang="en-US" sz="1400" dirty="0"/>
-              <a:t>Verifying PULP instructions disabled during CV32E40P v1 phase improving performances, power consumption and code size depending of application programs</a:t>
+              <a:t>Verifying XPULP, RVF, and </a:t>
+            </a:r>
+            <a:r>
+              <a:rPr lang="en-US" sz="1400" dirty="0" err="1"/>
+              <a:t>Zfinx</a:t>
+            </a:r>
+            <a:r>
+              <a:rPr lang="en-US" sz="1400" dirty="0"/>
+              <a:t> ISA extensions that were disabled during CV32E40P v1 phase improving performances, power consumption and code size depending of application programs</a:t>
             </a:r>
           </a:p>
           <a:p>
@@ -12776,7 +12799,15 @@
             </a:pPr>
             <a:r>
               <a:rPr lang="en-US" sz="1400" dirty="0"/>
-              <a:t>Companies needing more performances, less power consumption or smaller code size for</a:t>
+              <a:t>Companies needing more performances, </a:t>
+            </a:r>
+            <a:r>
+              <a:rPr lang="en-US" sz="1400"/>
+              <a:t>less energy </a:t>
+            </a:r>
+            <a:r>
+              <a:rPr lang="en-US" sz="1400" dirty="0"/>
+              <a:t>consumption or smaller code size for</a:t>
             </a:r>
           </a:p>
           <a:p>
@@ -16869,6 +16900,21 @@
 </file>
 
 <file path=customXml/item1.xml><?xml version="1.0" encoding="utf-8"?>
+<?mso-contentType ?>
+<FormTemplates xmlns="http://schemas.microsoft.com/sharepoint/v3/contenttype/forms">
+  <Display>DocumentLibraryForm</Display>
+  <Edit>DocumentLibraryForm</Edit>
+  <New>DocumentLibraryForm</New>
+</FormTemplates>
+</file>
+
+<file path=customXml/item2.xml><?xml version="1.0" encoding="utf-8"?>
+<p:properties xmlns:p="http://schemas.microsoft.com/office/2006/metadata/properties" xmlns:xsi="http://www.w3.org/2001/XMLSchema-instance" xmlns:pc="http://schemas.microsoft.com/office/infopath/2007/PartnerControls">
+  <documentManagement/>
+</p:properties>
+</file>
+
+<file path=customXml/item3.xml><?xml version="1.0" encoding="utf-8"?>
 <ct:contentTypeSchema xmlns:ct="http://schemas.microsoft.com/office/2006/metadata/contentType" xmlns:ma="http://schemas.microsoft.com/office/2006/metadata/properties/metaAttributes" ct:_="" ma:_="" ma:contentTypeName="Document" ma:contentTypeID="0x010100EFCF9BE3DDC69D46817A851BEC5550B1" ma:contentTypeVersion="4" ma:contentTypeDescription="Crée un document." ma:contentTypeScope="" ma:versionID="881c34f7cd5cf8fbf683d402ca8875d2">
   <xsd:schema xmlns:xsd="http://www.w3.org/2001/XMLSchema" xmlns:xs="http://www.w3.org/2001/XMLSchema" xmlns:p="http://schemas.microsoft.com/office/2006/metadata/properties" xmlns:ns2="cbd820e2-9c8a-4c01-9a9c-6b4c26777899" targetNamespace="http://schemas.microsoft.com/office/2006/metadata/properties" ma:root="true" ma:fieldsID="379e6705f51ca8044999aec7fce4d4f1" ns2:_="">
     <xsd:import namespace="cbd820e2-9c8a-4c01-9a9c-6b4c26777899"/>
@@ -17014,35 +17060,10 @@
 </ct:contentTypeSchema>
 </file>
 
-<file path=customXml/item2.xml><?xml version="1.0" encoding="utf-8"?>
-<p:properties xmlns:p="http://schemas.microsoft.com/office/2006/metadata/properties" xmlns:xsi="http://www.w3.org/2001/XMLSchema-instance" xmlns:pc="http://schemas.microsoft.com/office/infopath/2007/PartnerControls">
-  <documentManagement/>
-</p:properties>
-</file>
-
-<file path=customXml/item3.xml><?xml version="1.0" encoding="utf-8"?>
-<?mso-contentType ?>
-<FormTemplates xmlns="http://schemas.microsoft.com/sharepoint/v3/contenttype/forms">
-  <Display>DocumentLibraryForm</Display>
-  <Edit>DocumentLibraryForm</Edit>
-  <New>DocumentLibraryForm</New>
-</FormTemplates>
-</file>
-
 <file path=customXml/itemProps1.xml><?xml version="1.0" encoding="utf-8"?>
-<ds:datastoreItem xmlns:ds="http://schemas.openxmlformats.org/officeDocument/2006/customXml" ds:itemID="{C00FD520-DD61-4DE7-AD64-0906EDEE6446}">
+<ds:datastoreItem xmlns:ds="http://schemas.openxmlformats.org/officeDocument/2006/customXml" ds:itemID="{DEAE14D7-05E3-479B-BCD1-AF329D982B93}">
   <ds:schemaRefs>
-    <ds:schemaRef ds:uri="http://schemas.microsoft.com/office/2006/metadata/contentType"/>
-    <ds:schemaRef ds:uri="http://schemas.microsoft.com/office/2006/metadata/properties/metaAttributes"/>
-    <ds:schemaRef ds:uri="http://www.w3.org/2001/XMLSchema"/>
-    <ds:schemaRef ds:uri="http://schemas.microsoft.com/office/2006/metadata/properties"/>
-    <ds:schemaRef ds:uri="cbd820e2-9c8a-4c01-9a9c-6b4c26777899"/>
-    <ds:schemaRef ds:uri="http://schemas.microsoft.com/office/2006/documentManagement/types"/>
-    <ds:schemaRef ds:uri="http://schemas.microsoft.com/office/infopath/2007/PartnerControls"/>
-    <ds:schemaRef ds:uri="http://schemas.openxmlformats.org/package/2006/metadata/core-properties"/>
-    <ds:schemaRef ds:uri="http://purl.org/dc/elements/1.1/"/>
-    <ds:schemaRef ds:uri="http://purl.org/dc/terms/"/>
-    <ds:schemaRef ds:uri="http://schemas.microsoft.com/internal/obd"/>
+    <ds:schemaRef ds:uri="http://schemas.microsoft.com/sharepoint/v3/contenttype/forms"/>
   </ds:schemaRefs>
 </ds:datastoreItem>
 </file>
@@ -17065,9 +17086,19 @@
 </file>
 
 <file path=customXml/itemProps3.xml><?xml version="1.0" encoding="utf-8"?>
-<ds:datastoreItem xmlns:ds="http://schemas.openxmlformats.org/officeDocument/2006/customXml" ds:itemID="{DEAE14D7-05E3-479B-BCD1-AF329D982B93}">
+<ds:datastoreItem xmlns:ds="http://schemas.openxmlformats.org/officeDocument/2006/customXml" ds:itemID="{C00FD520-DD61-4DE7-AD64-0906EDEE6446}">
   <ds:schemaRefs>
-    <ds:schemaRef ds:uri="http://schemas.microsoft.com/sharepoint/v3/contenttype/forms"/>
+    <ds:schemaRef ds:uri="http://schemas.microsoft.com/office/2006/metadata/contentType"/>
+    <ds:schemaRef ds:uri="http://schemas.microsoft.com/office/2006/metadata/properties/metaAttributes"/>
+    <ds:schemaRef ds:uri="http://www.w3.org/2001/XMLSchema"/>
+    <ds:schemaRef ds:uri="http://schemas.microsoft.com/office/2006/metadata/properties"/>
+    <ds:schemaRef ds:uri="cbd820e2-9c8a-4c01-9a9c-6b4c26777899"/>
+    <ds:schemaRef ds:uri="http://schemas.microsoft.com/office/2006/documentManagement/types"/>
+    <ds:schemaRef ds:uri="http://schemas.microsoft.com/office/infopath/2007/PartnerControls"/>
+    <ds:schemaRef ds:uri="http://schemas.openxmlformats.org/package/2006/metadata/core-properties"/>
+    <ds:schemaRef ds:uri="http://purl.org/dc/elements/1.1/"/>
+    <ds:schemaRef ds:uri="http://purl.org/dc/terms/"/>
+    <ds:schemaRef ds:uri="http://schemas.microsoft.com/internal/obd"/>
   </ds:schemaRefs>
 </ds:datastoreItem>
 </file>
</xml_diff>

<commit_message>
Added some slides about final project requirements following technical meeting with Davide
</commit_message>
<xml_diff>
--- a/program/Project Descriptions and Plans/CV32E40Pv2/CV32E40P v2 Project Concept June 28 2021.pptx
+++ b/program/Project Descriptions and Plans/CV32E40Pv2/CV32E40P v2 Project Concept June 28 2021.pptx
@@ -8,10 +8,10 @@
     <p:sldMasterId id="2147483663" r:id="rId7"/>
   </p:sldMasterIdLst>
   <p:notesMasterIdLst>
-    <p:notesMasterId r:id="rId19"/>
+    <p:notesMasterId r:id="rId23"/>
   </p:notesMasterIdLst>
   <p:handoutMasterIdLst>
-    <p:handoutMasterId r:id="rId20"/>
+    <p:handoutMasterId r:id="rId24"/>
   </p:handoutMasterIdLst>
   <p:sldIdLst>
     <p:sldId id="258" r:id="rId8"/>
@@ -24,7 +24,11 @@
     <p:sldId id="345" r:id="rId15"/>
     <p:sldId id="349" r:id="rId16"/>
     <p:sldId id="351" r:id="rId17"/>
-    <p:sldId id="270" r:id="rId18"/>
+    <p:sldId id="356" r:id="rId18"/>
+    <p:sldId id="353" r:id="rId19"/>
+    <p:sldId id="355" r:id="rId20"/>
+    <p:sldId id="357" r:id="rId21"/>
+    <p:sldId id="270" r:id="rId22"/>
   </p:sldIdLst>
   <p:sldSz cx="9144000" cy="5143500" type="screen16x9"/>
   <p:notesSz cx="6858000" cy="9144000"/>
@@ -140,14 +144,6 @@
     </p:ext>
   </p:extLst>
 </p:presentation>
-</file>
-
-<file path=ppt/revisionInfo.xml><?xml version="1.0" encoding="utf-8"?>
-<p1510:revInfo xmlns:a="http://schemas.openxmlformats.org/drawingml/2006/main" xmlns:r="http://schemas.openxmlformats.org/officeDocument/2006/relationships" xmlns:p1510="http://schemas.microsoft.com/office/powerpoint/2015/10/main">
-  <p1510:revLst>
-    <p1510:client id="{8F43EECE-9F71-402E-AD9F-E69CC9039939}" v="73" dt="2021-06-28T10:46:29.020"/>
-  </p1510:revLst>
-</p1510:revInfo>
 </file>
 
 <file path=ppt/changesInfos/changesInfo1.xml><?xml version="1.0" encoding="utf-8"?>
@@ -844,9 +840,83 @@
     </pc:docChg>
   </pc:docChgLst>
   <pc:docChgLst>
+    <pc:chgData name="Pascal Gouedo" userId="c3fafed6-2a32-40a5-b2ae-6f0e8f66f71f" providerId="ADAL" clId="{A6EC41DF-BF40-40D2-B49A-20B4EBB10F36}"/>
+    <pc:docChg chg="modSld">
+      <pc:chgData name="Pascal Gouedo" userId="c3fafed6-2a32-40a5-b2ae-6f0e8f66f71f" providerId="ADAL" clId="{A6EC41DF-BF40-40D2-B49A-20B4EBB10F36}" dt="2021-09-01T12:45:30.106" v="74" actId="20577"/>
+      <pc:docMkLst>
+        <pc:docMk/>
+      </pc:docMkLst>
+      <pc:sldChg chg="mod modShow">
+        <pc:chgData name="Pascal Gouedo" userId="c3fafed6-2a32-40a5-b2ae-6f0e8f66f71f" providerId="ADAL" clId="{A6EC41DF-BF40-40D2-B49A-20B4EBB10F36}" dt="2021-07-12T06:17:23.519" v="2" actId="729"/>
+        <pc:sldMkLst>
+          <pc:docMk/>
+          <pc:sldMk cId="3670263909" sldId="337"/>
+        </pc:sldMkLst>
+      </pc:sldChg>
+      <pc:sldChg chg="mod modShow">
+        <pc:chgData name="Pascal Gouedo" userId="c3fafed6-2a32-40a5-b2ae-6f0e8f66f71f" providerId="ADAL" clId="{A6EC41DF-BF40-40D2-B49A-20B4EBB10F36}" dt="2021-07-12T06:17:17.798" v="1" actId="729"/>
+        <pc:sldMkLst>
+          <pc:docMk/>
+          <pc:sldMk cId="390669710" sldId="343"/>
+        </pc:sldMkLst>
+      </pc:sldChg>
+      <pc:sldChg chg="mod modShow">
+        <pc:chgData name="Pascal Gouedo" userId="c3fafed6-2a32-40a5-b2ae-6f0e8f66f71f" providerId="ADAL" clId="{A6EC41DF-BF40-40D2-B49A-20B4EBB10F36}" dt="2021-07-12T06:17:23.519" v="2" actId="729"/>
+        <pc:sldMkLst>
+          <pc:docMk/>
+          <pc:sldMk cId="1590387133" sldId="344"/>
+        </pc:sldMkLst>
+      </pc:sldChg>
+      <pc:sldChg chg="mod modShow">
+        <pc:chgData name="Pascal Gouedo" userId="c3fafed6-2a32-40a5-b2ae-6f0e8f66f71f" providerId="ADAL" clId="{A6EC41DF-BF40-40D2-B49A-20B4EBB10F36}" dt="2021-07-12T06:17:23.519" v="2" actId="729"/>
+        <pc:sldMkLst>
+          <pc:docMk/>
+          <pc:sldMk cId="3307728316" sldId="345"/>
+        </pc:sldMkLst>
+      </pc:sldChg>
+      <pc:sldChg chg="mod modShow">
+        <pc:chgData name="Pascal Gouedo" userId="c3fafed6-2a32-40a5-b2ae-6f0e8f66f71f" providerId="ADAL" clId="{A6EC41DF-BF40-40D2-B49A-20B4EBB10F36}" dt="2021-07-12T06:17:23.519" v="2" actId="729"/>
+        <pc:sldMkLst>
+          <pc:docMk/>
+          <pc:sldMk cId="795410478" sldId="349"/>
+        </pc:sldMkLst>
+      </pc:sldChg>
+      <pc:sldChg chg="mod modShow">
+        <pc:chgData name="Pascal Gouedo" userId="c3fafed6-2a32-40a5-b2ae-6f0e8f66f71f" providerId="ADAL" clId="{A6EC41DF-BF40-40D2-B49A-20B4EBB10F36}" dt="2021-07-12T06:17:23.519" v="2" actId="729"/>
+        <pc:sldMkLst>
+          <pc:docMk/>
+          <pc:sldMk cId="2072814" sldId="351"/>
+        </pc:sldMkLst>
+      </pc:sldChg>
+      <pc:sldChg chg="modSp mod modShow">
+        <pc:chgData name="Pascal Gouedo" userId="c3fafed6-2a32-40a5-b2ae-6f0e8f66f71f" providerId="ADAL" clId="{A6EC41DF-BF40-40D2-B49A-20B4EBB10F36}" dt="2021-09-01T12:45:30.106" v="74" actId="20577"/>
+        <pc:sldMkLst>
+          <pc:docMk/>
+          <pc:sldMk cId="781425361" sldId="356"/>
+        </pc:sldMkLst>
+        <pc:spChg chg="mod">
+          <ac:chgData name="Pascal Gouedo" userId="c3fafed6-2a32-40a5-b2ae-6f0e8f66f71f" providerId="ADAL" clId="{A6EC41DF-BF40-40D2-B49A-20B4EBB10F36}" dt="2021-09-01T12:45:30.106" v="74" actId="20577"/>
+          <ac:spMkLst>
+            <pc:docMk/>
+            <pc:sldMk cId="781425361" sldId="356"/>
+            <ac:spMk id="4" creationId="{00000000-0000-0000-0000-000000000000}"/>
+          </ac:spMkLst>
+        </pc:spChg>
+        <pc:spChg chg="mod">
+          <ac:chgData name="Pascal Gouedo" userId="c3fafed6-2a32-40a5-b2ae-6f0e8f66f71f" providerId="ADAL" clId="{A6EC41DF-BF40-40D2-B49A-20B4EBB10F36}" dt="2021-08-24T09:39:33.138" v="47" actId="20577"/>
+          <ac:spMkLst>
+            <pc:docMk/>
+            <pc:sldMk cId="781425361" sldId="356"/>
+            <ac:spMk id="5" creationId="{00000000-0000-0000-0000-000000000000}"/>
+          </ac:spMkLst>
+        </pc:spChg>
+      </pc:sldChg>
+    </pc:docChg>
+  </pc:docChgLst>
+  <pc:docChgLst>
     <pc:chgData name="Pascal Gouedo" userId="c3fafed6-2a32-40a5-b2ae-6f0e8f66f71f" providerId="ADAL" clId="{C8C5D83B-22CD-4B58-82EE-82E592045465}"/>
-    <pc:docChg chg="undo custSel modSld">
-      <pc:chgData name="Pascal Gouedo" userId="c3fafed6-2a32-40a5-b2ae-6f0e8f66f71f" providerId="ADAL" clId="{C8C5D83B-22CD-4B58-82EE-82E592045465}" dt="2021-06-28T13:48:15.520" v="23" actId="20577"/>
+    <pc:docChg chg="undo redo custSel addSld delSld modSld sldOrd">
+      <pc:chgData name="Pascal Gouedo" userId="c3fafed6-2a32-40a5-b2ae-6f0e8f66f71f" providerId="ADAL" clId="{C8C5D83B-22CD-4B58-82EE-82E592045465}" dt="2021-07-05T14:24:08.468" v="712" actId="47"/>
       <pc:docMkLst>
         <pc:docMk/>
       </pc:docMkLst>
@@ -866,6 +936,21 @@
         </pc:spChg>
       </pc:sldChg>
       <pc:sldChg chg="modSp mod">
+        <pc:chgData name="Pascal Gouedo" userId="c3fafed6-2a32-40a5-b2ae-6f0e8f66f71f" providerId="ADAL" clId="{C8C5D83B-22CD-4B58-82EE-82E592045465}" dt="2021-07-01T14:53:53.615" v="232" actId="20577"/>
+        <pc:sldMkLst>
+          <pc:docMk/>
+          <pc:sldMk cId="3670263909" sldId="337"/>
+        </pc:sldMkLst>
+        <pc:spChg chg="mod">
+          <ac:chgData name="Pascal Gouedo" userId="c3fafed6-2a32-40a5-b2ae-6f0e8f66f71f" providerId="ADAL" clId="{C8C5D83B-22CD-4B58-82EE-82E592045465}" dt="2021-07-01T14:53:53.615" v="232" actId="20577"/>
+          <ac:spMkLst>
+            <pc:docMk/>
+            <pc:sldMk cId="3670263909" sldId="337"/>
+            <ac:spMk id="5" creationId="{E833259D-8347-41B9-B62A-A29C8EFBC877}"/>
+          </ac:spMkLst>
+        </pc:spChg>
+      </pc:sldChg>
+      <pc:sldChg chg="modSp mod">
         <pc:chgData name="Pascal Gouedo" userId="c3fafed6-2a32-40a5-b2ae-6f0e8f66f71f" providerId="ADAL" clId="{C8C5D83B-22CD-4B58-82EE-82E592045465}" dt="2021-06-28T13:48:15.520" v="23" actId="20577"/>
         <pc:sldMkLst>
           <pc:docMk/>
@@ -879,6 +964,215 @@
             <ac:spMk id="5" creationId="{E833259D-8347-41B9-B62A-A29C8EFBC877}"/>
           </ac:spMkLst>
         </pc:spChg>
+      </pc:sldChg>
+      <pc:sldChg chg="modSp mod">
+        <pc:chgData name="Pascal Gouedo" userId="c3fafed6-2a32-40a5-b2ae-6f0e8f66f71f" providerId="ADAL" clId="{C8C5D83B-22CD-4B58-82EE-82E592045465}" dt="2021-06-28T16:00:52.684" v="57" actId="20577"/>
+        <pc:sldMkLst>
+          <pc:docMk/>
+          <pc:sldMk cId="2072814" sldId="351"/>
+        </pc:sldMkLst>
+        <pc:spChg chg="mod">
+          <ac:chgData name="Pascal Gouedo" userId="c3fafed6-2a32-40a5-b2ae-6f0e8f66f71f" providerId="ADAL" clId="{C8C5D83B-22CD-4B58-82EE-82E592045465}" dt="2021-06-28T16:00:52.684" v="57" actId="20577"/>
+          <ac:spMkLst>
+            <pc:docMk/>
+            <pc:sldMk cId="2072814" sldId="351"/>
+            <ac:spMk id="5" creationId="{E833259D-8347-41B9-B62A-A29C8EFBC877}"/>
+          </ac:spMkLst>
+        </pc:spChg>
+      </pc:sldChg>
+      <pc:sldChg chg="addSp delSp modSp new del mod ord modClrScheme chgLayout">
+        <pc:chgData name="Pascal Gouedo" userId="c3fafed6-2a32-40a5-b2ae-6f0e8f66f71f" providerId="ADAL" clId="{C8C5D83B-22CD-4B58-82EE-82E592045465}" dt="2021-07-01T14:56:39.066" v="262" actId="47"/>
+        <pc:sldMkLst>
+          <pc:docMk/>
+          <pc:sldMk cId="2264016538" sldId="352"/>
+        </pc:sldMkLst>
+        <pc:spChg chg="mod ord">
+          <ac:chgData name="Pascal Gouedo" userId="c3fafed6-2a32-40a5-b2ae-6f0e8f66f71f" providerId="ADAL" clId="{C8C5D83B-22CD-4B58-82EE-82E592045465}" dt="2021-07-01T14:47:29.253" v="62" actId="700"/>
+          <ac:spMkLst>
+            <pc:docMk/>
+            <pc:sldMk cId="2264016538" sldId="352"/>
+            <ac:spMk id="2" creationId="{D79C642C-783B-4B16-8060-3F0A25421BB2}"/>
+          </ac:spMkLst>
+        </pc:spChg>
+        <pc:spChg chg="mod ord">
+          <ac:chgData name="Pascal Gouedo" userId="c3fafed6-2a32-40a5-b2ae-6f0e8f66f71f" providerId="ADAL" clId="{C8C5D83B-22CD-4B58-82EE-82E592045465}" dt="2021-07-01T14:47:29.253" v="62" actId="700"/>
+          <ac:spMkLst>
+            <pc:docMk/>
+            <pc:sldMk cId="2264016538" sldId="352"/>
+            <ac:spMk id="3" creationId="{3DEEB9ED-E27D-4D43-9DE3-66CCD0BB71BF}"/>
+          </ac:spMkLst>
+        </pc:spChg>
+        <pc:spChg chg="del mod ord">
+          <ac:chgData name="Pascal Gouedo" userId="c3fafed6-2a32-40a5-b2ae-6f0e8f66f71f" providerId="ADAL" clId="{C8C5D83B-22CD-4B58-82EE-82E592045465}" dt="2021-07-01T14:47:29.253" v="62" actId="700"/>
+          <ac:spMkLst>
+            <pc:docMk/>
+            <pc:sldMk cId="2264016538" sldId="352"/>
+            <ac:spMk id="4" creationId="{56631A82-88EC-4F7D-B291-98035C37814A}"/>
+          </ac:spMkLst>
+        </pc:spChg>
+        <pc:spChg chg="del mod ord">
+          <ac:chgData name="Pascal Gouedo" userId="c3fafed6-2a32-40a5-b2ae-6f0e8f66f71f" providerId="ADAL" clId="{C8C5D83B-22CD-4B58-82EE-82E592045465}" dt="2021-07-01T14:47:29.253" v="62" actId="700"/>
+          <ac:spMkLst>
+            <pc:docMk/>
+            <pc:sldMk cId="2264016538" sldId="352"/>
+            <ac:spMk id="5" creationId="{3241061B-1CFD-44E0-B3FC-64C95C38EAE0}"/>
+          </ac:spMkLst>
+        </pc:spChg>
+        <pc:spChg chg="add mod ord">
+          <ac:chgData name="Pascal Gouedo" userId="c3fafed6-2a32-40a5-b2ae-6f0e8f66f71f" providerId="ADAL" clId="{C8C5D83B-22CD-4B58-82EE-82E592045465}" dt="2021-07-01T14:56:31.208" v="261" actId="20577"/>
+          <ac:spMkLst>
+            <pc:docMk/>
+            <pc:sldMk cId="2264016538" sldId="352"/>
+            <ac:spMk id="6" creationId="{3AEDBB9E-8624-4CF9-BE72-94B191F0F0C2}"/>
+          </ac:spMkLst>
+        </pc:spChg>
+        <pc:spChg chg="add del mod ord">
+          <ac:chgData name="Pascal Gouedo" userId="c3fafed6-2a32-40a5-b2ae-6f0e8f66f71f" providerId="ADAL" clId="{C8C5D83B-22CD-4B58-82EE-82E592045465}" dt="2021-07-01T14:54:28.336" v="234" actId="478"/>
+          <ac:spMkLst>
+            <pc:docMk/>
+            <pc:sldMk cId="2264016538" sldId="352"/>
+            <ac:spMk id="7" creationId="{6CE193B8-E4AA-4526-9B3A-B5258DA02542}"/>
+          </ac:spMkLst>
+        </pc:spChg>
+      </pc:sldChg>
+      <pc:sldChg chg="modSp add mod">
+        <pc:chgData name="Pascal Gouedo" userId="c3fafed6-2a32-40a5-b2ae-6f0e8f66f71f" providerId="ADAL" clId="{C8C5D83B-22CD-4B58-82EE-82E592045465}" dt="2021-07-05T07:59:13.825" v="624" actId="20577"/>
+        <pc:sldMkLst>
+          <pc:docMk/>
+          <pc:sldMk cId="2873653418" sldId="353"/>
+        </pc:sldMkLst>
+        <pc:spChg chg="mod">
+          <ac:chgData name="Pascal Gouedo" userId="c3fafed6-2a32-40a5-b2ae-6f0e8f66f71f" providerId="ADAL" clId="{C8C5D83B-22CD-4B58-82EE-82E592045465}" dt="2021-07-05T07:59:13.825" v="624" actId="20577"/>
+          <ac:spMkLst>
+            <pc:docMk/>
+            <pc:sldMk cId="2873653418" sldId="353"/>
+            <ac:spMk id="5" creationId="{E833259D-8347-41B9-B62A-A29C8EFBC877}"/>
+          </ac:spMkLst>
+        </pc:spChg>
+        <pc:spChg chg="mod">
+          <ac:chgData name="Pascal Gouedo" userId="c3fafed6-2a32-40a5-b2ae-6f0e8f66f71f" providerId="ADAL" clId="{C8C5D83B-22CD-4B58-82EE-82E592045465}" dt="2021-07-05T07:58:40.427" v="608" actId="20577"/>
+          <ac:spMkLst>
+            <pc:docMk/>
+            <pc:sldMk cId="2873653418" sldId="353"/>
+            <ac:spMk id="6" creationId="{114F8BE7-A1A6-4862-AA34-DC4835A76628}"/>
+          </ac:spMkLst>
+        </pc:spChg>
+      </pc:sldChg>
+      <pc:sldChg chg="addSp delSp modSp new del mod modClrScheme chgLayout">
+        <pc:chgData name="Pascal Gouedo" userId="c3fafed6-2a32-40a5-b2ae-6f0e8f66f71f" providerId="ADAL" clId="{C8C5D83B-22CD-4B58-82EE-82E592045465}" dt="2021-07-05T14:24:08.468" v="712" actId="47"/>
+        <pc:sldMkLst>
+          <pc:docMk/>
+          <pc:sldMk cId="349061236" sldId="354"/>
+        </pc:sldMkLst>
+        <pc:spChg chg="mod ord">
+          <ac:chgData name="Pascal Gouedo" userId="c3fafed6-2a32-40a5-b2ae-6f0e8f66f71f" providerId="ADAL" clId="{C8C5D83B-22CD-4B58-82EE-82E592045465}" dt="2021-07-01T14:56:46.014" v="264" actId="700"/>
+          <ac:spMkLst>
+            <pc:docMk/>
+            <pc:sldMk cId="349061236" sldId="354"/>
+            <ac:spMk id="2" creationId="{73510FAE-7493-44CD-A11C-0535088EB3AD}"/>
+          </ac:spMkLst>
+        </pc:spChg>
+        <pc:spChg chg="mod ord">
+          <ac:chgData name="Pascal Gouedo" userId="c3fafed6-2a32-40a5-b2ae-6f0e8f66f71f" providerId="ADAL" clId="{C8C5D83B-22CD-4B58-82EE-82E592045465}" dt="2021-07-01T14:56:46.014" v="264" actId="700"/>
+          <ac:spMkLst>
+            <pc:docMk/>
+            <pc:sldMk cId="349061236" sldId="354"/>
+            <ac:spMk id="3" creationId="{6E35DF95-E6B0-4BD3-9179-2F504F2C70A9}"/>
+          </ac:spMkLst>
+        </pc:spChg>
+        <pc:spChg chg="del mod ord">
+          <ac:chgData name="Pascal Gouedo" userId="c3fafed6-2a32-40a5-b2ae-6f0e8f66f71f" providerId="ADAL" clId="{C8C5D83B-22CD-4B58-82EE-82E592045465}" dt="2021-07-01T14:56:46.014" v="264" actId="700"/>
+          <ac:spMkLst>
+            <pc:docMk/>
+            <pc:sldMk cId="349061236" sldId="354"/>
+            <ac:spMk id="4" creationId="{A1FA60F3-8473-496E-8F72-98D43B19D390}"/>
+          </ac:spMkLst>
+        </pc:spChg>
+        <pc:spChg chg="del mod ord">
+          <ac:chgData name="Pascal Gouedo" userId="c3fafed6-2a32-40a5-b2ae-6f0e8f66f71f" providerId="ADAL" clId="{C8C5D83B-22CD-4B58-82EE-82E592045465}" dt="2021-07-01T14:56:46.014" v="264" actId="700"/>
+          <ac:spMkLst>
+            <pc:docMk/>
+            <pc:sldMk cId="349061236" sldId="354"/>
+            <ac:spMk id="5" creationId="{C441A3FE-B127-4DBA-AD33-1503459F2F3B}"/>
+          </ac:spMkLst>
+        </pc:spChg>
+        <pc:spChg chg="add mod ord">
+          <ac:chgData name="Pascal Gouedo" userId="c3fafed6-2a32-40a5-b2ae-6f0e8f66f71f" providerId="ADAL" clId="{C8C5D83B-22CD-4B58-82EE-82E592045465}" dt="2021-07-01T14:57:20.484" v="316" actId="20577"/>
+          <ac:spMkLst>
+            <pc:docMk/>
+            <pc:sldMk cId="349061236" sldId="354"/>
+            <ac:spMk id="6" creationId="{44F87985-D6FB-4E80-AA74-2B1DD0BF608A}"/>
+          </ac:spMkLst>
+        </pc:spChg>
+        <pc:spChg chg="add mod ord">
+          <ac:chgData name="Pascal Gouedo" userId="c3fafed6-2a32-40a5-b2ae-6f0e8f66f71f" providerId="ADAL" clId="{C8C5D83B-22CD-4B58-82EE-82E592045465}" dt="2021-07-05T08:32:18.508" v="651" actId="20577"/>
+          <ac:spMkLst>
+            <pc:docMk/>
+            <pc:sldMk cId="349061236" sldId="354"/>
+            <ac:spMk id="7" creationId="{C8BB9DB4-850C-46F4-86F9-441DA7C6E561}"/>
+          </ac:spMkLst>
+        </pc:spChg>
+      </pc:sldChg>
+      <pc:sldChg chg="modSp add mod">
+        <pc:chgData name="Pascal Gouedo" userId="c3fafed6-2a32-40a5-b2ae-6f0e8f66f71f" providerId="ADAL" clId="{C8C5D83B-22CD-4B58-82EE-82E592045465}" dt="2021-07-05T08:31:36.392" v="648" actId="20577"/>
+        <pc:sldMkLst>
+          <pc:docMk/>
+          <pc:sldMk cId="1350407802" sldId="355"/>
+        </pc:sldMkLst>
+        <pc:spChg chg="mod">
+          <ac:chgData name="Pascal Gouedo" userId="c3fafed6-2a32-40a5-b2ae-6f0e8f66f71f" providerId="ADAL" clId="{C8C5D83B-22CD-4B58-82EE-82E592045465}" dt="2021-07-05T08:31:36.392" v="648" actId="20577"/>
+          <ac:spMkLst>
+            <pc:docMk/>
+            <pc:sldMk cId="1350407802" sldId="355"/>
+            <ac:spMk id="5" creationId="{E833259D-8347-41B9-B62A-A29C8EFBC877}"/>
+          </ac:spMkLst>
+        </pc:spChg>
+        <pc:spChg chg="mod">
+          <ac:chgData name="Pascal Gouedo" userId="c3fafed6-2a32-40a5-b2ae-6f0e8f66f71f" providerId="ADAL" clId="{C8C5D83B-22CD-4B58-82EE-82E592045465}" dt="2021-07-05T07:58:42.708" v="609" actId="20577"/>
+          <ac:spMkLst>
+            <pc:docMk/>
+            <pc:sldMk cId="1350407802" sldId="355"/>
+            <ac:spMk id="6" creationId="{114F8BE7-A1A6-4862-AA34-DC4835A76628}"/>
+          </ac:spMkLst>
+        </pc:spChg>
+      </pc:sldChg>
+      <pc:sldChg chg="modSp add mod">
+        <pc:chgData name="Pascal Gouedo" userId="c3fafed6-2a32-40a5-b2ae-6f0e8f66f71f" providerId="ADAL" clId="{C8C5D83B-22CD-4B58-82EE-82E592045465}" dt="2021-07-05T08:37:05.007" v="710" actId="20577"/>
+        <pc:sldMkLst>
+          <pc:docMk/>
+          <pc:sldMk cId="781425361" sldId="356"/>
+        </pc:sldMkLst>
+        <pc:spChg chg="mod">
+          <ac:chgData name="Pascal Gouedo" userId="c3fafed6-2a32-40a5-b2ae-6f0e8f66f71f" providerId="ADAL" clId="{C8C5D83B-22CD-4B58-82EE-82E592045465}" dt="2021-07-05T08:32:57.175" v="668" actId="20577"/>
+          <ac:spMkLst>
+            <pc:docMk/>
+            <pc:sldMk cId="781425361" sldId="356"/>
+            <ac:spMk id="2" creationId="{00000000-0000-0000-0000-000000000000}"/>
+          </ac:spMkLst>
+        </pc:spChg>
+        <pc:spChg chg="mod">
+          <ac:chgData name="Pascal Gouedo" userId="c3fafed6-2a32-40a5-b2ae-6f0e8f66f71f" providerId="ADAL" clId="{C8C5D83B-22CD-4B58-82EE-82E592045465}" dt="2021-07-05T08:33:19.018" v="675" actId="20577"/>
+          <ac:spMkLst>
+            <pc:docMk/>
+            <pc:sldMk cId="781425361" sldId="356"/>
+            <ac:spMk id="4" creationId="{00000000-0000-0000-0000-000000000000}"/>
+          </ac:spMkLst>
+        </pc:spChg>
+        <pc:spChg chg="mod">
+          <ac:chgData name="Pascal Gouedo" userId="c3fafed6-2a32-40a5-b2ae-6f0e8f66f71f" providerId="ADAL" clId="{C8C5D83B-22CD-4B58-82EE-82E592045465}" dt="2021-07-05T08:37:05.007" v="710" actId="20577"/>
+          <ac:spMkLst>
+            <pc:docMk/>
+            <pc:sldMk cId="781425361" sldId="356"/>
+            <ac:spMk id="5" creationId="{00000000-0000-0000-0000-000000000000}"/>
+          </ac:spMkLst>
+        </pc:spChg>
+      </pc:sldChg>
+      <pc:sldChg chg="add">
+        <pc:chgData name="Pascal Gouedo" userId="c3fafed6-2a32-40a5-b2ae-6f0e8f66f71f" providerId="ADAL" clId="{C8C5D83B-22CD-4B58-82EE-82E592045465}" dt="2021-07-05T14:23:47.262" v="711"/>
+        <pc:sldMkLst>
+          <pc:docMk/>
+          <pc:sldMk cId="2572482272" sldId="357"/>
+        </pc:sldMkLst>
       </pc:sldChg>
     </pc:docChg>
   </pc:docChgLst>
@@ -1504,7 +1798,7 @@
           <a:p>
             <a:fld id="{E5E18A25-0B26-6E4A-95E8-102061809533}" type="datetimeFigureOut">
               <a:rPr lang="fr-FR" smtClean="0"/>
-              <a:t>28/06/2021</a:t>
+              <a:t>01/09/2021</a:t>
             </a:fld>
             <a:endParaRPr lang="fr-FR"/>
           </a:p>
@@ -1670,7 +1964,7 @@
           <a:p>
             <a:fld id="{5CC8D7A0-82EB-834E-98CB-A89136EF4D1B}" type="datetimeFigureOut">
               <a:rPr lang="fr-FR" smtClean="0"/>
-              <a:t>28/06/2021</a:t>
+              <a:t>01/09/2021</a:t>
             </a:fld>
             <a:endParaRPr lang="fr-FR"/>
           </a:p>
@@ -11757,6 +12051,1355 @@
           <a:chExt cx="0" cy="0"/>
         </a:xfrm>
       </p:grpSpPr>
+      <p:sp>
+        <p:nvSpPr>
+          <p:cNvPr id="2" name="Espace réservé de la date 1"/>
+          <p:cNvSpPr>
+            <a:spLocks noGrp="1"/>
+          </p:cNvSpPr>
+          <p:nvPr>
+            <p:ph type="dt" sz="half" idx="10"/>
+          </p:nvPr>
+        </p:nvSpPr>
+        <p:spPr/>
+        <p:txBody>
+          <a:bodyPr/>
+          <a:lstStyle/>
+          <a:p>
+            <a:r>
+              <a:rPr lang="en-US" dirty="0"/>
+              <a:t>July 5, 2021</a:t>
+            </a:r>
+            <a:endParaRPr lang="fr-FR" dirty="0"/>
+          </a:p>
+        </p:txBody>
+      </p:sp>
+      <p:sp>
+        <p:nvSpPr>
+          <p:cNvPr id="3" name="Espace réservé du numéro de diapositive 2"/>
+          <p:cNvSpPr>
+            <a:spLocks noGrp="1"/>
+          </p:cNvSpPr>
+          <p:nvPr>
+            <p:ph type="sldNum" sz="quarter" idx="12"/>
+          </p:nvPr>
+        </p:nvSpPr>
+        <p:spPr/>
+        <p:txBody>
+          <a:bodyPr/>
+          <a:lstStyle/>
+          <a:p>
+            <a:fld id="{DCF6D529-A852-E746-A93B-81BD4A1CEEFF}" type="slidenum">
+              <a:rPr lang="fr-FR" smtClean="0"/>
+              <a:t>11</a:t>
+            </a:fld>
+            <a:endParaRPr lang="fr-FR"/>
+          </a:p>
+        </p:txBody>
+      </p:sp>
+      <p:sp>
+        <p:nvSpPr>
+          <p:cNvPr id="4" name="Espace réservé du texte 3"/>
+          <p:cNvSpPr>
+            <a:spLocks noGrp="1"/>
+          </p:cNvSpPr>
+          <p:nvPr>
+            <p:ph type="body" sz="quarter" idx="13"/>
+          </p:nvPr>
+        </p:nvSpPr>
+        <p:spPr/>
+        <p:txBody>
+          <a:bodyPr/>
+          <a:lstStyle/>
+          <a:p>
+            <a:r>
+              <a:rPr lang="fr-FR" dirty="0"/>
+              <a:t>CV32E40P v2</a:t>
+            </a:r>
+          </a:p>
+          <a:p>
+            <a:r>
+              <a:rPr lang="fr-FR" dirty="0"/>
+              <a:t>Final Project </a:t>
+            </a:r>
+            <a:r>
+              <a:rPr lang="fr-FR" dirty="0" err="1"/>
+              <a:t>requirements</a:t>
+            </a:r>
+            <a:endParaRPr lang="fr-FR" dirty="0"/>
+          </a:p>
+        </p:txBody>
+      </p:sp>
+      <p:sp>
+        <p:nvSpPr>
+          <p:cNvPr id="5" name="Espace réservé du texte 4"/>
+          <p:cNvSpPr>
+            <a:spLocks noGrp="1"/>
+          </p:cNvSpPr>
+          <p:nvPr>
+            <p:ph type="body" sz="quarter" idx="14"/>
+          </p:nvPr>
+        </p:nvSpPr>
+        <p:spPr>
+          <a:xfrm>
+            <a:off x="571292" y="2194063"/>
+            <a:ext cx="7581900" cy="659156"/>
+          </a:xfrm>
+        </p:spPr>
+        <p:txBody>
+          <a:bodyPr/>
+          <a:lstStyle/>
+          <a:p>
+            <a:r>
+              <a:rPr lang="fr-FR" sz="1800" dirty="0"/>
+              <a:t>Davide Schiavone</a:t>
+            </a:r>
+          </a:p>
+          <a:p>
+            <a:r>
+              <a:rPr lang="fr-FR" sz="1800" dirty="0"/>
+              <a:t>OpenHW Group</a:t>
+            </a:r>
+          </a:p>
+          <a:p>
+            <a:r>
+              <a:rPr lang="fr-FR" sz="1800" dirty="0"/>
+              <a:t>Olivier Monfort, Pascal Gouedo, Yoann Pruvost</a:t>
+            </a:r>
+          </a:p>
+          <a:p>
+            <a:r>
+              <a:rPr lang="fr-FR" sz="1800" dirty="0"/>
+              <a:t>Dolphin Design</a:t>
+            </a:r>
+            <a:br>
+              <a:rPr lang="fr-FR" sz="1800" dirty="0"/>
+            </a:br>
+            <a:endParaRPr lang="fr-FR" sz="1800" dirty="0"/>
+          </a:p>
+          <a:p>
+            <a:r>
+              <a:rPr lang="fr-FR" sz="1800" dirty="0"/>
+              <a:t>July 5, 2021</a:t>
+            </a:r>
+          </a:p>
+        </p:txBody>
+      </p:sp>
+    </p:spTree>
+    <p:extLst>
+      <p:ext uri="{BB962C8B-B14F-4D97-AF65-F5344CB8AC3E}">
+        <p14:creationId xmlns:p14="http://schemas.microsoft.com/office/powerpoint/2010/main" val="781425361"/>
+      </p:ext>
+    </p:extLst>
+  </p:cSld>
+  <p:clrMapOvr>
+    <a:masterClrMapping/>
+  </p:clrMapOvr>
+</p:sld>
+</file>
+
+<file path=ppt/slides/slide12.xml><?xml version="1.0" encoding="utf-8"?>
+<p:sld xmlns:a="http://schemas.openxmlformats.org/drawingml/2006/main" xmlns:r="http://schemas.openxmlformats.org/officeDocument/2006/relationships" xmlns:p="http://schemas.openxmlformats.org/presentationml/2006/main">
+  <p:cSld>
+    <p:spTree>
+      <p:nvGrpSpPr>
+        <p:cNvPr id="1" name=""/>
+        <p:cNvGrpSpPr/>
+        <p:nvPr/>
+      </p:nvGrpSpPr>
+      <p:grpSpPr>
+        <a:xfrm>
+          <a:off x="0" y="0"/>
+          <a:ext cx="0" cy="0"/>
+          <a:chOff x="0" y="0"/>
+          <a:chExt cx="0" cy="0"/>
+        </a:xfrm>
+      </p:grpSpPr>
+      <p:sp>
+        <p:nvSpPr>
+          <p:cNvPr id="2" name="Date Placeholder 1">
+            <a:extLst>
+              <a:ext uri="{FF2B5EF4-FFF2-40B4-BE49-F238E27FC236}">
+                <a16:creationId xmlns:a16="http://schemas.microsoft.com/office/drawing/2014/main" id="{00ABF760-F12A-41BD-9D2B-43814851D3F6}"/>
+              </a:ext>
+            </a:extLst>
+          </p:cNvPr>
+          <p:cNvSpPr>
+            <a:spLocks noGrp="1"/>
+          </p:cNvSpPr>
+          <p:nvPr>
+            <p:ph type="dt" sz="half" idx="10"/>
+          </p:nvPr>
+        </p:nvSpPr>
+        <p:spPr/>
+        <p:txBody>
+          <a:bodyPr/>
+          <a:lstStyle/>
+          <a:p>
+            <a:r>
+              <a:rPr lang="en-US"/>
+              <a:t>July 5, 2021</a:t>
+            </a:r>
+            <a:endParaRPr lang="fr-FR"/>
+          </a:p>
+        </p:txBody>
+      </p:sp>
+      <p:sp>
+        <p:nvSpPr>
+          <p:cNvPr id="3" name="Slide Number Placeholder 2">
+            <a:extLst>
+              <a:ext uri="{FF2B5EF4-FFF2-40B4-BE49-F238E27FC236}">
+                <a16:creationId xmlns:a16="http://schemas.microsoft.com/office/drawing/2014/main" id="{A0099D01-297B-45C2-B70C-A03E38A2808F}"/>
+              </a:ext>
+            </a:extLst>
+          </p:cNvPr>
+          <p:cNvSpPr>
+            <a:spLocks noGrp="1"/>
+          </p:cNvSpPr>
+          <p:nvPr>
+            <p:ph type="sldNum" sz="quarter" idx="12"/>
+          </p:nvPr>
+        </p:nvSpPr>
+        <p:spPr/>
+        <p:txBody>
+          <a:bodyPr/>
+          <a:lstStyle/>
+          <a:p>
+            <a:fld id="{FC828DD5-3DE4-F142-8615-E631BEE87654}" type="slidenum">
+              <a:rPr lang="fr-FR" smtClean="0"/>
+              <a:pPr/>
+              <a:t>12</a:t>
+            </a:fld>
+            <a:endParaRPr lang="fr-FR"/>
+          </a:p>
+        </p:txBody>
+      </p:sp>
+      <p:sp>
+        <p:nvSpPr>
+          <p:cNvPr id="5" name="Text Placeholder 4">
+            <a:extLst>
+              <a:ext uri="{FF2B5EF4-FFF2-40B4-BE49-F238E27FC236}">
+                <a16:creationId xmlns:a16="http://schemas.microsoft.com/office/drawing/2014/main" id="{E833259D-8347-41B9-B62A-A29C8EFBC877}"/>
+              </a:ext>
+            </a:extLst>
+          </p:cNvPr>
+          <p:cNvSpPr>
+            <a:spLocks noGrp="1"/>
+          </p:cNvSpPr>
+          <p:nvPr>
+            <p:ph type="body" sz="quarter" idx="21"/>
+          </p:nvPr>
+        </p:nvSpPr>
+        <p:spPr>
+          <a:xfrm>
+            <a:off x="437117" y="953872"/>
+            <a:ext cx="8252972" cy="3722900"/>
+          </a:xfrm>
+        </p:spPr>
+        <p:txBody>
+          <a:bodyPr/>
+          <a:lstStyle/>
+          <a:p>
+            <a:pPr marL="285750" indent="-285750">
+              <a:buFont typeface="Arial" panose="020B0604020202020204" pitchFamily="34" charset="0"/>
+              <a:buChar char="•"/>
+            </a:pPr>
+            <a:r>
+              <a:rPr lang="en-US" sz="1600" dirty="0"/>
+              <a:t>Re-Encode in Custom extension all PULP “basic” instructions and Verify them</a:t>
+            </a:r>
+          </a:p>
+          <a:p>
+            <a:pPr marL="1028700" lvl="1">
+              <a:buFont typeface="Arial" panose="020B0604020202020204" pitchFamily="34" charset="0"/>
+              <a:buChar char="•"/>
+            </a:pPr>
+            <a:r>
+              <a:rPr lang="en-US" sz="1400" dirty="0"/>
+              <a:t>Post-increment and register-register indexed load/store</a:t>
+            </a:r>
+          </a:p>
+          <a:p>
+            <a:pPr marL="1028700" lvl="1">
+              <a:buFont typeface="Arial" panose="020B0604020202020204" pitchFamily="34" charset="0"/>
+              <a:buChar char="•"/>
+            </a:pPr>
+            <a:r>
+              <a:rPr lang="en-US" sz="1400" dirty="0"/>
+              <a:t>Hardware Loops</a:t>
+            </a:r>
+          </a:p>
+          <a:p>
+            <a:pPr marL="1028700" lvl="1">
+              <a:buFont typeface="Arial" panose="020B0604020202020204" pitchFamily="34" charset="0"/>
+              <a:buChar char="•"/>
+            </a:pPr>
+            <a:r>
+              <a:rPr lang="en-US" sz="1400" dirty="0"/>
+              <a:t>General ALU extensions</a:t>
+            </a:r>
+          </a:p>
+          <a:p>
+            <a:pPr marL="1028700" lvl="1">
+              <a:buFont typeface="Arial" panose="020B0604020202020204" pitchFamily="34" charset="0"/>
+              <a:buChar char="•"/>
+            </a:pPr>
+            <a:r>
+              <a:rPr lang="en-US" sz="1400" dirty="0"/>
+              <a:t>Immediate Branch</a:t>
+            </a:r>
+          </a:p>
+          <a:p>
+            <a:pPr marL="1028700" lvl="1">
+              <a:buFont typeface="Arial" panose="020B0604020202020204" pitchFamily="34" charset="0"/>
+              <a:buChar char="•"/>
+            </a:pPr>
+            <a:r>
+              <a:rPr lang="en-US" sz="1400" dirty="0"/>
+              <a:t>Multiply and Accumulate</a:t>
+            </a:r>
+          </a:p>
+          <a:p>
+            <a:pPr marL="1028700" lvl="1">
+              <a:buFont typeface="Arial" panose="020B0604020202020204" pitchFamily="34" charset="0"/>
+              <a:buChar char="•"/>
+            </a:pPr>
+            <a:endParaRPr lang="en-US" sz="1400" dirty="0"/>
+          </a:p>
+          <a:p>
+            <a:pPr marL="1028700" lvl="1">
+              <a:buFont typeface="Arial" panose="020B0604020202020204" pitchFamily="34" charset="0"/>
+              <a:buChar char="•"/>
+            </a:pPr>
+            <a:endParaRPr lang="en-US" sz="1400" dirty="0"/>
+          </a:p>
+          <a:p>
+            <a:pPr marL="285750" indent="-285750">
+              <a:buFont typeface="Arial" panose="020B0604020202020204" pitchFamily="34" charset="0"/>
+              <a:buChar char="•"/>
+            </a:pPr>
+            <a:r>
+              <a:rPr lang="en-US" sz="1600" dirty="0"/>
+              <a:t>Re-Encode in Custom extension all PULP instructions and Verify them</a:t>
+            </a:r>
+          </a:p>
+          <a:p>
+            <a:pPr marL="1028700" lvl="1">
+              <a:buFont typeface="Arial" panose="020B0604020202020204" pitchFamily="34" charset="0"/>
+              <a:buChar char="•"/>
+            </a:pPr>
+            <a:r>
+              <a:rPr lang="en-US" sz="1400" dirty="0"/>
+              <a:t>Bit Manipulation</a:t>
+            </a:r>
+          </a:p>
+          <a:p>
+            <a:pPr marL="1028700" lvl="1">
+              <a:buFont typeface="Arial" panose="020B0604020202020204" pitchFamily="34" charset="0"/>
+              <a:buChar char="•"/>
+            </a:pPr>
+            <a:r>
+              <a:rPr lang="en-US" sz="1400" dirty="0"/>
+              <a:t>16- and 8-bit SIMD</a:t>
+            </a:r>
+          </a:p>
+          <a:p>
+            <a:pPr marL="1028700" lvl="1">
+              <a:buFont typeface="Arial" panose="020B0604020202020204" pitchFamily="34" charset="0"/>
+              <a:buChar char="•"/>
+            </a:pPr>
+            <a:r>
+              <a:rPr lang="en-US" sz="1400" b="1" u="sng" dirty="0"/>
+              <a:t>No</a:t>
+            </a:r>
+            <a:r>
+              <a:rPr lang="en-US" sz="1400" dirty="0"/>
+              <a:t> addition of 4- and 2-bit SIMD version</a:t>
+            </a:r>
+          </a:p>
+        </p:txBody>
+      </p:sp>
+      <p:sp>
+        <p:nvSpPr>
+          <p:cNvPr id="6" name="Text Placeholder 5">
+            <a:extLst>
+              <a:ext uri="{FF2B5EF4-FFF2-40B4-BE49-F238E27FC236}">
+                <a16:creationId xmlns:a16="http://schemas.microsoft.com/office/drawing/2014/main" id="{114F8BE7-A1A6-4862-AA34-DC4835A76628}"/>
+              </a:ext>
+            </a:extLst>
+          </p:cNvPr>
+          <p:cNvSpPr txBox="1">
+            <a:spLocks/>
+          </p:cNvSpPr>
+          <p:nvPr/>
+        </p:nvSpPr>
+        <p:spPr>
+          <a:xfrm>
+            <a:off x="437116" y="358481"/>
+            <a:ext cx="8246393" cy="450664"/>
+          </a:xfrm>
+          <a:prstGeom prst="rect">
+            <a:avLst/>
+          </a:prstGeom>
+        </p:spPr>
+        <p:txBody>
+          <a:bodyPr vert="horz"/>
+          <a:lstStyle>
+            <a:lvl1pPr marL="0" indent="0" algn="l" defTabSz="457200" rtl="0" eaLnBrk="1" latinLnBrk="0" hangingPunct="1">
+              <a:spcBef>
+                <a:spcPct val="20000"/>
+              </a:spcBef>
+              <a:buFont typeface="Arial"/>
+              <a:buNone/>
+              <a:defRPr sz="2000" b="1" kern="1200" baseline="0">
+                <a:solidFill>
+                  <a:srgbClr val="06362B"/>
+                </a:solidFill>
+                <a:latin typeface="Arial"/>
+                <a:ea typeface="+mn-ea"/>
+                <a:cs typeface="Arial"/>
+              </a:defRPr>
+            </a:lvl1pPr>
+            <a:lvl2pPr marL="742950" indent="-285750" algn="l" defTabSz="457200" rtl="0" eaLnBrk="1" latinLnBrk="0" hangingPunct="1">
+              <a:spcBef>
+                <a:spcPct val="20000"/>
+              </a:spcBef>
+              <a:buFont typeface="Arial"/>
+              <a:buChar char="–"/>
+              <a:defRPr sz="2800" kern="1200">
+                <a:solidFill>
+                  <a:schemeClr val="tx1"/>
+                </a:solidFill>
+                <a:latin typeface="+mn-lt"/>
+                <a:ea typeface="+mn-ea"/>
+                <a:cs typeface="+mn-cs"/>
+              </a:defRPr>
+            </a:lvl2pPr>
+            <a:lvl3pPr marL="1143000" indent="-228600" algn="l" defTabSz="457200" rtl="0" eaLnBrk="1" latinLnBrk="0" hangingPunct="1">
+              <a:spcBef>
+                <a:spcPct val="20000"/>
+              </a:spcBef>
+              <a:buFont typeface="Arial"/>
+              <a:buChar char="•"/>
+              <a:defRPr sz="2400" kern="1200">
+                <a:solidFill>
+                  <a:schemeClr val="tx1"/>
+                </a:solidFill>
+                <a:latin typeface="+mn-lt"/>
+                <a:ea typeface="+mn-ea"/>
+                <a:cs typeface="+mn-cs"/>
+              </a:defRPr>
+            </a:lvl3pPr>
+            <a:lvl4pPr marL="1600200" indent="-228600" algn="l" defTabSz="457200" rtl="0" eaLnBrk="1" latinLnBrk="0" hangingPunct="1">
+              <a:spcBef>
+                <a:spcPct val="20000"/>
+              </a:spcBef>
+              <a:buFont typeface="Arial"/>
+              <a:buChar char="–"/>
+              <a:defRPr sz="2000" kern="1200">
+                <a:solidFill>
+                  <a:schemeClr val="tx1"/>
+                </a:solidFill>
+                <a:latin typeface="+mn-lt"/>
+                <a:ea typeface="+mn-ea"/>
+                <a:cs typeface="+mn-cs"/>
+              </a:defRPr>
+            </a:lvl4pPr>
+            <a:lvl5pPr marL="2057400" indent="-228600" algn="l" defTabSz="457200" rtl="0" eaLnBrk="1" latinLnBrk="0" hangingPunct="1">
+              <a:spcBef>
+                <a:spcPct val="20000"/>
+              </a:spcBef>
+              <a:buFont typeface="Arial"/>
+              <a:buChar char="»"/>
+              <a:defRPr sz="2000" kern="1200">
+                <a:solidFill>
+                  <a:schemeClr val="tx1"/>
+                </a:solidFill>
+                <a:latin typeface="+mn-lt"/>
+                <a:ea typeface="+mn-ea"/>
+                <a:cs typeface="+mn-cs"/>
+              </a:defRPr>
+            </a:lvl5pPr>
+            <a:lvl6pPr marL="2514600" indent="-228600" algn="l" defTabSz="457200" rtl="0" eaLnBrk="1" latinLnBrk="0" hangingPunct="1">
+              <a:spcBef>
+                <a:spcPct val="20000"/>
+              </a:spcBef>
+              <a:buFont typeface="Arial"/>
+              <a:buChar char="•"/>
+              <a:defRPr sz="2000" kern="1200">
+                <a:solidFill>
+                  <a:schemeClr val="tx1"/>
+                </a:solidFill>
+                <a:latin typeface="+mn-lt"/>
+                <a:ea typeface="+mn-ea"/>
+                <a:cs typeface="+mn-cs"/>
+              </a:defRPr>
+            </a:lvl6pPr>
+            <a:lvl7pPr marL="2971800" indent="-228600" algn="l" defTabSz="457200" rtl="0" eaLnBrk="1" latinLnBrk="0" hangingPunct="1">
+              <a:spcBef>
+                <a:spcPct val="20000"/>
+              </a:spcBef>
+              <a:buFont typeface="Arial"/>
+              <a:buChar char="•"/>
+              <a:defRPr sz="2000" kern="1200">
+                <a:solidFill>
+                  <a:schemeClr val="tx1"/>
+                </a:solidFill>
+                <a:latin typeface="+mn-lt"/>
+                <a:ea typeface="+mn-ea"/>
+                <a:cs typeface="+mn-cs"/>
+              </a:defRPr>
+            </a:lvl7pPr>
+            <a:lvl8pPr marL="3429000" indent="-228600" algn="l" defTabSz="457200" rtl="0" eaLnBrk="1" latinLnBrk="0" hangingPunct="1">
+              <a:spcBef>
+                <a:spcPct val="20000"/>
+              </a:spcBef>
+              <a:buFont typeface="Arial"/>
+              <a:buChar char="•"/>
+              <a:defRPr sz="2000" kern="1200">
+                <a:solidFill>
+                  <a:schemeClr val="tx1"/>
+                </a:solidFill>
+                <a:latin typeface="+mn-lt"/>
+                <a:ea typeface="+mn-ea"/>
+                <a:cs typeface="+mn-cs"/>
+              </a:defRPr>
+            </a:lvl8pPr>
+            <a:lvl9pPr marL="3886200" indent="-228600" algn="l" defTabSz="457200" rtl="0" eaLnBrk="1" latinLnBrk="0" hangingPunct="1">
+              <a:spcBef>
+                <a:spcPct val="20000"/>
+              </a:spcBef>
+              <a:buFont typeface="Arial"/>
+              <a:buChar char="•"/>
+              <a:defRPr sz="2000" kern="1200">
+                <a:solidFill>
+                  <a:schemeClr val="tx1"/>
+                </a:solidFill>
+                <a:latin typeface="+mn-lt"/>
+                <a:ea typeface="+mn-ea"/>
+                <a:cs typeface="+mn-cs"/>
+              </a:defRPr>
+            </a:lvl9pPr>
+          </a:lstStyle>
+          <a:p>
+            <a:r>
+              <a:rPr lang="en-US" sz="2400" dirty="0"/>
+              <a:t>Final CV32E40P v2 features choice</a:t>
+            </a:r>
+          </a:p>
+        </p:txBody>
+      </p:sp>
+    </p:spTree>
+    <p:extLst>
+      <p:ext uri="{BB962C8B-B14F-4D97-AF65-F5344CB8AC3E}">
+        <p14:creationId xmlns:p14="http://schemas.microsoft.com/office/powerpoint/2010/main" val="2873653418"/>
+      </p:ext>
+    </p:extLst>
+  </p:cSld>
+  <p:clrMapOvr>
+    <a:masterClrMapping/>
+  </p:clrMapOvr>
+</p:sld>
+</file>
+
+<file path=ppt/slides/slide13.xml><?xml version="1.0" encoding="utf-8"?>
+<p:sld xmlns:a="http://schemas.openxmlformats.org/drawingml/2006/main" xmlns:r="http://schemas.openxmlformats.org/officeDocument/2006/relationships" xmlns:p="http://schemas.openxmlformats.org/presentationml/2006/main">
+  <p:cSld>
+    <p:spTree>
+      <p:nvGrpSpPr>
+        <p:cNvPr id="1" name=""/>
+        <p:cNvGrpSpPr/>
+        <p:nvPr/>
+      </p:nvGrpSpPr>
+      <p:grpSpPr>
+        <a:xfrm>
+          <a:off x="0" y="0"/>
+          <a:ext cx="0" cy="0"/>
+          <a:chOff x="0" y="0"/>
+          <a:chExt cx="0" cy="0"/>
+        </a:xfrm>
+      </p:grpSpPr>
+      <p:sp>
+        <p:nvSpPr>
+          <p:cNvPr id="2" name="Date Placeholder 1">
+            <a:extLst>
+              <a:ext uri="{FF2B5EF4-FFF2-40B4-BE49-F238E27FC236}">
+                <a16:creationId xmlns:a16="http://schemas.microsoft.com/office/drawing/2014/main" id="{00ABF760-F12A-41BD-9D2B-43814851D3F6}"/>
+              </a:ext>
+            </a:extLst>
+          </p:cNvPr>
+          <p:cNvSpPr>
+            <a:spLocks noGrp="1"/>
+          </p:cNvSpPr>
+          <p:nvPr>
+            <p:ph type="dt" sz="half" idx="10"/>
+          </p:nvPr>
+        </p:nvSpPr>
+        <p:spPr/>
+        <p:txBody>
+          <a:bodyPr/>
+          <a:lstStyle/>
+          <a:p>
+            <a:r>
+              <a:rPr lang="en-US"/>
+              <a:t>July 5, 2021</a:t>
+            </a:r>
+            <a:endParaRPr lang="fr-FR"/>
+          </a:p>
+        </p:txBody>
+      </p:sp>
+      <p:sp>
+        <p:nvSpPr>
+          <p:cNvPr id="3" name="Slide Number Placeholder 2">
+            <a:extLst>
+              <a:ext uri="{FF2B5EF4-FFF2-40B4-BE49-F238E27FC236}">
+                <a16:creationId xmlns:a16="http://schemas.microsoft.com/office/drawing/2014/main" id="{A0099D01-297B-45C2-B70C-A03E38A2808F}"/>
+              </a:ext>
+            </a:extLst>
+          </p:cNvPr>
+          <p:cNvSpPr>
+            <a:spLocks noGrp="1"/>
+          </p:cNvSpPr>
+          <p:nvPr>
+            <p:ph type="sldNum" sz="quarter" idx="12"/>
+          </p:nvPr>
+        </p:nvSpPr>
+        <p:spPr/>
+        <p:txBody>
+          <a:bodyPr/>
+          <a:lstStyle/>
+          <a:p>
+            <a:fld id="{FC828DD5-3DE4-F142-8615-E631BEE87654}" type="slidenum">
+              <a:rPr lang="fr-FR" smtClean="0"/>
+              <a:pPr/>
+              <a:t>13</a:t>
+            </a:fld>
+            <a:endParaRPr lang="fr-FR"/>
+          </a:p>
+        </p:txBody>
+      </p:sp>
+      <p:sp>
+        <p:nvSpPr>
+          <p:cNvPr id="5" name="Text Placeholder 4">
+            <a:extLst>
+              <a:ext uri="{FF2B5EF4-FFF2-40B4-BE49-F238E27FC236}">
+                <a16:creationId xmlns:a16="http://schemas.microsoft.com/office/drawing/2014/main" id="{E833259D-8347-41B9-B62A-A29C8EFBC877}"/>
+              </a:ext>
+            </a:extLst>
+          </p:cNvPr>
+          <p:cNvSpPr>
+            <a:spLocks noGrp="1"/>
+          </p:cNvSpPr>
+          <p:nvPr>
+            <p:ph type="body" sz="quarter" idx="21"/>
+          </p:nvPr>
+        </p:nvSpPr>
+        <p:spPr>
+          <a:xfrm>
+            <a:off x="437117" y="953872"/>
+            <a:ext cx="8252972" cy="3722900"/>
+          </a:xfrm>
+        </p:spPr>
+        <p:txBody>
+          <a:bodyPr/>
+          <a:lstStyle/>
+          <a:p>
+            <a:pPr marL="285750" indent="-285750">
+              <a:buFont typeface="Arial" panose="020B0604020202020204" pitchFamily="34" charset="0"/>
+              <a:buChar char="•"/>
+            </a:pPr>
+            <a:r>
+              <a:rPr lang="en-US" sz="1600" dirty="0"/>
+              <a:t>Re-Encode in Custom extension and Verify PULP instructions used for</a:t>
+            </a:r>
+            <a:br>
+              <a:rPr lang="en-US" sz="1600" dirty="0"/>
+            </a:br>
+            <a:r>
+              <a:rPr lang="en-US" sz="1600" dirty="0"/>
+              <a:t>Cores synchronization</a:t>
+            </a:r>
+          </a:p>
+          <a:p>
+            <a:pPr marL="1028700" lvl="1">
+              <a:buFont typeface="Arial" panose="020B0604020202020204" pitchFamily="34" charset="0"/>
+              <a:buChar char="•"/>
+            </a:pPr>
+            <a:r>
+              <a:rPr lang="en-US" sz="1400" dirty="0"/>
+              <a:t>PULP Event load</a:t>
+            </a:r>
+          </a:p>
+          <a:p>
+            <a:endParaRPr lang="en-US" sz="1600" dirty="0"/>
+          </a:p>
+          <a:p>
+            <a:pPr marL="285750" indent="-285750">
+              <a:buFont typeface="Arial" panose="020B0604020202020204" pitchFamily="34" charset="0"/>
+              <a:buChar char="•"/>
+            </a:pPr>
+            <a:r>
+              <a:rPr lang="en-US" sz="1600" dirty="0"/>
+              <a:t>For Multicore cluster area reduction</a:t>
+            </a:r>
+          </a:p>
+          <a:p>
+            <a:pPr marL="1028700" lvl="1">
+              <a:buFont typeface="Arial" panose="020B0604020202020204" pitchFamily="34" charset="0"/>
+              <a:buChar char="•"/>
+            </a:pPr>
+            <a:r>
+              <a:rPr lang="en-US" sz="1400" dirty="0"/>
+              <a:t>Verify PULP </a:t>
+            </a:r>
+            <a:r>
+              <a:rPr lang="en-US" sz="1400" dirty="0" err="1"/>
+              <a:t>Zfinx</a:t>
+            </a:r>
+            <a:endParaRPr lang="en-US" sz="1400" dirty="0"/>
+          </a:p>
+          <a:p>
+            <a:pPr marL="1028700" lvl="1">
+              <a:buFont typeface="Arial" panose="020B0604020202020204" pitchFamily="34" charset="0"/>
+              <a:buChar char="•"/>
+            </a:pPr>
+            <a:endParaRPr lang="en-US" sz="1400" dirty="0"/>
+          </a:p>
+          <a:p>
+            <a:pPr marL="285750" indent="-285750">
+              <a:buFont typeface="Arial" panose="020B0604020202020204" pitchFamily="34" charset="0"/>
+              <a:buChar char="•"/>
+            </a:pPr>
+            <a:r>
+              <a:rPr lang="en-US" sz="1600" dirty="0"/>
+              <a:t>Floating Point Unit</a:t>
+            </a:r>
+          </a:p>
+          <a:p>
+            <a:pPr marL="1028700" lvl="1">
+              <a:buFont typeface="Arial" panose="020B0604020202020204" pitchFamily="34" charset="0"/>
+              <a:buChar char="•"/>
+            </a:pPr>
+            <a:r>
+              <a:rPr lang="en-US" sz="1400" dirty="0"/>
+              <a:t>Keep FPU instructions decoding inside the Core</a:t>
+            </a:r>
+          </a:p>
+          <a:p>
+            <a:pPr marL="1028700" lvl="1">
+              <a:buFont typeface="Arial" panose="020B0604020202020204" pitchFamily="34" charset="0"/>
+              <a:buChar char="•"/>
+            </a:pPr>
+            <a:r>
+              <a:rPr lang="en-US" sz="1400" dirty="0"/>
+              <a:t>Dispatch them using APU interface</a:t>
+            </a:r>
+          </a:p>
+          <a:p>
+            <a:endParaRPr lang="en-US" sz="1600" dirty="0"/>
+          </a:p>
+          <a:p>
+            <a:r>
+              <a:rPr lang="en-US" sz="1800" dirty="0">
+                <a:sym typeface="Wingdings" panose="05000000000000000000" pitchFamily="2" charset="2"/>
+              </a:rPr>
+              <a:t>  </a:t>
+            </a:r>
+            <a:r>
+              <a:rPr lang="en-US" sz="1800" dirty="0"/>
+              <a:t>With the listed features, E40P name can be kept as it complies with rules.</a:t>
+            </a:r>
+            <a:endParaRPr lang="en-US" sz="1600" dirty="0"/>
+          </a:p>
+        </p:txBody>
+      </p:sp>
+      <p:sp>
+        <p:nvSpPr>
+          <p:cNvPr id="6" name="Text Placeholder 5">
+            <a:extLst>
+              <a:ext uri="{FF2B5EF4-FFF2-40B4-BE49-F238E27FC236}">
+                <a16:creationId xmlns:a16="http://schemas.microsoft.com/office/drawing/2014/main" id="{114F8BE7-A1A6-4862-AA34-DC4835A76628}"/>
+              </a:ext>
+            </a:extLst>
+          </p:cNvPr>
+          <p:cNvSpPr txBox="1">
+            <a:spLocks/>
+          </p:cNvSpPr>
+          <p:nvPr/>
+        </p:nvSpPr>
+        <p:spPr>
+          <a:xfrm>
+            <a:off x="437116" y="358481"/>
+            <a:ext cx="8246393" cy="450664"/>
+          </a:xfrm>
+          <a:prstGeom prst="rect">
+            <a:avLst/>
+          </a:prstGeom>
+        </p:spPr>
+        <p:txBody>
+          <a:bodyPr vert="horz"/>
+          <a:lstStyle>
+            <a:lvl1pPr marL="0" indent="0" algn="l" defTabSz="457200" rtl="0" eaLnBrk="1" latinLnBrk="0" hangingPunct="1">
+              <a:spcBef>
+                <a:spcPct val="20000"/>
+              </a:spcBef>
+              <a:buFont typeface="Arial"/>
+              <a:buNone/>
+              <a:defRPr sz="2000" b="1" kern="1200" baseline="0">
+                <a:solidFill>
+                  <a:srgbClr val="06362B"/>
+                </a:solidFill>
+                <a:latin typeface="Arial"/>
+                <a:ea typeface="+mn-ea"/>
+                <a:cs typeface="Arial"/>
+              </a:defRPr>
+            </a:lvl1pPr>
+            <a:lvl2pPr marL="742950" indent="-285750" algn="l" defTabSz="457200" rtl="0" eaLnBrk="1" latinLnBrk="0" hangingPunct="1">
+              <a:spcBef>
+                <a:spcPct val="20000"/>
+              </a:spcBef>
+              <a:buFont typeface="Arial"/>
+              <a:buChar char="–"/>
+              <a:defRPr sz="2800" kern="1200">
+                <a:solidFill>
+                  <a:schemeClr val="tx1"/>
+                </a:solidFill>
+                <a:latin typeface="+mn-lt"/>
+                <a:ea typeface="+mn-ea"/>
+                <a:cs typeface="+mn-cs"/>
+              </a:defRPr>
+            </a:lvl2pPr>
+            <a:lvl3pPr marL="1143000" indent="-228600" algn="l" defTabSz="457200" rtl="0" eaLnBrk="1" latinLnBrk="0" hangingPunct="1">
+              <a:spcBef>
+                <a:spcPct val="20000"/>
+              </a:spcBef>
+              <a:buFont typeface="Arial"/>
+              <a:buChar char="•"/>
+              <a:defRPr sz="2400" kern="1200">
+                <a:solidFill>
+                  <a:schemeClr val="tx1"/>
+                </a:solidFill>
+                <a:latin typeface="+mn-lt"/>
+                <a:ea typeface="+mn-ea"/>
+                <a:cs typeface="+mn-cs"/>
+              </a:defRPr>
+            </a:lvl3pPr>
+            <a:lvl4pPr marL="1600200" indent="-228600" algn="l" defTabSz="457200" rtl="0" eaLnBrk="1" latinLnBrk="0" hangingPunct="1">
+              <a:spcBef>
+                <a:spcPct val="20000"/>
+              </a:spcBef>
+              <a:buFont typeface="Arial"/>
+              <a:buChar char="–"/>
+              <a:defRPr sz="2000" kern="1200">
+                <a:solidFill>
+                  <a:schemeClr val="tx1"/>
+                </a:solidFill>
+                <a:latin typeface="+mn-lt"/>
+                <a:ea typeface="+mn-ea"/>
+                <a:cs typeface="+mn-cs"/>
+              </a:defRPr>
+            </a:lvl4pPr>
+            <a:lvl5pPr marL="2057400" indent="-228600" algn="l" defTabSz="457200" rtl="0" eaLnBrk="1" latinLnBrk="0" hangingPunct="1">
+              <a:spcBef>
+                <a:spcPct val="20000"/>
+              </a:spcBef>
+              <a:buFont typeface="Arial"/>
+              <a:buChar char="»"/>
+              <a:defRPr sz="2000" kern="1200">
+                <a:solidFill>
+                  <a:schemeClr val="tx1"/>
+                </a:solidFill>
+                <a:latin typeface="+mn-lt"/>
+                <a:ea typeface="+mn-ea"/>
+                <a:cs typeface="+mn-cs"/>
+              </a:defRPr>
+            </a:lvl5pPr>
+            <a:lvl6pPr marL="2514600" indent="-228600" algn="l" defTabSz="457200" rtl="0" eaLnBrk="1" latinLnBrk="0" hangingPunct="1">
+              <a:spcBef>
+                <a:spcPct val="20000"/>
+              </a:spcBef>
+              <a:buFont typeface="Arial"/>
+              <a:buChar char="•"/>
+              <a:defRPr sz="2000" kern="1200">
+                <a:solidFill>
+                  <a:schemeClr val="tx1"/>
+                </a:solidFill>
+                <a:latin typeface="+mn-lt"/>
+                <a:ea typeface="+mn-ea"/>
+                <a:cs typeface="+mn-cs"/>
+              </a:defRPr>
+            </a:lvl6pPr>
+            <a:lvl7pPr marL="2971800" indent="-228600" algn="l" defTabSz="457200" rtl="0" eaLnBrk="1" latinLnBrk="0" hangingPunct="1">
+              <a:spcBef>
+                <a:spcPct val="20000"/>
+              </a:spcBef>
+              <a:buFont typeface="Arial"/>
+              <a:buChar char="•"/>
+              <a:defRPr sz="2000" kern="1200">
+                <a:solidFill>
+                  <a:schemeClr val="tx1"/>
+                </a:solidFill>
+                <a:latin typeface="+mn-lt"/>
+                <a:ea typeface="+mn-ea"/>
+                <a:cs typeface="+mn-cs"/>
+              </a:defRPr>
+            </a:lvl7pPr>
+            <a:lvl8pPr marL="3429000" indent="-228600" algn="l" defTabSz="457200" rtl="0" eaLnBrk="1" latinLnBrk="0" hangingPunct="1">
+              <a:spcBef>
+                <a:spcPct val="20000"/>
+              </a:spcBef>
+              <a:buFont typeface="Arial"/>
+              <a:buChar char="•"/>
+              <a:defRPr sz="2000" kern="1200">
+                <a:solidFill>
+                  <a:schemeClr val="tx1"/>
+                </a:solidFill>
+                <a:latin typeface="+mn-lt"/>
+                <a:ea typeface="+mn-ea"/>
+                <a:cs typeface="+mn-cs"/>
+              </a:defRPr>
+            </a:lvl8pPr>
+            <a:lvl9pPr marL="3886200" indent="-228600" algn="l" defTabSz="457200" rtl="0" eaLnBrk="1" latinLnBrk="0" hangingPunct="1">
+              <a:spcBef>
+                <a:spcPct val="20000"/>
+              </a:spcBef>
+              <a:buFont typeface="Arial"/>
+              <a:buChar char="•"/>
+              <a:defRPr sz="2000" kern="1200">
+                <a:solidFill>
+                  <a:schemeClr val="tx1"/>
+                </a:solidFill>
+                <a:latin typeface="+mn-lt"/>
+                <a:ea typeface="+mn-ea"/>
+                <a:cs typeface="+mn-cs"/>
+              </a:defRPr>
+            </a:lvl9pPr>
+          </a:lstStyle>
+          <a:p>
+            <a:r>
+              <a:rPr lang="en-US" sz="2400" dirty="0"/>
+              <a:t>Final CV32E40P v2 features choice</a:t>
+            </a:r>
+          </a:p>
+        </p:txBody>
+      </p:sp>
+    </p:spTree>
+    <p:extLst>
+      <p:ext uri="{BB962C8B-B14F-4D97-AF65-F5344CB8AC3E}">
+        <p14:creationId xmlns:p14="http://schemas.microsoft.com/office/powerpoint/2010/main" val="1350407802"/>
+      </p:ext>
+    </p:extLst>
+  </p:cSld>
+  <p:clrMapOvr>
+    <a:masterClrMapping/>
+  </p:clrMapOvr>
+</p:sld>
+</file>
+
+<file path=ppt/slides/slide14.xml><?xml version="1.0" encoding="utf-8"?>
+<p:sld xmlns:a="http://schemas.openxmlformats.org/drawingml/2006/main" xmlns:r="http://schemas.openxmlformats.org/officeDocument/2006/relationships" xmlns:p="http://schemas.openxmlformats.org/presentationml/2006/main">
+  <p:cSld>
+    <p:spTree>
+      <p:nvGrpSpPr>
+        <p:cNvPr id="1" name=""/>
+        <p:cNvGrpSpPr/>
+        <p:nvPr/>
+      </p:nvGrpSpPr>
+      <p:grpSpPr>
+        <a:xfrm>
+          <a:off x="0" y="0"/>
+          <a:ext cx="0" cy="0"/>
+          <a:chOff x="0" y="0"/>
+          <a:chExt cx="0" cy="0"/>
+        </a:xfrm>
+      </p:grpSpPr>
+      <p:sp>
+        <p:nvSpPr>
+          <p:cNvPr id="2" name="Date Placeholder 1">
+            <a:extLst>
+              <a:ext uri="{FF2B5EF4-FFF2-40B4-BE49-F238E27FC236}">
+                <a16:creationId xmlns:a16="http://schemas.microsoft.com/office/drawing/2014/main" id="{00ABF760-F12A-41BD-9D2B-43814851D3F6}"/>
+              </a:ext>
+            </a:extLst>
+          </p:cNvPr>
+          <p:cNvSpPr>
+            <a:spLocks noGrp="1"/>
+          </p:cNvSpPr>
+          <p:nvPr>
+            <p:ph type="dt" sz="half" idx="10"/>
+          </p:nvPr>
+        </p:nvSpPr>
+        <p:spPr/>
+        <p:txBody>
+          <a:bodyPr/>
+          <a:lstStyle/>
+          <a:p>
+            <a:r>
+              <a:rPr lang="en-US"/>
+              <a:t>July 5, 2021</a:t>
+            </a:r>
+            <a:endParaRPr lang="fr-FR"/>
+          </a:p>
+        </p:txBody>
+      </p:sp>
+      <p:sp>
+        <p:nvSpPr>
+          <p:cNvPr id="3" name="Slide Number Placeholder 2">
+            <a:extLst>
+              <a:ext uri="{FF2B5EF4-FFF2-40B4-BE49-F238E27FC236}">
+                <a16:creationId xmlns:a16="http://schemas.microsoft.com/office/drawing/2014/main" id="{A0099D01-297B-45C2-B70C-A03E38A2808F}"/>
+              </a:ext>
+            </a:extLst>
+          </p:cNvPr>
+          <p:cNvSpPr>
+            <a:spLocks noGrp="1"/>
+          </p:cNvSpPr>
+          <p:nvPr>
+            <p:ph type="sldNum" sz="quarter" idx="12"/>
+          </p:nvPr>
+        </p:nvSpPr>
+        <p:spPr/>
+        <p:txBody>
+          <a:bodyPr/>
+          <a:lstStyle/>
+          <a:p>
+            <a:fld id="{FC828DD5-3DE4-F142-8615-E631BEE87654}" type="slidenum">
+              <a:rPr lang="fr-FR" smtClean="0"/>
+              <a:pPr/>
+              <a:t>14</a:t>
+            </a:fld>
+            <a:endParaRPr lang="fr-FR"/>
+          </a:p>
+        </p:txBody>
+      </p:sp>
+      <p:sp>
+        <p:nvSpPr>
+          <p:cNvPr id="5" name="Text Placeholder 4">
+            <a:extLst>
+              <a:ext uri="{FF2B5EF4-FFF2-40B4-BE49-F238E27FC236}">
+                <a16:creationId xmlns:a16="http://schemas.microsoft.com/office/drawing/2014/main" id="{E833259D-8347-41B9-B62A-A29C8EFBC877}"/>
+              </a:ext>
+            </a:extLst>
+          </p:cNvPr>
+          <p:cNvSpPr>
+            <a:spLocks noGrp="1"/>
+          </p:cNvSpPr>
+          <p:nvPr>
+            <p:ph type="body" sz="quarter" idx="21"/>
+          </p:nvPr>
+        </p:nvSpPr>
+        <p:spPr>
+          <a:xfrm>
+            <a:off x="437117" y="953872"/>
+            <a:ext cx="8252972" cy="3722900"/>
+          </a:xfrm>
+        </p:spPr>
+        <p:txBody>
+          <a:bodyPr/>
+          <a:lstStyle/>
+          <a:p>
+            <a:pPr marL="285750" indent="-285750">
+              <a:buFont typeface="Arial" panose="020B0604020202020204" pitchFamily="34" charset="0"/>
+              <a:buChar char="•"/>
+            </a:pPr>
+            <a:r>
+              <a:rPr lang="en-US" sz="1600" dirty="0"/>
+              <a:t>Started to setup core-v-</a:t>
+            </a:r>
+            <a:r>
+              <a:rPr lang="en-US" sz="1600" dirty="0" err="1"/>
+              <a:t>verif</a:t>
+            </a:r>
+            <a:r>
+              <a:rPr lang="en-US" sz="1600" dirty="0"/>
+              <a:t> environment w/ Mike Thompson support</a:t>
+            </a:r>
+            <a:endParaRPr lang="en-US" sz="1400" dirty="0"/>
+          </a:p>
+          <a:p>
+            <a:endParaRPr lang="en-US" sz="1600" dirty="0"/>
+          </a:p>
+          <a:p>
+            <a:pPr marL="285750" indent="-285750">
+              <a:buFont typeface="Arial" panose="020B0604020202020204" pitchFamily="34" charset="0"/>
+              <a:buChar char="•"/>
+            </a:pPr>
+            <a:r>
+              <a:rPr lang="en-US" sz="1600" dirty="0"/>
+              <a:t>Started contacting </a:t>
+            </a:r>
+            <a:r>
+              <a:rPr lang="en-US" sz="1600" dirty="0" err="1"/>
+              <a:t>Imperas</a:t>
+            </a:r>
+            <a:endParaRPr lang="en-US" sz="1600" dirty="0"/>
+          </a:p>
+          <a:p>
+            <a:pPr marL="1028700" lvl="1">
+              <a:buFont typeface="Arial" panose="020B0604020202020204" pitchFamily="34" charset="0"/>
+              <a:buChar char="•"/>
+            </a:pPr>
+            <a:r>
+              <a:rPr lang="en-US" sz="1600" dirty="0">
+                <a:effectLst/>
+                <a:latin typeface="Calibri" panose="020F0502020204030204" pitchFamily="34" charset="0"/>
+                <a:ea typeface="Calibri" panose="020F0502020204030204" pitchFamily="34" charset="0"/>
+                <a:cs typeface="Arial" panose="020B0604020202020204" pitchFamily="34" charset="0"/>
+              </a:rPr>
+              <a:t>to get CV32E40P v1 Reference Model license to start running UVM environment</a:t>
+            </a:r>
+          </a:p>
+          <a:p>
+            <a:pPr marL="1028700" lvl="1">
+              <a:buFont typeface="Arial" panose="020B0604020202020204" pitchFamily="34" charset="0"/>
+              <a:buChar char="•"/>
+            </a:pPr>
+            <a:r>
+              <a:rPr lang="en-US" sz="1600" dirty="0">
+                <a:effectLst/>
+                <a:latin typeface="Calibri" panose="020F0502020204030204" pitchFamily="34" charset="0"/>
+                <a:ea typeface="Calibri" panose="020F0502020204030204" pitchFamily="34" charset="0"/>
+                <a:cs typeface="Arial" panose="020B0604020202020204" pitchFamily="34" charset="0"/>
+              </a:rPr>
+              <a:t>to add Custom PULP instructions into Reference Model</a:t>
+            </a:r>
+          </a:p>
+          <a:p>
+            <a:pPr marL="1028700" lvl="1">
+              <a:buFont typeface="Arial" panose="020B0604020202020204" pitchFamily="34" charset="0"/>
+              <a:buChar char="•"/>
+            </a:pPr>
+            <a:endParaRPr lang="en-US" sz="1600" dirty="0"/>
+          </a:p>
+          <a:p>
+            <a:pPr marL="285750" indent="-285750">
+              <a:buFont typeface="Arial" panose="020B0604020202020204" pitchFamily="34" charset="0"/>
+              <a:buChar char="•"/>
+            </a:pPr>
+            <a:r>
+              <a:rPr lang="en-US" sz="1600" dirty="0"/>
+              <a:t>Continue to talk with </a:t>
+            </a:r>
+            <a:r>
+              <a:rPr lang="en-US" sz="1600" dirty="0" err="1"/>
+              <a:t>Embecosm</a:t>
+            </a:r>
+            <a:r>
+              <a:rPr lang="en-US" sz="1600" dirty="0"/>
+              <a:t> t</a:t>
+            </a:r>
+            <a:r>
+              <a:rPr lang="en-US" sz="1600" dirty="0">
+                <a:effectLst/>
+                <a:latin typeface="Calibri" panose="020F0502020204030204" pitchFamily="34" charset="0"/>
+                <a:ea typeface="Calibri" panose="020F0502020204030204" pitchFamily="34" charset="0"/>
+                <a:cs typeface="Arial" panose="020B0604020202020204" pitchFamily="34" charset="0"/>
+              </a:rPr>
+              <a:t>o add Custom PULP instructions into GCC SW toolchain</a:t>
+            </a:r>
+          </a:p>
+        </p:txBody>
+      </p:sp>
+      <p:sp>
+        <p:nvSpPr>
+          <p:cNvPr id="6" name="Text Placeholder 5">
+            <a:extLst>
+              <a:ext uri="{FF2B5EF4-FFF2-40B4-BE49-F238E27FC236}">
+                <a16:creationId xmlns:a16="http://schemas.microsoft.com/office/drawing/2014/main" id="{114F8BE7-A1A6-4862-AA34-DC4835A76628}"/>
+              </a:ext>
+            </a:extLst>
+          </p:cNvPr>
+          <p:cNvSpPr txBox="1">
+            <a:spLocks/>
+          </p:cNvSpPr>
+          <p:nvPr/>
+        </p:nvSpPr>
+        <p:spPr>
+          <a:xfrm>
+            <a:off x="437116" y="358481"/>
+            <a:ext cx="8246393" cy="450664"/>
+          </a:xfrm>
+          <a:prstGeom prst="rect">
+            <a:avLst/>
+          </a:prstGeom>
+        </p:spPr>
+        <p:txBody>
+          <a:bodyPr vert="horz"/>
+          <a:lstStyle>
+            <a:lvl1pPr marL="0" indent="0" algn="l" defTabSz="457200" rtl="0" eaLnBrk="1" latinLnBrk="0" hangingPunct="1">
+              <a:spcBef>
+                <a:spcPct val="20000"/>
+              </a:spcBef>
+              <a:buFont typeface="Arial"/>
+              <a:buNone/>
+              <a:defRPr sz="2000" b="1" kern="1200" baseline="0">
+                <a:solidFill>
+                  <a:srgbClr val="06362B"/>
+                </a:solidFill>
+                <a:latin typeface="Arial"/>
+                <a:ea typeface="+mn-ea"/>
+                <a:cs typeface="Arial"/>
+              </a:defRPr>
+            </a:lvl1pPr>
+            <a:lvl2pPr marL="742950" indent="-285750" algn="l" defTabSz="457200" rtl="0" eaLnBrk="1" latinLnBrk="0" hangingPunct="1">
+              <a:spcBef>
+                <a:spcPct val="20000"/>
+              </a:spcBef>
+              <a:buFont typeface="Arial"/>
+              <a:buChar char="–"/>
+              <a:defRPr sz="2800" kern="1200">
+                <a:solidFill>
+                  <a:schemeClr val="tx1"/>
+                </a:solidFill>
+                <a:latin typeface="+mn-lt"/>
+                <a:ea typeface="+mn-ea"/>
+                <a:cs typeface="+mn-cs"/>
+              </a:defRPr>
+            </a:lvl2pPr>
+            <a:lvl3pPr marL="1143000" indent="-228600" algn="l" defTabSz="457200" rtl="0" eaLnBrk="1" latinLnBrk="0" hangingPunct="1">
+              <a:spcBef>
+                <a:spcPct val="20000"/>
+              </a:spcBef>
+              <a:buFont typeface="Arial"/>
+              <a:buChar char="•"/>
+              <a:defRPr sz="2400" kern="1200">
+                <a:solidFill>
+                  <a:schemeClr val="tx1"/>
+                </a:solidFill>
+                <a:latin typeface="+mn-lt"/>
+                <a:ea typeface="+mn-ea"/>
+                <a:cs typeface="+mn-cs"/>
+              </a:defRPr>
+            </a:lvl3pPr>
+            <a:lvl4pPr marL="1600200" indent="-228600" algn="l" defTabSz="457200" rtl="0" eaLnBrk="1" latinLnBrk="0" hangingPunct="1">
+              <a:spcBef>
+                <a:spcPct val="20000"/>
+              </a:spcBef>
+              <a:buFont typeface="Arial"/>
+              <a:buChar char="–"/>
+              <a:defRPr sz="2000" kern="1200">
+                <a:solidFill>
+                  <a:schemeClr val="tx1"/>
+                </a:solidFill>
+                <a:latin typeface="+mn-lt"/>
+                <a:ea typeface="+mn-ea"/>
+                <a:cs typeface="+mn-cs"/>
+              </a:defRPr>
+            </a:lvl4pPr>
+            <a:lvl5pPr marL="2057400" indent="-228600" algn="l" defTabSz="457200" rtl="0" eaLnBrk="1" latinLnBrk="0" hangingPunct="1">
+              <a:spcBef>
+                <a:spcPct val="20000"/>
+              </a:spcBef>
+              <a:buFont typeface="Arial"/>
+              <a:buChar char="»"/>
+              <a:defRPr sz="2000" kern="1200">
+                <a:solidFill>
+                  <a:schemeClr val="tx1"/>
+                </a:solidFill>
+                <a:latin typeface="+mn-lt"/>
+                <a:ea typeface="+mn-ea"/>
+                <a:cs typeface="+mn-cs"/>
+              </a:defRPr>
+            </a:lvl5pPr>
+            <a:lvl6pPr marL="2514600" indent="-228600" algn="l" defTabSz="457200" rtl="0" eaLnBrk="1" latinLnBrk="0" hangingPunct="1">
+              <a:spcBef>
+                <a:spcPct val="20000"/>
+              </a:spcBef>
+              <a:buFont typeface="Arial"/>
+              <a:buChar char="•"/>
+              <a:defRPr sz="2000" kern="1200">
+                <a:solidFill>
+                  <a:schemeClr val="tx1"/>
+                </a:solidFill>
+                <a:latin typeface="+mn-lt"/>
+                <a:ea typeface="+mn-ea"/>
+                <a:cs typeface="+mn-cs"/>
+              </a:defRPr>
+            </a:lvl6pPr>
+            <a:lvl7pPr marL="2971800" indent="-228600" algn="l" defTabSz="457200" rtl="0" eaLnBrk="1" latinLnBrk="0" hangingPunct="1">
+              <a:spcBef>
+                <a:spcPct val="20000"/>
+              </a:spcBef>
+              <a:buFont typeface="Arial"/>
+              <a:buChar char="•"/>
+              <a:defRPr sz="2000" kern="1200">
+                <a:solidFill>
+                  <a:schemeClr val="tx1"/>
+                </a:solidFill>
+                <a:latin typeface="+mn-lt"/>
+                <a:ea typeface="+mn-ea"/>
+                <a:cs typeface="+mn-cs"/>
+              </a:defRPr>
+            </a:lvl7pPr>
+            <a:lvl8pPr marL="3429000" indent="-228600" algn="l" defTabSz="457200" rtl="0" eaLnBrk="1" latinLnBrk="0" hangingPunct="1">
+              <a:spcBef>
+                <a:spcPct val="20000"/>
+              </a:spcBef>
+              <a:buFont typeface="Arial"/>
+              <a:buChar char="•"/>
+              <a:defRPr sz="2000" kern="1200">
+                <a:solidFill>
+                  <a:schemeClr val="tx1"/>
+                </a:solidFill>
+                <a:latin typeface="+mn-lt"/>
+                <a:ea typeface="+mn-ea"/>
+                <a:cs typeface="+mn-cs"/>
+              </a:defRPr>
+            </a:lvl8pPr>
+            <a:lvl9pPr marL="3886200" indent="-228600" algn="l" defTabSz="457200" rtl="0" eaLnBrk="1" latinLnBrk="0" hangingPunct="1">
+              <a:spcBef>
+                <a:spcPct val="20000"/>
+              </a:spcBef>
+              <a:buFont typeface="Arial"/>
+              <a:buChar char="•"/>
+              <a:defRPr sz="2000" kern="1200">
+                <a:solidFill>
+                  <a:schemeClr val="tx1"/>
+                </a:solidFill>
+                <a:latin typeface="+mn-lt"/>
+                <a:ea typeface="+mn-ea"/>
+                <a:cs typeface="+mn-cs"/>
+              </a:defRPr>
+            </a:lvl9pPr>
+          </a:lstStyle>
+          <a:p>
+            <a:r>
+              <a:rPr lang="en-US" sz="2400" dirty="0"/>
+              <a:t>Status</a:t>
+            </a:r>
+          </a:p>
+        </p:txBody>
+      </p:sp>
+    </p:spTree>
+    <p:extLst>
+      <p:ext uri="{BB962C8B-B14F-4D97-AF65-F5344CB8AC3E}">
+        <p14:creationId xmlns:p14="http://schemas.microsoft.com/office/powerpoint/2010/main" val="2572482272"/>
+      </p:ext>
+    </p:extLst>
+  </p:cSld>
+  <p:clrMapOvr>
+    <a:masterClrMapping/>
+  </p:clrMapOvr>
+</p:sld>
+</file>
+
+<file path=ppt/slides/slide15.xml><?xml version="1.0" encoding="utf-8"?>
+<p:sld xmlns:a="http://schemas.openxmlformats.org/drawingml/2006/main" xmlns:r="http://schemas.openxmlformats.org/officeDocument/2006/relationships" xmlns:p="http://schemas.openxmlformats.org/presentationml/2006/main">
+  <p:cSld>
+    <p:spTree>
+      <p:nvGrpSpPr>
+        <p:cNvPr id="1" name=""/>
+        <p:cNvGrpSpPr/>
+        <p:nvPr/>
+      </p:nvGrpSpPr>
+      <p:grpSpPr>
+        <a:xfrm>
+          <a:off x="0" y="0"/>
+          <a:ext cx="0" cy="0"/>
+          <a:chOff x="0" y="0"/>
+          <a:chExt cx="0" cy="0"/>
+        </a:xfrm>
+      </p:grpSpPr>
     </p:spTree>
     <p:extLst>
       <p:ext uri="{BB962C8B-B14F-4D97-AF65-F5344CB8AC3E}">
@@ -13601,7 +15244,7 @@
             </a:pPr>
             <a:r>
               <a:rPr lang="en-US" sz="1600" dirty="0"/>
-              <a:t>For Multicore cluster area reduction,</a:t>
+              <a:t>For Multicore cluster area reduction</a:t>
             </a:r>
           </a:p>
           <a:p>
@@ -16900,21 +18543,6 @@
 </file>
 
 <file path=customXml/item1.xml><?xml version="1.0" encoding="utf-8"?>
-<?mso-contentType ?>
-<FormTemplates xmlns="http://schemas.microsoft.com/sharepoint/v3/contenttype/forms">
-  <Display>DocumentLibraryForm</Display>
-  <Edit>DocumentLibraryForm</Edit>
-  <New>DocumentLibraryForm</New>
-</FormTemplates>
-</file>
-
-<file path=customXml/item2.xml><?xml version="1.0" encoding="utf-8"?>
-<p:properties xmlns:p="http://schemas.microsoft.com/office/2006/metadata/properties" xmlns:xsi="http://www.w3.org/2001/XMLSchema-instance" xmlns:pc="http://schemas.microsoft.com/office/infopath/2007/PartnerControls">
-  <documentManagement/>
-</p:properties>
-</file>
-
-<file path=customXml/item3.xml><?xml version="1.0" encoding="utf-8"?>
 <ct:contentTypeSchema xmlns:ct="http://schemas.microsoft.com/office/2006/metadata/contentType" xmlns:ma="http://schemas.microsoft.com/office/2006/metadata/properties/metaAttributes" ct:_="" ma:_="" ma:contentTypeName="Document" ma:contentTypeID="0x010100EFCF9BE3DDC69D46817A851BEC5550B1" ma:contentTypeVersion="4" ma:contentTypeDescription="Crée un document." ma:contentTypeScope="" ma:versionID="881c34f7cd5cf8fbf683d402ca8875d2">
   <xsd:schema xmlns:xsd="http://www.w3.org/2001/XMLSchema" xmlns:xs="http://www.w3.org/2001/XMLSchema" xmlns:p="http://schemas.microsoft.com/office/2006/metadata/properties" xmlns:ns2="cbd820e2-9c8a-4c01-9a9c-6b4c26777899" targetNamespace="http://schemas.microsoft.com/office/2006/metadata/properties" ma:root="true" ma:fieldsID="379e6705f51ca8044999aec7fce4d4f1" ns2:_="">
     <xsd:import namespace="cbd820e2-9c8a-4c01-9a9c-6b4c26777899"/>
@@ -17060,32 +18688,22 @@
 </ct:contentTypeSchema>
 </file>
 
-<file path=customXml/itemProps1.xml><?xml version="1.0" encoding="utf-8"?>
-<ds:datastoreItem xmlns:ds="http://schemas.openxmlformats.org/officeDocument/2006/customXml" ds:itemID="{DEAE14D7-05E3-479B-BCD1-AF329D982B93}">
-  <ds:schemaRefs>
-    <ds:schemaRef ds:uri="http://schemas.microsoft.com/sharepoint/v3/contenttype/forms"/>
-  </ds:schemaRefs>
-</ds:datastoreItem>
+<file path=customXml/item2.xml><?xml version="1.0" encoding="utf-8"?>
+<?mso-contentType ?>
+<FormTemplates xmlns="http://schemas.microsoft.com/sharepoint/v3/contenttype/forms">
+  <Display>DocumentLibraryForm</Display>
+  <Edit>DocumentLibraryForm</Edit>
+  <New>DocumentLibraryForm</New>
+</FormTemplates>
 </file>
 
-<file path=customXml/itemProps2.xml><?xml version="1.0" encoding="utf-8"?>
-<ds:datastoreItem xmlns:ds="http://schemas.openxmlformats.org/officeDocument/2006/customXml" ds:itemID="{DA29D2D9-84CE-4251-95C0-C75B8E422BE4}">
-  <ds:schemaRefs>
-    <ds:schemaRef ds:uri="http://schemas.microsoft.com/office/infopath/2007/PartnerControls"/>
-    <ds:schemaRef ds:uri="46e63d5d-6b23-41d0-aa16-3c51c7d97b4d"/>
-    <ds:schemaRef ds:uri="http://schemas.microsoft.com/office/2006/metadata/properties"/>
-    <ds:schemaRef ds:uri="http://www.w3.org/XML/1998/namespace"/>
-    <ds:schemaRef ds:uri="http://purl.org/dc/terms/"/>
-    <ds:schemaRef ds:uri="http://purl.org/dc/elements/1.1/"/>
-    <ds:schemaRef ds:uri="http://schemas.microsoft.com/office/2006/documentManagement/types"/>
-    <ds:schemaRef ds:uri="http://schemas.openxmlformats.org/package/2006/metadata/core-properties"/>
-    <ds:schemaRef ds:uri="0d1674fc-8abe-424a-8f7a-8b612c3adaf9"/>
-    <ds:schemaRef ds:uri="http://purl.org/dc/dcmitype/"/>
-  </ds:schemaRefs>
-</ds:datastoreItem>
+<file path=customXml/item3.xml><?xml version="1.0" encoding="utf-8"?>
+<p:properties xmlns:p="http://schemas.microsoft.com/office/2006/metadata/properties" xmlns:xsi="http://www.w3.org/2001/XMLSchema-instance" xmlns:pc="http://schemas.microsoft.com/office/infopath/2007/PartnerControls">
+  <documentManagement/>
+</p:properties>
 </file>
 
-<file path=customXml/itemProps3.xml><?xml version="1.0" encoding="utf-8"?>
+<file path=customXml/itemProps1.xml><?xml version="1.0" encoding="utf-8"?>
 <ds:datastoreItem xmlns:ds="http://schemas.openxmlformats.org/officeDocument/2006/customXml" ds:itemID="{C00FD520-DD61-4DE7-AD64-0906EDEE6446}">
   <ds:schemaRefs>
     <ds:schemaRef ds:uri="http://schemas.microsoft.com/office/2006/metadata/contentType"/>
@@ -17101,4 +18719,29 @@
     <ds:schemaRef ds:uri="http://schemas.microsoft.com/internal/obd"/>
   </ds:schemaRefs>
 </ds:datastoreItem>
+</file>
+
+<file path=customXml/itemProps2.xml><?xml version="1.0" encoding="utf-8"?>
+<ds:datastoreItem xmlns:ds="http://schemas.openxmlformats.org/officeDocument/2006/customXml" ds:itemID="{DEAE14D7-05E3-479B-BCD1-AF329D982B93}">
+  <ds:schemaRefs>
+    <ds:schemaRef ds:uri="http://schemas.microsoft.com/sharepoint/v3/contenttype/forms"/>
+  </ds:schemaRefs>
+</ds:datastoreItem>
+</file>
+
+<file path=customXml/itemProps3.xml><?xml version="1.0" encoding="utf-8"?>
+<ds:datastoreItem xmlns:ds="http://schemas.openxmlformats.org/officeDocument/2006/customXml" ds:itemID="{DA29D2D9-84CE-4251-95C0-C75B8E422BE4}">
+  <ds:schemaRefs>
+    <ds:schemaRef ds:uri="http://schemas.microsoft.com/office/infopath/2007/PartnerControls"/>
+    <ds:schemaRef ds:uri="46e63d5d-6b23-41d0-aa16-3c51c7d97b4d"/>
+    <ds:schemaRef ds:uri="http://schemas.microsoft.com/office/2006/metadata/properties"/>
+    <ds:schemaRef ds:uri="http://www.w3.org/XML/1998/namespace"/>
+    <ds:schemaRef ds:uri="http://purl.org/dc/terms/"/>
+    <ds:schemaRef ds:uri="http://purl.org/dc/elements/1.1/"/>
+    <ds:schemaRef ds:uri="http://schemas.microsoft.com/office/2006/documentManagement/types"/>
+    <ds:schemaRef ds:uri="http://schemas.openxmlformats.org/package/2006/metadata/core-properties"/>
+    <ds:schemaRef ds:uri="0d1674fc-8abe-424a-8f7a-8b612c3adaf9"/>
+    <ds:schemaRef ds:uri="http://purl.org/dc/dcmitype/"/>
+  </ds:schemaRefs>
+</ds:datastoreItem>
 </file>
</xml_diff>

<commit_message>
Updated version of CV32E40P v2 PC and requirements (#456)
* CV32E40Pv2 Project Concept proposal

* Update Project_Concept_for_CV32E40Pv2_June 28.md

* Some updates following feedback

* Added some slides about final project requirements following technical meeting with Davide
</commit_message>
<xml_diff>
--- a/program/Project Descriptions and Plans/CV32E40Pv2/CV32E40P v2 Project Concept June 28 2021.pptx
+++ b/program/Project Descriptions and Plans/CV32E40Pv2/CV32E40P v2 Project Concept June 28 2021.pptx
@@ -8,10 +8,10 @@
     <p:sldMasterId id="2147483663" r:id="rId7"/>
   </p:sldMasterIdLst>
   <p:notesMasterIdLst>
-    <p:notesMasterId r:id="rId19"/>
+    <p:notesMasterId r:id="rId23"/>
   </p:notesMasterIdLst>
   <p:handoutMasterIdLst>
-    <p:handoutMasterId r:id="rId20"/>
+    <p:handoutMasterId r:id="rId24"/>
   </p:handoutMasterIdLst>
   <p:sldIdLst>
     <p:sldId id="258" r:id="rId8"/>
@@ -24,7 +24,11 @@
     <p:sldId id="345" r:id="rId15"/>
     <p:sldId id="349" r:id="rId16"/>
     <p:sldId id="351" r:id="rId17"/>
-    <p:sldId id="270" r:id="rId18"/>
+    <p:sldId id="356" r:id="rId18"/>
+    <p:sldId id="353" r:id="rId19"/>
+    <p:sldId id="355" r:id="rId20"/>
+    <p:sldId id="357" r:id="rId21"/>
+    <p:sldId id="270" r:id="rId22"/>
   </p:sldIdLst>
   <p:sldSz cx="9144000" cy="5143500" type="screen16x9"/>
   <p:notesSz cx="6858000" cy="9144000"/>
@@ -140,14 +144,6 @@
     </p:ext>
   </p:extLst>
 </p:presentation>
-</file>
-
-<file path=ppt/revisionInfo.xml><?xml version="1.0" encoding="utf-8"?>
-<p1510:revInfo xmlns:a="http://schemas.openxmlformats.org/drawingml/2006/main" xmlns:r="http://schemas.openxmlformats.org/officeDocument/2006/relationships" xmlns:p1510="http://schemas.microsoft.com/office/powerpoint/2015/10/main">
-  <p1510:revLst>
-    <p1510:client id="{8F43EECE-9F71-402E-AD9F-E69CC9039939}" v="73" dt="2021-06-28T10:46:29.020"/>
-  </p1510:revLst>
-</p1510:revInfo>
 </file>
 
 <file path=ppt/changesInfos/changesInfo1.xml><?xml version="1.0" encoding="utf-8"?>
@@ -844,9 +840,83 @@
     </pc:docChg>
   </pc:docChgLst>
   <pc:docChgLst>
+    <pc:chgData name="Pascal Gouedo" userId="c3fafed6-2a32-40a5-b2ae-6f0e8f66f71f" providerId="ADAL" clId="{A6EC41DF-BF40-40D2-B49A-20B4EBB10F36}"/>
+    <pc:docChg chg="modSld">
+      <pc:chgData name="Pascal Gouedo" userId="c3fafed6-2a32-40a5-b2ae-6f0e8f66f71f" providerId="ADAL" clId="{A6EC41DF-BF40-40D2-B49A-20B4EBB10F36}" dt="2021-09-01T12:45:30.106" v="74" actId="20577"/>
+      <pc:docMkLst>
+        <pc:docMk/>
+      </pc:docMkLst>
+      <pc:sldChg chg="mod modShow">
+        <pc:chgData name="Pascal Gouedo" userId="c3fafed6-2a32-40a5-b2ae-6f0e8f66f71f" providerId="ADAL" clId="{A6EC41DF-BF40-40D2-B49A-20B4EBB10F36}" dt="2021-07-12T06:17:23.519" v="2" actId="729"/>
+        <pc:sldMkLst>
+          <pc:docMk/>
+          <pc:sldMk cId="3670263909" sldId="337"/>
+        </pc:sldMkLst>
+      </pc:sldChg>
+      <pc:sldChg chg="mod modShow">
+        <pc:chgData name="Pascal Gouedo" userId="c3fafed6-2a32-40a5-b2ae-6f0e8f66f71f" providerId="ADAL" clId="{A6EC41DF-BF40-40D2-B49A-20B4EBB10F36}" dt="2021-07-12T06:17:17.798" v="1" actId="729"/>
+        <pc:sldMkLst>
+          <pc:docMk/>
+          <pc:sldMk cId="390669710" sldId="343"/>
+        </pc:sldMkLst>
+      </pc:sldChg>
+      <pc:sldChg chg="mod modShow">
+        <pc:chgData name="Pascal Gouedo" userId="c3fafed6-2a32-40a5-b2ae-6f0e8f66f71f" providerId="ADAL" clId="{A6EC41DF-BF40-40D2-B49A-20B4EBB10F36}" dt="2021-07-12T06:17:23.519" v="2" actId="729"/>
+        <pc:sldMkLst>
+          <pc:docMk/>
+          <pc:sldMk cId="1590387133" sldId="344"/>
+        </pc:sldMkLst>
+      </pc:sldChg>
+      <pc:sldChg chg="mod modShow">
+        <pc:chgData name="Pascal Gouedo" userId="c3fafed6-2a32-40a5-b2ae-6f0e8f66f71f" providerId="ADAL" clId="{A6EC41DF-BF40-40D2-B49A-20B4EBB10F36}" dt="2021-07-12T06:17:23.519" v="2" actId="729"/>
+        <pc:sldMkLst>
+          <pc:docMk/>
+          <pc:sldMk cId="3307728316" sldId="345"/>
+        </pc:sldMkLst>
+      </pc:sldChg>
+      <pc:sldChg chg="mod modShow">
+        <pc:chgData name="Pascal Gouedo" userId="c3fafed6-2a32-40a5-b2ae-6f0e8f66f71f" providerId="ADAL" clId="{A6EC41DF-BF40-40D2-B49A-20B4EBB10F36}" dt="2021-07-12T06:17:23.519" v="2" actId="729"/>
+        <pc:sldMkLst>
+          <pc:docMk/>
+          <pc:sldMk cId="795410478" sldId="349"/>
+        </pc:sldMkLst>
+      </pc:sldChg>
+      <pc:sldChg chg="mod modShow">
+        <pc:chgData name="Pascal Gouedo" userId="c3fafed6-2a32-40a5-b2ae-6f0e8f66f71f" providerId="ADAL" clId="{A6EC41DF-BF40-40D2-B49A-20B4EBB10F36}" dt="2021-07-12T06:17:23.519" v="2" actId="729"/>
+        <pc:sldMkLst>
+          <pc:docMk/>
+          <pc:sldMk cId="2072814" sldId="351"/>
+        </pc:sldMkLst>
+      </pc:sldChg>
+      <pc:sldChg chg="modSp mod modShow">
+        <pc:chgData name="Pascal Gouedo" userId="c3fafed6-2a32-40a5-b2ae-6f0e8f66f71f" providerId="ADAL" clId="{A6EC41DF-BF40-40D2-B49A-20B4EBB10F36}" dt="2021-09-01T12:45:30.106" v="74" actId="20577"/>
+        <pc:sldMkLst>
+          <pc:docMk/>
+          <pc:sldMk cId="781425361" sldId="356"/>
+        </pc:sldMkLst>
+        <pc:spChg chg="mod">
+          <ac:chgData name="Pascal Gouedo" userId="c3fafed6-2a32-40a5-b2ae-6f0e8f66f71f" providerId="ADAL" clId="{A6EC41DF-BF40-40D2-B49A-20B4EBB10F36}" dt="2021-09-01T12:45:30.106" v="74" actId="20577"/>
+          <ac:spMkLst>
+            <pc:docMk/>
+            <pc:sldMk cId="781425361" sldId="356"/>
+            <ac:spMk id="4" creationId="{00000000-0000-0000-0000-000000000000}"/>
+          </ac:spMkLst>
+        </pc:spChg>
+        <pc:spChg chg="mod">
+          <ac:chgData name="Pascal Gouedo" userId="c3fafed6-2a32-40a5-b2ae-6f0e8f66f71f" providerId="ADAL" clId="{A6EC41DF-BF40-40D2-B49A-20B4EBB10F36}" dt="2021-08-24T09:39:33.138" v="47" actId="20577"/>
+          <ac:spMkLst>
+            <pc:docMk/>
+            <pc:sldMk cId="781425361" sldId="356"/>
+            <ac:spMk id="5" creationId="{00000000-0000-0000-0000-000000000000}"/>
+          </ac:spMkLst>
+        </pc:spChg>
+      </pc:sldChg>
+    </pc:docChg>
+  </pc:docChgLst>
+  <pc:docChgLst>
     <pc:chgData name="Pascal Gouedo" userId="c3fafed6-2a32-40a5-b2ae-6f0e8f66f71f" providerId="ADAL" clId="{C8C5D83B-22CD-4B58-82EE-82E592045465}"/>
-    <pc:docChg chg="undo custSel modSld">
-      <pc:chgData name="Pascal Gouedo" userId="c3fafed6-2a32-40a5-b2ae-6f0e8f66f71f" providerId="ADAL" clId="{C8C5D83B-22CD-4B58-82EE-82E592045465}" dt="2021-06-28T13:48:15.520" v="23" actId="20577"/>
+    <pc:docChg chg="undo redo custSel addSld delSld modSld sldOrd">
+      <pc:chgData name="Pascal Gouedo" userId="c3fafed6-2a32-40a5-b2ae-6f0e8f66f71f" providerId="ADAL" clId="{C8C5D83B-22CD-4B58-82EE-82E592045465}" dt="2021-07-05T14:24:08.468" v="712" actId="47"/>
       <pc:docMkLst>
         <pc:docMk/>
       </pc:docMkLst>
@@ -866,6 +936,21 @@
         </pc:spChg>
       </pc:sldChg>
       <pc:sldChg chg="modSp mod">
+        <pc:chgData name="Pascal Gouedo" userId="c3fafed6-2a32-40a5-b2ae-6f0e8f66f71f" providerId="ADAL" clId="{C8C5D83B-22CD-4B58-82EE-82E592045465}" dt="2021-07-01T14:53:53.615" v="232" actId="20577"/>
+        <pc:sldMkLst>
+          <pc:docMk/>
+          <pc:sldMk cId="3670263909" sldId="337"/>
+        </pc:sldMkLst>
+        <pc:spChg chg="mod">
+          <ac:chgData name="Pascal Gouedo" userId="c3fafed6-2a32-40a5-b2ae-6f0e8f66f71f" providerId="ADAL" clId="{C8C5D83B-22CD-4B58-82EE-82E592045465}" dt="2021-07-01T14:53:53.615" v="232" actId="20577"/>
+          <ac:spMkLst>
+            <pc:docMk/>
+            <pc:sldMk cId="3670263909" sldId="337"/>
+            <ac:spMk id="5" creationId="{E833259D-8347-41B9-B62A-A29C8EFBC877}"/>
+          </ac:spMkLst>
+        </pc:spChg>
+      </pc:sldChg>
+      <pc:sldChg chg="modSp mod">
         <pc:chgData name="Pascal Gouedo" userId="c3fafed6-2a32-40a5-b2ae-6f0e8f66f71f" providerId="ADAL" clId="{C8C5D83B-22CD-4B58-82EE-82E592045465}" dt="2021-06-28T13:48:15.520" v="23" actId="20577"/>
         <pc:sldMkLst>
           <pc:docMk/>
@@ -879,6 +964,215 @@
             <ac:spMk id="5" creationId="{E833259D-8347-41B9-B62A-A29C8EFBC877}"/>
           </ac:spMkLst>
         </pc:spChg>
+      </pc:sldChg>
+      <pc:sldChg chg="modSp mod">
+        <pc:chgData name="Pascal Gouedo" userId="c3fafed6-2a32-40a5-b2ae-6f0e8f66f71f" providerId="ADAL" clId="{C8C5D83B-22CD-4B58-82EE-82E592045465}" dt="2021-06-28T16:00:52.684" v="57" actId="20577"/>
+        <pc:sldMkLst>
+          <pc:docMk/>
+          <pc:sldMk cId="2072814" sldId="351"/>
+        </pc:sldMkLst>
+        <pc:spChg chg="mod">
+          <ac:chgData name="Pascal Gouedo" userId="c3fafed6-2a32-40a5-b2ae-6f0e8f66f71f" providerId="ADAL" clId="{C8C5D83B-22CD-4B58-82EE-82E592045465}" dt="2021-06-28T16:00:52.684" v="57" actId="20577"/>
+          <ac:spMkLst>
+            <pc:docMk/>
+            <pc:sldMk cId="2072814" sldId="351"/>
+            <ac:spMk id="5" creationId="{E833259D-8347-41B9-B62A-A29C8EFBC877}"/>
+          </ac:spMkLst>
+        </pc:spChg>
+      </pc:sldChg>
+      <pc:sldChg chg="addSp delSp modSp new del mod ord modClrScheme chgLayout">
+        <pc:chgData name="Pascal Gouedo" userId="c3fafed6-2a32-40a5-b2ae-6f0e8f66f71f" providerId="ADAL" clId="{C8C5D83B-22CD-4B58-82EE-82E592045465}" dt="2021-07-01T14:56:39.066" v="262" actId="47"/>
+        <pc:sldMkLst>
+          <pc:docMk/>
+          <pc:sldMk cId="2264016538" sldId="352"/>
+        </pc:sldMkLst>
+        <pc:spChg chg="mod ord">
+          <ac:chgData name="Pascal Gouedo" userId="c3fafed6-2a32-40a5-b2ae-6f0e8f66f71f" providerId="ADAL" clId="{C8C5D83B-22CD-4B58-82EE-82E592045465}" dt="2021-07-01T14:47:29.253" v="62" actId="700"/>
+          <ac:spMkLst>
+            <pc:docMk/>
+            <pc:sldMk cId="2264016538" sldId="352"/>
+            <ac:spMk id="2" creationId="{D79C642C-783B-4B16-8060-3F0A25421BB2}"/>
+          </ac:spMkLst>
+        </pc:spChg>
+        <pc:spChg chg="mod ord">
+          <ac:chgData name="Pascal Gouedo" userId="c3fafed6-2a32-40a5-b2ae-6f0e8f66f71f" providerId="ADAL" clId="{C8C5D83B-22CD-4B58-82EE-82E592045465}" dt="2021-07-01T14:47:29.253" v="62" actId="700"/>
+          <ac:spMkLst>
+            <pc:docMk/>
+            <pc:sldMk cId="2264016538" sldId="352"/>
+            <ac:spMk id="3" creationId="{3DEEB9ED-E27D-4D43-9DE3-66CCD0BB71BF}"/>
+          </ac:spMkLst>
+        </pc:spChg>
+        <pc:spChg chg="del mod ord">
+          <ac:chgData name="Pascal Gouedo" userId="c3fafed6-2a32-40a5-b2ae-6f0e8f66f71f" providerId="ADAL" clId="{C8C5D83B-22CD-4B58-82EE-82E592045465}" dt="2021-07-01T14:47:29.253" v="62" actId="700"/>
+          <ac:spMkLst>
+            <pc:docMk/>
+            <pc:sldMk cId="2264016538" sldId="352"/>
+            <ac:spMk id="4" creationId="{56631A82-88EC-4F7D-B291-98035C37814A}"/>
+          </ac:spMkLst>
+        </pc:spChg>
+        <pc:spChg chg="del mod ord">
+          <ac:chgData name="Pascal Gouedo" userId="c3fafed6-2a32-40a5-b2ae-6f0e8f66f71f" providerId="ADAL" clId="{C8C5D83B-22CD-4B58-82EE-82E592045465}" dt="2021-07-01T14:47:29.253" v="62" actId="700"/>
+          <ac:spMkLst>
+            <pc:docMk/>
+            <pc:sldMk cId="2264016538" sldId="352"/>
+            <ac:spMk id="5" creationId="{3241061B-1CFD-44E0-B3FC-64C95C38EAE0}"/>
+          </ac:spMkLst>
+        </pc:spChg>
+        <pc:spChg chg="add mod ord">
+          <ac:chgData name="Pascal Gouedo" userId="c3fafed6-2a32-40a5-b2ae-6f0e8f66f71f" providerId="ADAL" clId="{C8C5D83B-22CD-4B58-82EE-82E592045465}" dt="2021-07-01T14:56:31.208" v="261" actId="20577"/>
+          <ac:spMkLst>
+            <pc:docMk/>
+            <pc:sldMk cId="2264016538" sldId="352"/>
+            <ac:spMk id="6" creationId="{3AEDBB9E-8624-4CF9-BE72-94B191F0F0C2}"/>
+          </ac:spMkLst>
+        </pc:spChg>
+        <pc:spChg chg="add del mod ord">
+          <ac:chgData name="Pascal Gouedo" userId="c3fafed6-2a32-40a5-b2ae-6f0e8f66f71f" providerId="ADAL" clId="{C8C5D83B-22CD-4B58-82EE-82E592045465}" dt="2021-07-01T14:54:28.336" v="234" actId="478"/>
+          <ac:spMkLst>
+            <pc:docMk/>
+            <pc:sldMk cId="2264016538" sldId="352"/>
+            <ac:spMk id="7" creationId="{6CE193B8-E4AA-4526-9B3A-B5258DA02542}"/>
+          </ac:spMkLst>
+        </pc:spChg>
+      </pc:sldChg>
+      <pc:sldChg chg="modSp add mod">
+        <pc:chgData name="Pascal Gouedo" userId="c3fafed6-2a32-40a5-b2ae-6f0e8f66f71f" providerId="ADAL" clId="{C8C5D83B-22CD-4B58-82EE-82E592045465}" dt="2021-07-05T07:59:13.825" v="624" actId="20577"/>
+        <pc:sldMkLst>
+          <pc:docMk/>
+          <pc:sldMk cId="2873653418" sldId="353"/>
+        </pc:sldMkLst>
+        <pc:spChg chg="mod">
+          <ac:chgData name="Pascal Gouedo" userId="c3fafed6-2a32-40a5-b2ae-6f0e8f66f71f" providerId="ADAL" clId="{C8C5D83B-22CD-4B58-82EE-82E592045465}" dt="2021-07-05T07:59:13.825" v="624" actId="20577"/>
+          <ac:spMkLst>
+            <pc:docMk/>
+            <pc:sldMk cId="2873653418" sldId="353"/>
+            <ac:spMk id="5" creationId="{E833259D-8347-41B9-B62A-A29C8EFBC877}"/>
+          </ac:spMkLst>
+        </pc:spChg>
+        <pc:spChg chg="mod">
+          <ac:chgData name="Pascal Gouedo" userId="c3fafed6-2a32-40a5-b2ae-6f0e8f66f71f" providerId="ADAL" clId="{C8C5D83B-22CD-4B58-82EE-82E592045465}" dt="2021-07-05T07:58:40.427" v="608" actId="20577"/>
+          <ac:spMkLst>
+            <pc:docMk/>
+            <pc:sldMk cId="2873653418" sldId="353"/>
+            <ac:spMk id="6" creationId="{114F8BE7-A1A6-4862-AA34-DC4835A76628}"/>
+          </ac:spMkLst>
+        </pc:spChg>
+      </pc:sldChg>
+      <pc:sldChg chg="addSp delSp modSp new del mod modClrScheme chgLayout">
+        <pc:chgData name="Pascal Gouedo" userId="c3fafed6-2a32-40a5-b2ae-6f0e8f66f71f" providerId="ADAL" clId="{C8C5D83B-22CD-4B58-82EE-82E592045465}" dt="2021-07-05T14:24:08.468" v="712" actId="47"/>
+        <pc:sldMkLst>
+          <pc:docMk/>
+          <pc:sldMk cId="349061236" sldId="354"/>
+        </pc:sldMkLst>
+        <pc:spChg chg="mod ord">
+          <ac:chgData name="Pascal Gouedo" userId="c3fafed6-2a32-40a5-b2ae-6f0e8f66f71f" providerId="ADAL" clId="{C8C5D83B-22CD-4B58-82EE-82E592045465}" dt="2021-07-01T14:56:46.014" v="264" actId="700"/>
+          <ac:spMkLst>
+            <pc:docMk/>
+            <pc:sldMk cId="349061236" sldId="354"/>
+            <ac:spMk id="2" creationId="{73510FAE-7493-44CD-A11C-0535088EB3AD}"/>
+          </ac:spMkLst>
+        </pc:spChg>
+        <pc:spChg chg="mod ord">
+          <ac:chgData name="Pascal Gouedo" userId="c3fafed6-2a32-40a5-b2ae-6f0e8f66f71f" providerId="ADAL" clId="{C8C5D83B-22CD-4B58-82EE-82E592045465}" dt="2021-07-01T14:56:46.014" v="264" actId="700"/>
+          <ac:spMkLst>
+            <pc:docMk/>
+            <pc:sldMk cId="349061236" sldId="354"/>
+            <ac:spMk id="3" creationId="{6E35DF95-E6B0-4BD3-9179-2F504F2C70A9}"/>
+          </ac:spMkLst>
+        </pc:spChg>
+        <pc:spChg chg="del mod ord">
+          <ac:chgData name="Pascal Gouedo" userId="c3fafed6-2a32-40a5-b2ae-6f0e8f66f71f" providerId="ADAL" clId="{C8C5D83B-22CD-4B58-82EE-82E592045465}" dt="2021-07-01T14:56:46.014" v="264" actId="700"/>
+          <ac:spMkLst>
+            <pc:docMk/>
+            <pc:sldMk cId="349061236" sldId="354"/>
+            <ac:spMk id="4" creationId="{A1FA60F3-8473-496E-8F72-98D43B19D390}"/>
+          </ac:spMkLst>
+        </pc:spChg>
+        <pc:spChg chg="del mod ord">
+          <ac:chgData name="Pascal Gouedo" userId="c3fafed6-2a32-40a5-b2ae-6f0e8f66f71f" providerId="ADAL" clId="{C8C5D83B-22CD-4B58-82EE-82E592045465}" dt="2021-07-01T14:56:46.014" v="264" actId="700"/>
+          <ac:spMkLst>
+            <pc:docMk/>
+            <pc:sldMk cId="349061236" sldId="354"/>
+            <ac:spMk id="5" creationId="{C441A3FE-B127-4DBA-AD33-1503459F2F3B}"/>
+          </ac:spMkLst>
+        </pc:spChg>
+        <pc:spChg chg="add mod ord">
+          <ac:chgData name="Pascal Gouedo" userId="c3fafed6-2a32-40a5-b2ae-6f0e8f66f71f" providerId="ADAL" clId="{C8C5D83B-22CD-4B58-82EE-82E592045465}" dt="2021-07-01T14:57:20.484" v="316" actId="20577"/>
+          <ac:spMkLst>
+            <pc:docMk/>
+            <pc:sldMk cId="349061236" sldId="354"/>
+            <ac:spMk id="6" creationId="{44F87985-D6FB-4E80-AA74-2B1DD0BF608A}"/>
+          </ac:spMkLst>
+        </pc:spChg>
+        <pc:spChg chg="add mod ord">
+          <ac:chgData name="Pascal Gouedo" userId="c3fafed6-2a32-40a5-b2ae-6f0e8f66f71f" providerId="ADAL" clId="{C8C5D83B-22CD-4B58-82EE-82E592045465}" dt="2021-07-05T08:32:18.508" v="651" actId="20577"/>
+          <ac:spMkLst>
+            <pc:docMk/>
+            <pc:sldMk cId="349061236" sldId="354"/>
+            <ac:spMk id="7" creationId="{C8BB9DB4-850C-46F4-86F9-441DA7C6E561}"/>
+          </ac:spMkLst>
+        </pc:spChg>
+      </pc:sldChg>
+      <pc:sldChg chg="modSp add mod">
+        <pc:chgData name="Pascal Gouedo" userId="c3fafed6-2a32-40a5-b2ae-6f0e8f66f71f" providerId="ADAL" clId="{C8C5D83B-22CD-4B58-82EE-82E592045465}" dt="2021-07-05T08:31:36.392" v="648" actId="20577"/>
+        <pc:sldMkLst>
+          <pc:docMk/>
+          <pc:sldMk cId="1350407802" sldId="355"/>
+        </pc:sldMkLst>
+        <pc:spChg chg="mod">
+          <ac:chgData name="Pascal Gouedo" userId="c3fafed6-2a32-40a5-b2ae-6f0e8f66f71f" providerId="ADAL" clId="{C8C5D83B-22CD-4B58-82EE-82E592045465}" dt="2021-07-05T08:31:36.392" v="648" actId="20577"/>
+          <ac:spMkLst>
+            <pc:docMk/>
+            <pc:sldMk cId="1350407802" sldId="355"/>
+            <ac:spMk id="5" creationId="{E833259D-8347-41B9-B62A-A29C8EFBC877}"/>
+          </ac:spMkLst>
+        </pc:spChg>
+        <pc:spChg chg="mod">
+          <ac:chgData name="Pascal Gouedo" userId="c3fafed6-2a32-40a5-b2ae-6f0e8f66f71f" providerId="ADAL" clId="{C8C5D83B-22CD-4B58-82EE-82E592045465}" dt="2021-07-05T07:58:42.708" v="609" actId="20577"/>
+          <ac:spMkLst>
+            <pc:docMk/>
+            <pc:sldMk cId="1350407802" sldId="355"/>
+            <ac:spMk id="6" creationId="{114F8BE7-A1A6-4862-AA34-DC4835A76628}"/>
+          </ac:spMkLst>
+        </pc:spChg>
+      </pc:sldChg>
+      <pc:sldChg chg="modSp add mod">
+        <pc:chgData name="Pascal Gouedo" userId="c3fafed6-2a32-40a5-b2ae-6f0e8f66f71f" providerId="ADAL" clId="{C8C5D83B-22CD-4B58-82EE-82E592045465}" dt="2021-07-05T08:37:05.007" v="710" actId="20577"/>
+        <pc:sldMkLst>
+          <pc:docMk/>
+          <pc:sldMk cId="781425361" sldId="356"/>
+        </pc:sldMkLst>
+        <pc:spChg chg="mod">
+          <ac:chgData name="Pascal Gouedo" userId="c3fafed6-2a32-40a5-b2ae-6f0e8f66f71f" providerId="ADAL" clId="{C8C5D83B-22CD-4B58-82EE-82E592045465}" dt="2021-07-05T08:32:57.175" v="668" actId="20577"/>
+          <ac:spMkLst>
+            <pc:docMk/>
+            <pc:sldMk cId="781425361" sldId="356"/>
+            <ac:spMk id="2" creationId="{00000000-0000-0000-0000-000000000000}"/>
+          </ac:spMkLst>
+        </pc:spChg>
+        <pc:spChg chg="mod">
+          <ac:chgData name="Pascal Gouedo" userId="c3fafed6-2a32-40a5-b2ae-6f0e8f66f71f" providerId="ADAL" clId="{C8C5D83B-22CD-4B58-82EE-82E592045465}" dt="2021-07-05T08:33:19.018" v="675" actId="20577"/>
+          <ac:spMkLst>
+            <pc:docMk/>
+            <pc:sldMk cId="781425361" sldId="356"/>
+            <ac:spMk id="4" creationId="{00000000-0000-0000-0000-000000000000}"/>
+          </ac:spMkLst>
+        </pc:spChg>
+        <pc:spChg chg="mod">
+          <ac:chgData name="Pascal Gouedo" userId="c3fafed6-2a32-40a5-b2ae-6f0e8f66f71f" providerId="ADAL" clId="{C8C5D83B-22CD-4B58-82EE-82E592045465}" dt="2021-07-05T08:37:05.007" v="710" actId="20577"/>
+          <ac:spMkLst>
+            <pc:docMk/>
+            <pc:sldMk cId="781425361" sldId="356"/>
+            <ac:spMk id="5" creationId="{00000000-0000-0000-0000-000000000000}"/>
+          </ac:spMkLst>
+        </pc:spChg>
+      </pc:sldChg>
+      <pc:sldChg chg="add">
+        <pc:chgData name="Pascal Gouedo" userId="c3fafed6-2a32-40a5-b2ae-6f0e8f66f71f" providerId="ADAL" clId="{C8C5D83B-22CD-4B58-82EE-82E592045465}" dt="2021-07-05T14:23:47.262" v="711"/>
+        <pc:sldMkLst>
+          <pc:docMk/>
+          <pc:sldMk cId="2572482272" sldId="357"/>
+        </pc:sldMkLst>
       </pc:sldChg>
     </pc:docChg>
   </pc:docChgLst>
@@ -1504,7 +1798,7 @@
           <a:p>
             <a:fld id="{E5E18A25-0B26-6E4A-95E8-102061809533}" type="datetimeFigureOut">
               <a:rPr lang="fr-FR" smtClean="0"/>
-              <a:t>28/06/2021</a:t>
+              <a:t>01/09/2021</a:t>
             </a:fld>
             <a:endParaRPr lang="fr-FR"/>
           </a:p>
@@ -1670,7 +1964,7 @@
           <a:p>
             <a:fld id="{5CC8D7A0-82EB-834E-98CB-A89136EF4D1B}" type="datetimeFigureOut">
               <a:rPr lang="fr-FR" smtClean="0"/>
-              <a:t>28/06/2021</a:t>
+              <a:t>01/09/2021</a:t>
             </a:fld>
             <a:endParaRPr lang="fr-FR"/>
           </a:p>
@@ -11757,6 +12051,1355 @@
           <a:chExt cx="0" cy="0"/>
         </a:xfrm>
       </p:grpSpPr>
+      <p:sp>
+        <p:nvSpPr>
+          <p:cNvPr id="2" name="Espace réservé de la date 1"/>
+          <p:cNvSpPr>
+            <a:spLocks noGrp="1"/>
+          </p:cNvSpPr>
+          <p:nvPr>
+            <p:ph type="dt" sz="half" idx="10"/>
+          </p:nvPr>
+        </p:nvSpPr>
+        <p:spPr/>
+        <p:txBody>
+          <a:bodyPr/>
+          <a:lstStyle/>
+          <a:p>
+            <a:r>
+              <a:rPr lang="en-US" dirty="0"/>
+              <a:t>July 5, 2021</a:t>
+            </a:r>
+            <a:endParaRPr lang="fr-FR" dirty="0"/>
+          </a:p>
+        </p:txBody>
+      </p:sp>
+      <p:sp>
+        <p:nvSpPr>
+          <p:cNvPr id="3" name="Espace réservé du numéro de diapositive 2"/>
+          <p:cNvSpPr>
+            <a:spLocks noGrp="1"/>
+          </p:cNvSpPr>
+          <p:nvPr>
+            <p:ph type="sldNum" sz="quarter" idx="12"/>
+          </p:nvPr>
+        </p:nvSpPr>
+        <p:spPr/>
+        <p:txBody>
+          <a:bodyPr/>
+          <a:lstStyle/>
+          <a:p>
+            <a:fld id="{DCF6D529-A852-E746-A93B-81BD4A1CEEFF}" type="slidenum">
+              <a:rPr lang="fr-FR" smtClean="0"/>
+              <a:t>11</a:t>
+            </a:fld>
+            <a:endParaRPr lang="fr-FR"/>
+          </a:p>
+        </p:txBody>
+      </p:sp>
+      <p:sp>
+        <p:nvSpPr>
+          <p:cNvPr id="4" name="Espace réservé du texte 3"/>
+          <p:cNvSpPr>
+            <a:spLocks noGrp="1"/>
+          </p:cNvSpPr>
+          <p:nvPr>
+            <p:ph type="body" sz="quarter" idx="13"/>
+          </p:nvPr>
+        </p:nvSpPr>
+        <p:spPr/>
+        <p:txBody>
+          <a:bodyPr/>
+          <a:lstStyle/>
+          <a:p>
+            <a:r>
+              <a:rPr lang="fr-FR" dirty="0"/>
+              <a:t>CV32E40P v2</a:t>
+            </a:r>
+          </a:p>
+          <a:p>
+            <a:r>
+              <a:rPr lang="fr-FR" dirty="0"/>
+              <a:t>Final Project </a:t>
+            </a:r>
+            <a:r>
+              <a:rPr lang="fr-FR" dirty="0" err="1"/>
+              <a:t>requirements</a:t>
+            </a:r>
+            <a:endParaRPr lang="fr-FR" dirty="0"/>
+          </a:p>
+        </p:txBody>
+      </p:sp>
+      <p:sp>
+        <p:nvSpPr>
+          <p:cNvPr id="5" name="Espace réservé du texte 4"/>
+          <p:cNvSpPr>
+            <a:spLocks noGrp="1"/>
+          </p:cNvSpPr>
+          <p:nvPr>
+            <p:ph type="body" sz="quarter" idx="14"/>
+          </p:nvPr>
+        </p:nvSpPr>
+        <p:spPr>
+          <a:xfrm>
+            <a:off x="571292" y="2194063"/>
+            <a:ext cx="7581900" cy="659156"/>
+          </a:xfrm>
+        </p:spPr>
+        <p:txBody>
+          <a:bodyPr/>
+          <a:lstStyle/>
+          <a:p>
+            <a:r>
+              <a:rPr lang="fr-FR" sz="1800" dirty="0"/>
+              <a:t>Davide Schiavone</a:t>
+            </a:r>
+          </a:p>
+          <a:p>
+            <a:r>
+              <a:rPr lang="fr-FR" sz="1800" dirty="0"/>
+              <a:t>OpenHW Group</a:t>
+            </a:r>
+          </a:p>
+          <a:p>
+            <a:r>
+              <a:rPr lang="fr-FR" sz="1800" dirty="0"/>
+              <a:t>Olivier Monfort, Pascal Gouedo, Yoann Pruvost</a:t>
+            </a:r>
+          </a:p>
+          <a:p>
+            <a:r>
+              <a:rPr lang="fr-FR" sz="1800" dirty="0"/>
+              <a:t>Dolphin Design</a:t>
+            </a:r>
+            <a:br>
+              <a:rPr lang="fr-FR" sz="1800" dirty="0"/>
+            </a:br>
+            <a:endParaRPr lang="fr-FR" sz="1800" dirty="0"/>
+          </a:p>
+          <a:p>
+            <a:r>
+              <a:rPr lang="fr-FR" sz="1800" dirty="0"/>
+              <a:t>July 5, 2021</a:t>
+            </a:r>
+          </a:p>
+        </p:txBody>
+      </p:sp>
+    </p:spTree>
+    <p:extLst>
+      <p:ext uri="{BB962C8B-B14F-4D97-AF65-F5344CB8AC3E}">
+        <p14:creationId xmlns:p14="http://schemas.microsoft.com/office/powerpoint/2010/main" val="781425361"/>
+      </p:ext>
+    </p:extLst>
+  </p:cSld>
+  <p:clrMapOvr>
+    <a:masterClrMapping/>
+  </p:clrMapOvr>
+</p:sld>
+</file>
+
+<file path=ppt/slides/slide12.xml><?xml version="1.0" encoding="utf-8"?>
+<p:sld xmlns:a="http://schemas.openxmlformats.org/drawingml/2006/main" xmlns:r="http://schemas.openxmlformats.org/officeDocument/2006/relationships" xmlns:p="http://schemas.openxmlformats.org/presentationml/2006/main">
+  <p:cSld>
+    <p:spTree>
+      <p:nvGrpSpPr>
+        <p:cNvPr id="1" name=""/>
+        <p:cNvGrpSpPr/>
+        <p:nvPr/>
+      </p:nvGrpSpPr>
+      <p:grpSpPr>
+        <a:xfrm>
+          <a:off x="0" y="0"/>
+          <a:ext cx="0" cy="0"/>
+          <a:chOff x="0" y="0"/>
+          <a:chExt cx="0" cy="0"/>
+        </a:xfrm>
+      </p:grpSpPr>
+      <p:sp>
+        <p:nvSpPr>
+          <p:cNvPr id="2" name="Date Placeholder 1">
+            <a:extLst>
+              <a:ext uri="{FF2B5EF4-FFF2-40B4-BE49-F238E27FC236}">
+                <a16:creationId xmlns:a16="http://schemas.microsoft.com/office/drawing/2014/main" id="{00ABF760-F12A-41BD-9D2B-43814851D3F6}"/>
+              </a:ext>
+            </a:extLst>
+          </p:cNvPr>
+          <p:cNvSpPr>
+            <a:spLocks noGrp="1"/>
+          </p:cNvSpPr>
+          <p:nvPr>
+            <p:ph type="dt" sz="half" idx="10"/>
+          </p:nvPr>
+        </p:nvSpPr>
+        <p:spPr/>
+        <p:txBody>
+          <a:bodyPr/>
+          <a:lstStyle/>
+          <a:p>
+            <a:r>
+              <a:rPr lang="en-US"/>
+              <a:t>July 5, 2021</a:t>
+            </a:r>
+            <a:endParaRPr lang="fr-FR"/>
+          </a:p>
+        </p:txBody>
+      </p:sp>
+      <p:sp>
+        <p:nvSpPr>
+          <p:cNvPr id="3" name="Slide Number Placeholder 2">
+            <a:extLst>
+              <a:ext uri="{FF2B5EF4-FFF2-40B4-BE49-F238E27FC236}">
+                <a16:creationId xmlns:a16="http://schemas.microsoft.com/office/drawing/2014/main" id="{A0099D01-297B-45C2-B70C-A03E38A2808F}"/>
+              </a:ext>
+            </a:extLst>
+          </p:cNvPr>
+          <p:cNvSpPr>
+            <a:spLocks noGrp="1"/>
+          </p:cNvSpPr>
+          <p:nvPr>
+            <p:ph type="sldNum" sz="quarter" idx="12"/>
+          </p:nvPr>
+        </p:nvSpPr>
+        <p:spPr/>
+        <p:txBody>
+          <a:bodyPr/>
+          <a:lstStyle/>
+          <a:p>
+            <a:fld id="{FC828DD5-3DE4-F142-8615-E631BEE87654}" type="slidenum">
+              <a:rPr lang="fr-FR" smtClean="0"/>
+              <a:pPr/>
+              <a:t>12</a:t>
+            </a:fld>
+            <a:endParaRPr lang="fr-FR"/>
+          </a:p>
+        </p:txBody>
+      </p:sp>
+      <p:sp>
+        <p:nvSpPr>
+          <p:cNvPr id="5" name="Text Placeholder 4">
+            <a:extLst>
+              <a:ext uri="{FF2B5EF4-FFF2-40B4-BE49-F238E27FC236}">
+                <a16:creationId xmlns:a16="http://schemas.microsoft.com/office/drawing/2014/main" id="{E833259D-8347-41B9-B62A-A29C8EFBC877}"/>
+              </a:ext>
+            </a:extLst>
+          </p:cNvPr>
+          <p:cNvSpPr>
+            <a:spLocks noGrp="1"/>
+          </p:cNvSpPr>
+          <p:nvPr>
+            <p:ph type="body" sz="quarter" idx="21"/>
+          </p:nvPr>
+        </p:nvSpPr>
+        <p:spPr>
+          <a:xfrm>
+            <a:off x="437117" y="953872"/>
+            <a:ext cx="8252972" cy="3722900"/>
+          </a:xfrm>
+        </p:spPr>
+        <p:txBody>
+          <a:bodyPr/>
+          <a:lstStyle/>
+          <a:p>
+            <a:pPr marL="285750" indent="-285750">
+              <a:buFont typeface="Arial" panose="020B0604020202020204" pitchFamily="34" charset="0"/>
+              <a:buChar char="•"/>
+            </a:pPr>
+            <a:r>
+              <a:rPr lang="en-US" sz="1600" dirty="0"/>
+              <a:t>Re-Encode in Custom extension all PULP “basic” instructions and Verify them</a:t>
+            </a:r>
+          </a:p>
+          <a:p>
+            <a:pPr marL="1028700" lvl="1">
+              <a:buFont typeface="Arial" panose="020B0604020202020204" pitchFamily="34" charset="0"/>
+              <a:buChar char="•"/>
+            </a:pPr>
+            <a:r>
+              <a:rPr lang="en-US" sz="1400" dirty="0"/>
+              <a:t>Post-increment and register-register indexed load/store</a:t>
+            </a:r>
+          </a:p>
+          <a:p>
+            <a:pPr marL="1028700" lvl="1">
+              <a:buFont typeface="Arial" panose="020B0604020202020204" pitchFamily="34" charset="0"/>
+              <a:buChar char="•"/>
+            </a:pPr>
+            <a:r>
+              <a:rPr lang="en-US" sz="1400" dirty="0"/>
+              <a:t>Hardware Loops</a:t>
+            </a:r>
+          </a:p>
+          <a:p>
+            <a:pPr marL="1028700" lvl="1">
+              <a:buFont typeface="Arial" panose="020B0604020202020204" pitchFamily="34" charset="0"/>
+              <a:buChar char="•"/>
+            </a:pPr>
+            <a:r>
+              <a:rPr lang="en-US" sz="1400" dirty="0"/>
+              <a:t>General ALU extensions</a:t>
+            </a:r>
+          </a:p>
+          <a:p>
+            <a:pPr marL="1028700" lvl="1">
+              <a:buFont typeface="Arial" panose="020B0604020202020204" pitchFamily="34" charset="0"/>
+              <a:buChar char="•"/>
+            </a:pPr>
+            <a:r>
+              <a:rPr lang="en-US" sz="1400" dirty="0"/>
+              <a:t>Immediate Branch</a:t>
+            </a:r>
+          </a:p>
+          <a:p>
+            <a:pPr marL="1028700" lvl="1">
+              <a:buFont typeface="Arial" panose="020B0604020202020204" pitchFamily="34" charset="0"/>
+              <a:buChar char="•"/>
+            </a:pPr>
+            <a:r>
+              <a:rPr lang="en-US" sz="1400" dirty="0"/>
+              <a:t>Multiply and Accumulate</a:t>
+            </a:r>
+          </a:p>
+          <a:p>
+            <a:pPr marL="1028700" lvl="1">
+              <a:buFont typeface="Arial" panose="020B0604020202020204" pitchFamily="34" charset="0"/>
+              <a:buChar char="•"/>
+            </a:pPr>
+            <a:endParaRPr lang="en-US" sz="1400" dirty="0"/>
+          </a:p>
+          <a:p>
+            <a:pPr marL="1028700" lvl="1">
+              <a:buFont typeface="Arial" panose="020B0604020202020204" pitchFamily="34" charset="0"/>
+              <a:buChar char="•"/>
+            </a:pPr>
+            <a:endParaRPr lang="en-US" sz="1400" dirty="0"/>
+          </a:p>
+          <a:p>
+            <a:pPr marL="285750" indent="-285750">
+              <a:buFont typeface="Arial" panose="020B0604020202020204" pitchFamily="34" charset="0"/>
+              <a:buChar char="•"/>
+            </a:pPr>
+            <a:r>
+              <a:rPr lang="en-US" sz="1600" dirty="0"/>
+              <a:t>Re-Encode in Custom extension all PULP instructions and Verify them</a:t>
+            </a:r>
+          </a:p>
+          <a:p>
+            <a:pPr marL="1028700" lvl="1">
+              <a:buFont typeface="Arial" panose="020B0604020202020204" pitchFamily="34" charset="0"/>
+              <a:buChar char="•"/>
+            </a:pPr>
+            <a:r>
+              <a:rPr lang="en-US" sz="1400" dirty="0"/>
+              <a:t>Bit Manipulation</a:t>
+            </a:r>
+          </a:p>
+          <a:p>
+            <a:pPr marL="1028700" lvl="1">
+              <a:buFont typeface="Arial" panose="020B0604020202020204" pitchFamily="34" charset="0"/>
+              <a:buChar char="•"/>
+            </a:pPr>
+            <a:r>
+              <a:rPr lang="en-US" sz="1400" dirty="0"/>
+              <a:t>16- and 8-bit SIMD</a:t>
+            </a:r>
+          </a:p>
+          <a:p>
+            <a:pPr marL="1028700" lvl="1">
+              <a:buFont typeface="Arial" panose="020B0604020202020204" pitchFamily="34" charset="0"/>
+              <a:buChar char="•"/>
+            </a:pPr>
+            <a:r>
+              <a:rPr lang="en-US" sz="1400" b="1" u="sng" dirty="0"/>
+              <a:t>No</a:t>
+            </a:r>
+            <a:r>
+              <a:rPr lang="en-US" sz="1400" dirty="0"/>
+              <a:t> addition of 4- and 2-bit SIMD version</a:t>
+            </a:r>
+          </a:p>
+        </p:txBody>
+      </p:sp>
+      <p:sp>
+        <p:nvSpPr>
+          <p:cNvPr id="6" name="Text Placeholder 5">
+            <a:extLst>
+              <a:ext uri="{FF2B5EF4-FFF2-40B4-BE49-F238E27FC236}">
+                <a16:creationId xmlns:a16="http://schemas.microsoft.com/office/drawing/2014/main" id="{114F8BE7-A1A6-4862-AA34-DC4835A76628}"/>
+              </a:ext>
+            </a:extLst>
+          </p:cNvPr>
+          <p:cNvSpPr txBox="1">
+            <a:spLocks/>
+          </p:cNvSpPr>
+          <p:nvPr/>
+        </p:nvSpPr>
+        <p:spPr>
+          <a:xfrm>
+            <a:off x="437116" y="358481"/>
+            <a:ext cx="8246393" cy="450664"/>
+          </a:xfrm>
+          <a:prstGeom prst="rect">
+            <a:avLst/>
+          </a:prstGeom>
+        </p:spPr>
+        <p:txBody>
+          <a:bodyPr vert="horz"/>
+          <a:lstStyle>
+            <a:lvl1pPr marL="0" indent="0" algn="l" defTabSz="457200" rtl="0" eaLnBrk="1" latinLnBrk="0" hangingPunct="1">
+              <a:spcBef>
+                <a:spcPct val="20000"/>
+              </a:spcBef>
+              <a:buFont typeface="Arial"/>
+              <a:buNone/>
+              <a:defRPr sz="2000" b="1" kern="1200" baseline="0">
+                <a:solidFill>
+                  <a:srgbClr val="06362B"/>
+                </a:solidFill>
+                <a:latin typeface="Arial"/>
+                <a:ea typeface="+mn-ea"/>
+                <a:cs typeface="Arial"/>
+              </a:defRPr>
+            </a:lvl1pPr>
+            <a:lvl2pPr marL="742950" indent="-285750" algn="l" defTabSz="457200" rtl="0" eaLnBrk="1" latinLnBrk="0" hangingPunct="1">
+              <a:spcBef>
+                <a:spcPct val="20000"/>
+              </a:spcBef>
+              <a:buFont typeface="Arial"/>
+              <a:buChar char="–"/>
+              <a:defRPr sz="2800" kern="1200">
+                <a:solidFill>
+                  <a:schemeClr val="tx1"/>
+                </a:solidFill>
+                <a:latin typeface="+mn-lt"/>
+                <a:ea typeface="+mn-ea"/>
+                <a:cs typeface="+mn-cs"/>
+              </a:defRPr>
+            </a:lvl2pPr>
+            <a:lvl3pPr marL="1143000" indent="-228600" algn="l" defTabSz="457200" rtl="0" eaLnBrk="1" latinLnBrk="0" hangingPunct="1">
+              <a:spcBef>
+                <a:spcPct val="20000"/>
+              </a:spcBef>
+              <a:buFont typeface="Arial"/>
+              <a:buChar char="•"/>
+              <a:defRPr sz="2400" kern="1200">
+                <a:solidFill>
+                  <a:schemeClr val="tx1"/>
+                </a:solidFill>
+                <a:latin typeface="+mn-lt"/>
+                <a:ea typeface="+mn-ea"/>
+                <a:cs typeface="+mn-cs"/>
+              </a:defRPr>
+            </a:lvl3pPr>
+            <a:lvl4pPr marL="1600200" indent="-228600" algn="l" defTabSz="457200" rtl="0" eaLnBrk="1" latinLnBrk="0" hangingPunct="1">
+              <a:spcBef>
+                <a:spcPct val="20000"/>
+              </a:spcBef>
+              <a:buFont typeface="Arial"/>
+              <a:buChar char="–"/>
+              <a:defRPr sz="2000" kern="1200">
+                <a:solidFill>
+                  <a:schemeClr val="tx1"/>
+                </a:solidFill>
+                <a:latin typeface="+mn-lt"/>
+                <a:ea typeface="+mn-ea"/>
+                <a:cs typeface="+mn-cs"/>
+              </a:defRPr>
+            </a:lvl4pPr>
+            <a:lvl5pPr marL="2057400" indent="-228600" algn="l" defTabSz="457200" rtl="0" eaLnBrk="1" latinLnBrk="0" hangingPunct="1">
+              <a:spcBef>
+                <a:spcPct val="20000"/>
+              </a:spcBef>
+              <a:buFont typeface="Arial"/>
+              <a:buChar char="»"/>
+              <a:defRPr sz="2000" kern="1200">
+                <a:solidFill>
+                  <a:schemeClr val="tx1"/>
+                </a:solidFill>
+                <a:latin typeface="+mn-lt"/>
+                <a:ea typeface="+mn-ea"/>
+                <a:cs typeface="+mn-cs"/>
+              </a:defRPr>
+            </a:lvl5pPr>
+            <a:lvl6pPr marL="2514600" indent="-228600" algn="l" defTabSz="457200" rtl="0" eaLnBrk="1" latinLnBrk="0" hangingPunct="1">
+              <a:spcBef>
+                <a:spcPct val="20000"/>
+              </a:spcBef>
+              <a:buFont typeface="Arial"/>
+              <a:buChar char="•"/>
+              <a:defRPr sz="2000" kern="1200">
+                <a:solidFill>
+                  <a:schemeClr val="tx1"/>
+                </a:solidFill>
+                <a:latin typeface="+mn-lt"/>
+                <a:ea typeface="+mn-ea"/>
+                <a:cs typeface="+mn-cs"/>
+              </a:defRPr>
+            </a:lvl6pPr>
+            <a:lvl7pPr marL="2971800" indent="-228600" algn="l" defTabSz="457200" rtl="0" eaLnBrk="1" latinLnBrk="0" hangingPunct="1">
+              <a:spcBef>
+                <a:spcPct val="20000"/>
+              </a:spcBef>
+              <a:buFont typeface="Arial"/>
+              <a:buChar char="•"/>
+              <a:defRPr sz="2000" kern="1200">
+                <a:solidFill>
+                  <a:schemeClr val="tx1"/>
+                </a:solidFill>
+                <a:latin typeface="+mn-lt"/>
+                <a:ea typeface="+mn-ea"/>
+                <a:cs typeface="+mn-cs"/>
+              </a:defRPr>
+            </a:lvl7pPr>
+            <a:lvl8pPr marL="3429000" indent="-228600" algn="l" defTabSz="457200" rtl="0" eaLnBrk="1" latinLnBrk="0" hangingPunct="1">
+              <a:spcBef>
+                <a:spcPct val="20000"/>
+              </a:spcBef>
+              <a:buFont typeface="Arial"/>
+              <a:buChar char="•"/>
+              <a:defRPr sz="2000" kern="1200">
+                <a:solidFill>
+                  <a:schemeClr val="tx1"/>
+                </a:solidFill>
+                <a:latin typeface="+mn-lt"/>
+                <a:ea typeface="+mn-ea"/>
+                <a:cs typeface="+mn-cs"/>
+              </a:defRPr>
+            </a:lvl8pPr>
+            <a:lvl9pPr marL="3886200" indent="-228600" algn="l" defTabSz="457200" rtl="0" eaLnBrk="1" latinLnBrk="0" hangingPunct="1">
+              <a:spcBef>
+                <a:spcPct val="20000"/>
+              </a:spcBef>
+              <a:buFont typeface="Arial"/>
+              <a:buChar char="•"/>
+              <a:defRPr sz="2000" kern="1200">
+                <a:solidFill>
+                  <a:schemeClr val="tx1"/>
+                </a:solidFill>
+                <a:latin typeface="+mn-lt"/>
+                <a:ea typeface="+mn-ea"/>
+                <a:cs typeface="+mn-cs"/>
+              </a:defRPr>
+            </a:lvl9pPr>
+          </a:lstStyle>
+          <a:p>
+            <a:r>
+              <a:rPr lang="en-US" sz="2400" dirty="0"/>
+              <a:t>Final CV32E40P v2 features choice</a:t>
+            </a:r>
+          </a:p>
+        </p:txBody>
+      </p:sp>
+    </p:spTree>
+    <p:extLst>
+      <p:ext uri="{BB962C8B-B14F-4D97-AF65-F5344CB8AC3E}">
+        <p14:creationId xmlns:p14="http://schemas.microsoft.com/office/powerpoint/2010/main" val="2873653418"/>
+      </p:ext>
+    </p:extLst>
+  </p:cSld>
+  <p:clrMapOvr>
+    <a:masterClrMapping/>
+  </p:clrMapOvr>
+</p:sld>
+</file>
+
+<file path=ppt/slides/slide13.xml><?xml version="1.0" encoding="utf-8"?>
+<p:sld xmlns:a="http://schemas.openxmlformats.org/drawingml/2006/main" xmlns:r="http://schemas.openxmlformats.org/officeDocument/2006/relationships" xmlns:p="http://schemas.openxmlformats.org/presentationml/2006/main">
+  <p:cSld>
+    <p:spTree>
+      <p:nvGrpSpPr>
+        <p:cNvPr id="1" name=""/>
+        <p:cNvGrpSpPr/>
+        <p:nvPr/>
+      </p:nvGrpSpPr>
+      <p:grpSpPr>
+        <a:xfrm>
+          <a:off x="0" y="0"/>
+          <a:ext cx="0" cy="0"/>
+          <a:chOff x="0" y="0"/>
+          <a:chExt cx="0" cy="0"/>
+        </a:xfrm>
+      </p:grpSpPr>
+      <p:sp>
+        <p:nvSpPr>
+          <p:cNvPr id="2" name="Date Placeholder 1">
+            <a:extLst>
+              <a:ext uri="{FF2B5EF4-FFF2-40B4-BE49-F238E27FC236}">
+                <a16:creationId xmlns:a16="http://schemas.microsoft.com/office/drawing/2014/main" id="{00ABF760-F12A-41BD-9D2B-43814851D3F6}"/>
+              </a:ext>
+            </a:extLst>
+          </p:cNvPr>
+          <p:cNvSpPr>
+            <a:spLocks noGrp="1"/>
+          </p:cNvSpPr>
+          <p:nvPr>
+            <p:ph type="dt" sz="half" idx="10"/>
+          </p:nvPr>
+        </p:nvSpPr>
+        <p:spPr/>
+        <p:txBody>
+          <a:bodyPr/>
+          <a:lstStyle/>
+          <a:p>
+            <a:r>
+              <a:rPr lang="en-US"/>
+              <a:t>July 5, 2021</a:t>
+            </a:r>
+            <a:endParaRPr lang="fr-FR"/>
+          </a:p>
+        </p:txBody>
+      </p:sp>
+      <p:sp>
+        <p:nvSpPr>
+          <p:cNvPr id="3" name="Slide Number Placeholder 2">
+            <a:extLst>
+              <a:ext uri="{FF2B5EF4-FFF2-40B4-BE49-F238E27FC236}">
+                <a16:creationId xmlns:a16="http://schemas.microsoft.com/office/drawing/2014/main" id="{A0099D01-297B-45C2-B70C-A03E38A2808F}"/>
+              </a:ext>
+            </a:extLst>
+          </p:cNvPr>
+          <p:cNvSpPr>
+            <a:spLocks noGrp="1"/>
+          </p:cNvSpPr>
+          <p:nvPr>
+            <p:ph type="sldNum" sz="quarter" idx="12"/>
+          </p:nvPr>
+        </p:nvSpPr>
+        <p:spPr/>
+        <p:txBody>
+          <a:bodyPr/>
+          <a:lstStyle/>
+          <a:p>
+            <a:fld id="{FC828DD5-3DE4-F142-8615-E631BEE87654}" type="slidenum">
+              <a:rPr lang="fr-FR" smtClean="0"/>
+              <a:pPr/>
+              <a:t>13</a:t>
+            </a:fld>
+            <a:endParaRPr lang="fr-FR"/>
+          </a:p>
+        </p:txBody>
+      </p:sp>
+      <p:sp>
+        <p:nvSpPr>
+          <p:cNvPr id="5" name="Text Placeholder 4">
+            <a:extLst>
+              <a:ext uri="{FF2B5EF4-FFF2-40B4-BE49-F238E27FC236}">
+                <a16:creationId xmlns:a16="http://schemas.microsoft.com/office/drawing/2014/main" id="{E833259D-8347-41B9-B62A-A29C8EFBC877}"/>
+              </a:ext>
+            </a:extLst>
+          </p:cNvPr>
+          <p:cNvSpPr>
+            <a:spLocks noGrp="1"/>
+          </p:cNvSpPr>
+          <p:nvPr>
+            <p:ph type="body" sz="quarter" idx="21"/>
+          </p:nvPr>
+        </p:nvSpPr>
+        <p:spPr>
+          <a:xfrm>
+            <a:off x="437117" y="953872"/>
+            <a:ext cx="8252972" cy="3722900"/>
+          </a:xfrm>
+        </p:spPr>
+        <p:txBody>
+          <a:bodyPr/>
+          <a:lstStyle/>
+          <a:p>
+            <a:pPr marL="285750" indent="-285750">
+              <a:buFont typeface="Arial" panose="020B0604020202020204" pitchFamily="34" charset="0"/>
+              <a:buChar char="•"/>
+            </a:pPr>
+            <a:r>
+              <a:rPr lang="en-US" sz="1600" dirty="0"/>
+              <a:t>Re-Encode in Custom extension and Verify PULP instructions used for</a:t>
+            </a:r>
+            <a:br>
+              <a:rPr lang="en-US" sz="1600" dirty="0"/>
+            </a:br>
+            <a:r>
+              <a:rPr lang="en-US" sz="1600" dirty="0"/>
+              <a:t>Cores synchronization</a:t>
+            </a:r>
+          </a:p>
+          <a:p>
+            <a:pPr marL="1028700" lvl="1">
+              <a:buFont typeface="Arial" panose="020B0604020202020204" pitchFamily="34" charset="0"/>
+              <a:buChar char="•"/>
+            </a:pPr>
+            <a:r>
+              <a:rPr lang="en-US" sz="1400" dirty="0"/>
+              <a:t>PULP Event load</a:t>
+            </a:r>
+          </a:p>
+          <a:p>
+            <a:endParaRPr lang="en-US" sz="1600" dirty="0"/>
+          </a:p>
+          <a:p>
+            <a:pPr marL="285750" indent="-285750">
+              <a:buFont typeface="Arial" panose="020B0604020202020204" pitchFamily="34" charset="0"/>
+              <a:buChar char="•"/>
+            </a:pPr>
+            <a:r>
+              <a:rPr lang="en-US" sz="1600" dirty="0"/>
+              <a:t>For Multicore cluster area reduction</a:t>
+            </a:r>
+          </a:p>
+          <a:p>
+            <a:pPr marL="1028700" lvl="1">
+              <a:buFont typeface="Arial" panose="020B0604020202020204" pitchFamily="34" charset="0"/>
+              <a:buChar char="•"/>
+            </a:pPr>
+            <a:r>
+              <a:rPr lang="en-US" sz="1400" dirty="0"/>
+              <a:t>Verify PULP </a:t>
+            </a:r>
+            <a:r>
+              <a:rPr lang="en-US" sz="1400" dirty="0" err="1"/>
+              <a:t>Zfinx</a:t>
+            </a:r>
+            <a:endParaRPr lang="en-US" sz="1400" dirty="0"/>
+          </a:p>
+          <a:p>
+            <a:pPr marL="1028700" lvl="1">
+              <a:buFont typeface="Arial" panose="020B0604020202020204" pitchFamily="34" charset="0"/>
+              <a:buChar char="•"/>
+            </a:pPr>
+            <a:endParaRPr lang="en-US" sz="1400" dirty="0"/>
+          </a:p>
+          <a:p>
+            <a:pPr marL="285750" indent="-285750">
+              <a:buFont typeface="Arial" panose="020B0604020202020204" pitchFamily="34" charset="0"/>
+              <a:buChar char="•"/>
+            </a:pPr>
+            <a:r>
+              <a:rPr lang="en-US" sz="1600" dirty="0"/>
+              <a:t>Floating Point Unit</a:t>
+            </a:r>
+          </a:p>
+          <a:p>
+            <a:pPr marL="1028700" lvl="1">
+              <a:buFont typeface="Arial" panose="020B0604020202020204" pitchFamily="34" charset="0"/>
+              <a:buChar char="•"/>
+            </a:pPr>
+            <a:r>
+              <a:rPr lang="en-US" sz="1400" dirty="0"/>
+              <a:t>Keep FPU instructions decoding inside the Core</a:t>
+            </a:r>
+          </a:p>
+          <a:p>
+            <a:pPr marL="1028700" lvl="1">
+              <a:buFont typeface="Arial" panose="020B0604020202020204" pitchFamily="34" charset="0"/>
+              <a:buChar char="•"/>
+            </a:pPr>
+            <a:r>
+              <a:rPr lang="en-US" sz="1400" dirty="0"/>
+              <a:t>Dispatch them using APU interface</a:t>
+            </a:r>
+          </a:p>
+          <a:p>
+            <a:endParaRPr lang="en-US" sz="1600" dirty="0"/>
+          </a:p>
+          <a:p>
+            <a:r>
+              <a:rPr lang="en-US" sz="1800" dirty="0">
+                <a:sym typeface="Wingdings" panose="05000000000000000000" pitchFamily="2" charset="2"/>
+              </a:rPr>
+              <a:t>  </a:t>
+            </a:r>
+            <a:r>
+              <a:rPr lang="en-US" sz="1800" dirty="0"/>
+              <a:t>With the listed features, E40P name can be kept as it complies with rules.</a:t>
+            </a:r>
+            <a:endParaRPr lang="en-US" sz="1600" dirty="0"/>
+          </a:p>
+        </p:txBody>
+      </p:sp>
+      <p:sp>
+        <p:nvSpPr>
+          <p:cNvPr id="6" name="Text Placeholder 5">
+            <a:extLst>
+              <a:ext uri="{FF2B5EF4-FFF2-40B4-BE49-F238E27FC236}">
+                <a16:creationId xmlns:a16="http://schemas.microsoft.com/office/drawing/2014/main" id="{114F8BE7-A1A6-4862-AA34-DC4835A76628}"/>
+              </a:ext>
+            </a:extLst>
+          </p:cNvPr>
+          <p:cNvSpPr txBox="1">
+            <a:spLocks/>
+          </p:cNvSpPr>
+          <p:nvPr/>
+        </p:nvSpPr>
+        <p:spPr>
+          <a:xfrm>
+            <a:off x="437116" y="358481"/>
+            <a:ext cx="8246393" cy="450664"/>
+          </a:xfrm>
+          <a:prstGeom prst="rect">
+            <a:avLst/>
+          </a:prstGeom>
+        </p:spPr>
+        <p:txBody>
+          <a:bodyPr vert="horz"/>
+          <a:lstStyle>
+            <a:lvl1pPr marL="0" indent="0" algn="l" defTabSz="457200" rtl="0" eaLnBrk="1" latinLnBrk="0" hangingPunct="1">
+              <a:spcBef>
+                <a:spcPct val="20000"/>
+              </a:spcBef>
+              <a:buFont typeface="Arial"/>
+              <a:buNone/>
+              <a:defRPr sz="2000" b="1" kern="1200" baseline="0">
+                <a:solidFill>
+                  <a:srgbClr val="06362B"/>
+                </a:solidFill>
+                <a:latin typeface="Arial"/>
+                <a:ea typeface="+mn-ea"/>
+                <a:cs typeface="Arial"/>
+              </a:defRPr>
+            </a:lvl1pPr>
+            <a:lvl2pPr marL="742950" indent="-285750" algn="l" defTabSz="457200" rtl="0" eaLnBrk="1" latinLnBrk="0" hangingPunct="1">
+              <a:spcBef>
+                <a:spcPct val="20000"/>
+              </a:spcBef>
+              <a:buFont typeface="Arial"/>
+              <a:buChar char="–"/>
+              <a:defRPr sz="2800" kern="1200">
+                <a:solidFill>
+                  <a:schemeClr val="tx1"/>
+                </a:solidFill>
+                <a:latin typeface="+mn-lt"/>
+                <a:ea typeface="+mn-ea"/>
+                <a:cs typeface="+mn-cs"/>
+              </a:defRPr>
+            </a:lvl2pPr>
+            <a:lvl3pPr marL="1143000" indent="-228600" algn="l" defTabSz="457200" rtl="0" eaLnBrk="1" latinLnBrk="0" hangingPunct="1">
+              <a:spcBef>
+                <a:spcPct val="20000"/>
+              </a:spcBef>
+              <a:buFont typeface="Arial"/>
+              <a:buChar char="•"/>
+              <a:defRPr sz="2400" kern="1200">
+                <a:solidFill>
+                  <a:schemeClr val="tx1"/>
+                </a:solidFill>
+                <a:latin typeface="+mn-lt"/>
+                <a:ea typeface="+mn-ea"/>
+                <a:cs typeface="+mn-cs"/>
+              </a:defRPr>
+            </a:lvl3pPr>
+            <a:lvl4pPr marL="1600200" indent="-228600" algn="l" defTabSz="457200" rtl="0" eaLnBrk="1" latinLnBrk="0" hangingPunct="1">
+              <a:spcBef>
+                <a:spcPct val="20000"/>
+              </a:spcBef>
+              <a:buFont typeface="Arial"/>
+              <a:buChar char="–"/>
+              <a:defRPr sz="2000" kern="1200">
+                <a:solidFill>
+                  <a:schemeClr val="tx1"/>
+                </a:solidFill>
+                <a:latin typeface="+mn-lt"/>
+                <a:ea typeface="+mn-ea"/>
+                <a:cs typeface="+mn-cs"/>
+              </a:defRPr>
+            </a:lvl4pPr>
+            <a:lvl5pPr marL="2057400" indent="-228600" algn="l" defTabSz="457200" rtl="0" eaLnBrk="1" latinLnBrk="0" hangingPunct="1">
+              <a:spcBef>
+                <a:spcPct val="20000"/>
+              </a:spcBef>
+              <a:buFont typeface="Arial"/>
+              <a:buChar char="»"/>
+              <a:defRPr sz="2000" kern="1200">
+                <a:solidFill>
+                  <a:schemeClr val="tx1"/>
+                </a:solidFill>
+                <a:latin typeface="+mn-lt"/>
+                <a:ea typeface="+mn-ea"/>
+                <a:cs typeface="+mn-cs"/>
+              </a:defRPr>
+            </a:lvl5pPr>
+            <a:lvl6pPr marL="2514600" indent="-228600" algn="l" defTabSz="457200" rtl="0" eaLnBrk="1" latinLnBrk="0" hangingPunct="1">
+              <a:spcBef>
+                <a:spcPct val="20000"/>
+              </a:spcBef>
+              <a:buFont typeface="Arial"/>
+              <a:buChar char="•"/>
+              <a:defRPr sz="2000" kern="1200">
+                <a:solidFill>
+                  <a:schemeClr val="tx1"/>
+                </a:solidFill>
+                <a:latin typeface="+mn-lt"/>
+                <a:ea typeface="+mn-ea"/>
+                <a:cs typeface="+mn-cs"/>
+              </a:defRPr>
+            </a:lvl6pPr>
+            <a:lvl7pPr marL="2971800" indent="-228600" algn="l" defTabSz="457200" rtl="0" eaLnBrk="1" latinLnBrk="0" hangingPunct="1">
+              <a:spcBef>
+                <a:spcPct val="20000"/>
+              </a:spcBef>
+              <a:buFont typeface="Arial"/>
+              <a:buChar char="•"/>
+              <a:defRPr sz="2000" kern="1200">
+                <a:solidFill>
+                  <a:schemeClr val="tx1"/>
+                </a:solidFill>
+                <a:latin typeface="+mn-lt"/>
+                <a:ea typeface="+mn-ea"/>
+                <a:cs typeface="+mn-cs"/>
+              </a:defRPr>
+            </a:lvl7pPr>
+            <a:lvl8pPr marL="3429000" indent="-228600" algn="l" defTabSz="457200" rtl="0" eaLnBrk="1" latinLnBrk="0" hangingPunct="1">
+              <a:spcBef>
+                <a:spcPct val="20000"/>
+              </a:spcBef>
+              <a:buFont typeface="Arial"/>
+              <a:buChar char="•"/>
+              <a:defRPr sz="2000" kern="1200">
+                <a:solidFill>
+                  <a:schemeClr val="tx1"/>
+                </a:solidFill>
+                <a:latin typeface="+mn-lt"/>
+                <a:ea typeface="+mn-ea"/>
+                <a:cs typeface="+mn-cs"/>
+              </a:defRPr>
+            </a:lvl8pPr>
+            <a:lvl9pPr marL="3886200" indent="-228600" algn="l" defTabSz="457200" rtl="0" eaLnBrk="1" latinLnBrk="0" hangingPunct="1">
+              <a:spcBef>
+                <a:spcPct val="20000"/>
+              </a:spcBef>
+              <a:buFont typeface="Arial"/>
+              <a:buChar char="•"/>
+              <a:defRPr sz="2000" kern="1200">
+                <a:solidFill>
+                  <a:schemeClr val="tx1"/>
+                </a:solidFill>
+                <a:latin typeface="+mn-lt"/>
+                <a:ea typeface="+mn-ea"/>
+                <a:cs typeface="+mn-cs"/>
+              </a:defRPr>
+            </a:lvl9pPr>
+          </a:lstStyle>
+          <a:p>
+            <a:r>
+              <a:rPr lang="en-US" sz="2400" dirty="0"/>
+              <a:t>Final CV32E40P v2 features choice</a:t>
+            </a:r>
+          </a:p>
+        </p:txBody>
+      </p:sp>
+    </p:spTree>
+    <p:extLst>
+      <p:ext uri="{BB962C8B-B14F-4D97-AF65-F5344CB8AC3E}">
+        <p14:creationId xmlns:p14="http://schemas.microsoft.com/office/powerpoint/2010/main" val="1350407802"/>
+      </p:ext>
+    </p:extLst>
+  </p:cSld>
+  <p:clrMapOvr>
+    <a:masterClrMapping/>
+  </p:clrMapOvr>
+</p:sld>
+</file>
+
+<file path=ppt/slides/slide14.xml><?xml version="1.0" encoding="utf-8"?>
+<p:sld xmlns:a="http://schemas.openxmlformats.org/drawingml/2006/main" xmlns:r="http://schemas.openxmlformats.org/officeDocument/2006/relationships" xmlns:p="http://schemas.openxmlformats.org/presentationml/2006/main">
+  <p:cSld>
+    <p:spTree>
+      <p:nvGrpSpPr>
+        <p:cNvPr id="1" name=""/>
+        <p:cNvGrpSpPr/>
+        <p:nvPr/>
+      </p:nvGrpSpPr>
+      <p:grpSpPr>
+        <a:xfrm>
+          <a:off x="0" y="0"/>
+          <a:ext cx="0" cy="0"/>
+          <a:chOff x="0" y="0"/>
+          <a:chExt cx="0" cy="0"/>
+        </a:xfrm>
+      </p:grpSpPr>
+      <p:sp>
+        <p:nvSpPr>
+          <p:cNvPr id="2" name="Date Placeholder 1">
+            <a:extLst>
+              <a:ext uri="{FF2B5EF4-FFF2-40B4-BE49-F238E27FC236}">
+                <a16:creationId xmlns:a16="http://schemas.microsoft.com/office/drawing/2014/main" id="{00ABF760-F12A-41BD-9D2B-43814851D3F6}"/>
+              </a:ext>
+            </a:extLst>
+          </p:cNvPr>
+          <p:cNvSpPr>
+            <a:spLocks noGrp="1"/>
+          </p:cNvSpPr>
+          <p:nvPr>
+            <p:ph type="dt" sz="half" idx="10"/>
+          </p:nvPr>
+        </p:nvSpPr>
+        <p:spPr/>
+        <p:txBody>
+          <a:bodyPr/>
+          <a:lstStyle/>
+          <a:p>
+            <a:r>
+              <a:rPr lang="en-US"/>
+              <a:t>July 5, 2021</a:t>
+            </a:r>
+            <a:endParaRPr lang="fr-FR"/>
+          </a:p>
+        </p:txBody>
+      </p:sp>
+      <p:sp>
+        <p:nvSpPr>
+          <p:cNvPr id="3" name="Slide Number Placeholder 2">
+            <a:extLst>
+              <a:ext uri="{FF2B5EF4-FFF2-40B4-BE49-F238E27FC236}">
+                <a16:creationId xmlns:a16="http://schemas.microsoft.com/office/drawing/2014/main" id="{A0099D01-297B-45C2-B70C-A03E38A2808F}"/>
+              </a:ext>
+            </a:extLst>
+          </p:cNvPr>
+          <p:cNvSpPr>
+            <a:spLocks noGrp="1"/>
+          </p:cNvSpPr>
+          <p:nvPr>
+            <p:ph type="sldNum" sz="quarter" idx="12"/>
+          </p:nvPr>
+        </p:nvSpPr>
+        <p:spPr/>
+        <p:txBody>
+          <a:bodyPr/>
+          <a:lstStyle/>
+          <a:p>
+            <a:fld id="{FC828DD5-3DE4-F142-8615-E631BEE87654}" type="slidenum">
+              <a:rPr lang="fr-FR" smtClean="0"/>
+              <a:pPr/>
+              <a:t>14</a:t>
+            </a:fld>
+            <a:endParaRPr lang="fr-FR"/>
+          </a:p>
+        </p:txBody>
+      </p:sp>
+      <p:sp>
+        <p:nvSpPr>
+          <p:cNvPr id="5" name="Text Placeholder 4">
+            <a:extLst>
+              <a:ext uri="{FF2B5EF4-FFF2-40B4-BE49-F238E27FC236}">
+                <a16:creationId xmlns:a16="http://schemas.microsoft.com/office/drawing/2014/main" id="{E833259D-8347-41B9-B62A-A29C8EFBC877}"/>
+              </a:ext>
+            </a:extLst>
+          </p:cNvPr>
+          <p:cNvSpPr>
+            <a:spLocks noGrp="1"/>
+          </p:cNvSpPr>
+          <p:nvPr>
+            <p:ph type="body" sz="quarter" idx="21"/>
+          </p:nvPr>
+        </p:nvSpPr>
+        <p:spPr>
+          <a:xfrm>
+            <a:off x="437117" y="953872"/>
+            <a:ext cx="8252972" cy="3722900"/>
+          </a:xfrm>
+        </p:spPr>
+        <p:txBody>
+          <a:bodyPr/>
+          <a:lstStyle/>
+          <a:p>
+            <a:pPr marL="285750" indent="-285750">
+              <a:buFont typeface="Arial" panose="020B0604020202020204" pitchFamily="34" charset="0"/>
+              <a:buChar char="•"/>
+            </a:pPr>
+            <a:r>
+              <a:rPr lang="en-US" sz="1600" dirty="0"/>
+              <a:t>Started to setup core-v-</a:t>
+            </a:r>
+            <a:r>
+              <a:rPr lang="en-US" sz="1600" dirty="0" err="1"/>
+              <a:t>verif</a:t>
+            </a:r>
+            <a:r>
+              <a:rPr lang="en-US" sz="1600" dirty="0"/>
+              <a:t> environment w/ Mike Thompson support</a:t>
+            </a:r>
+            <a:endParaRPr lang="en-US" sz="1400" dirty="0"/>
+          </a:p>
+          <a:p>
+            <a:endParaRPr lang="en-US" sz="1600" dirty="0"/>
+          </a:p>
+          <a:p>
+            <a:pPr marL="285750" indent="-285750">
+              <a:buFont typeface="Arial" panose="020B0604020202020204" pitchFamily="34" charset="0"/>
+              <a:buChar char="•"/>
+            </a:pPr>
+            <a:r>
+              <a:rPr lang="en-US" sz="1600" dirty="0"/>
+              <a:t>Started contacting </a:t>
+            </a:r>
+            <a:r>
+              <a:rPr lang="en-US" sz="1600" dirty="0" err="1"/>
+              <a:t>Imperas</a:t>
+            </a:r>
+            <a:endParaRPr lang="en-US" sz="1600" dirty="0"/>
+          </a:p>
+          <a:p>
+            <a:pPr marL="1028700" lvl="1">
+              <a:buFont typeface="Arial" panose="020B0604020202020204" pitchFamily="34" charset="0"/>
+              <a:buChar char="•"/>
+            </a:pPr>
+            <a:r>
+              <a:rPr lang="en-US" sz="1600" dirty="0">
+                <a:effectLst/>
+                <a:latin typeface="Calibri" panose="020F0502020204030204" pitchFamily="34" charset="0"/>
+                <a:ea typeface="Calibri" panose="020F0502020204030204" pitchFamily="34" charset="0"/>
+                <a:cs typeface="Arial" panose="020B0604020202020204" pitchFamily="34" charset="0"/>
+              </a:rPr>
+              <a:t>to get CV32E40P v1 Reference Model license to start running UVM environment</a:t>
+            </a:r>
+          </a:p>
+          <a:p>
+            <a:pPr marL="1028700" lvl="1">
+              <a:buFont typeface="Arial" panose="020B0604020202020204" pitchFamily="34" charset="0"/>
+              <a:buChar char="•"/>
+            </a:pPr>
+            <a:r>
+              <a:rPr lang="en-US" sz="1600" dirty="0">
+                <a:effectLst/>
+                <a:latin typeface="Calibri" panose="020F0502020204030204" pitchFamily="34" charset="0"/>
+                <a:ea typeface="Calibri" panose="020F0502020204030204" pitchFamily="34" charset="0"/>
+                <a:cs typeface="Arial" panose="020B0604020202020204" pitchFamily="34" charset="0"/>
+              </a:rPr>
+              <a:t>to add Custom PULP instructions into Reference Model</a:t>
+            </a:r>
+          </a:p>
+          <a:p>
+            <a:pPr marL="1028700" lvl="1">
+              <a:buFont typeface="Arial" panose="020B0604020202020204" pitchFamily="34" charset="0"/>
+              <a:buChar char="•"/>
+            </a:pPr>
+            <a:endParaRPr lang="en-US" sz="1600" dirty="0"/>
+          </a:p>
+          <a:p>
+            <a:pPr marL="285750" indent="-285750">
+              <a:buFont typeface="Arial" panose="020B0604020202020204" pitchFamily="34" charset="0"/>
+              <a:buChar char="•"/>
+            </a:pPr>
+            <a:r>
+              <a:rPr lang="en-US" sz="1600" dirty="0"/>
+              <a:t>Continue to talk with </a:t>
+            </a:r>
+            <a:r>
+              <a:rPr lang="en-US" sz="1600" dirty="0" err="1"/>
+              <a:t>Embecosm</a:t>
+            </a:r>
+            <a:r>
+              <a:rPr lang="en-US" sz="1600" dirty="0"/>
+              <a:t> t</a:t>
+            </a:r>
+            <a:r>
+              <a:rPr lang="en-US" sz="1600" dirty="0">
+                <a:effectLst/>
+                <a:latin typeface="Calibri" panose="020F0502020204030204" pitchFamily="34" charset="0"/>
+                <a:ea typeface="Calibri" panose="020F0502020204030204" pitchFamily="34" charset="0"/>
+                <a:cs typeface="Arial" panose="020B0604020202020204" pitchFamily="34" charset="0"/>
+              </a:rPr>
+              <a:t>o add Custom PULP instructions into GCC SW toolchain</a:t>
+            </a:r>
+          </a:p>
+        </p:txBody>
+      </p:sp>
+      <p:sp>
+        <p:nvSpPr>
+          <p:cNvPr id="6" name="Text Placeholder 5">
+            <a:extLst>
+              <a:ext uri="{FF2B5EF4-FFF2-40B4-BE49-F238E27FC236}">
+                <a16:creationId xmlns:a16="http://schemas.microsoft.com/office/drawing/2014/main" id="{114F8BE7-A1A6-4862-AA34-DC4835A76628}"/>
+              </a:ext>
+            </a:extLst>
+          </p:cNvPr>
+          <p:cNvSpPr txBox="1">
+            <a:spLocks/>
+          </p:cNvSpPr>
+          <p:nvPr/>
+        </p:nvSpPr>
+        <p:spPr>
+          <a:xfrm>
+            <a:off x="437116" y="358481"/>
+            <a:ext cx="8246393" cy="450664"/>
+          </a:xfrm>
+          <a:prstGeom prst="rect">
+            <a:avLst/>
+          </a:prstGeom>
+        </p:spPr>
+        <p:txBody>
+          <a:bodyPr vert="horz"/>
+          <a:lstStyle>
+            <a:lvl1pPr marL="0" indent="0" algn="l" defTabSz="457200" rtl="0" eaLnBrk="1" latinLnBrk="0" hangingPunct="1">
+              <a:spcBef>
+                <a:spcPct val="20000"/>
+              </a:spcBef>
+              <a:buFont typeface="Arial"/>
+              <a:buNone/>
+              <a:defRPr sz="2000" b="1" kern="1200" baseline="0">
+                <a:solidFill>
+                  <a:srgbClr val="06362B"/>
+                </a:solidFill>
+                <a:latin typeface="Arial"/>
+                <a:ea typeface="+mn-ea"/>
+                <a:cs typeface="Arial"/>
+              </a:defRPr>
+            </a:lvl1pPr>
+            <a:lvl2pPr marL="742950" indent="-285750" algn="l" defTabSz="457200" rtl="0" eaLnBrk="1" latinLnBrk="0" hangingPunct="1">
+              <a:spcBef>
+                <a:spcPct val="20000"/>
+              </a:spcBef>
+              <a:buFont typeface="Arial"/>
+              <a:buChar char="–"/>
+              <a:defRPr sz="2800" kern="1200">
+                <a:solidFill>
+                  <a:schemeClr val="tx1"/>
+                </a:solidFill>
+                <a:latin typeface="+mn-lt"/>
+                <a:ea typeface="+mn-ea"/>
+                <a:cs typeface="+mn-cs"/>
+              </a:defRPr>
+            </a:lvl2pPr>
+            <a:lvl3pPr marL="1143000" indent="-228600" algn="l" defTabSz="457200" rtl="0" eaLnBrk="1" latinLnBrk="0" hangingPunct="1">
+              <a:spcBef>
+                <a:spcPct val="20000"/>
+              </a:spcBef>
+              <a:buFont typeface="Arial"/>
+              <a:buChar char="•"/>
+              <a:defRPr sz="2400" kern="1200">
+                <a:solidFill>
+                  <a:schemeClr val="tx1"/>
+                </a:solidFill>
+                <a:latin typeface="+mn-lt"/>
+                <a:ea typeface="+mn-ea"/>
+                <a:cs typeface="+mn-cs"/>
+              </a:defRPr>
+            </a:lvl3pPr>
+            <a:lvl4pPr marL="1600200" indent="-228600" algn="l" defTabSz="457200" rtl="0" eaLnBrk="1" latinLnBrk="0" hangingPunct="1">
+              <a:spcBef>
+                <a:spcPct val="20000"/>
+              </a:spcBef>
+              <a:buFont typeface="Arial"/>
+              <a:buChar char="–"/>
+              <a:defRPr sz="2000" kern="1200">
+                <a:solidFill>
+                  <a:schemeClr val="tx1"/>
+                </a:solidFill>
+                <a:latin typeface="+mn-lt"/>
+                <a:ea typeface="+mn-ea"/>
+                <a:cs typeface="+mn-cs"/>
+              </a:defRPr>
+            </a:lvl4pPr>
+            <a:lvl5pPr marL="2057400" indent="-228600" algn="l" defTabSz="457200" rtl="0" eaLnBrk="1" latinLnBrk="0" hangingPunct="1">
+              <a:spcBef>
+                <a:spcPct val="20000"/>
+              </a:spcBef>
+              <a:buFont typeface="Arial"/>
+              <a:buChar char="»"/>
+              <a:defRPr sz="2000" kern="1200">
+                <a:solidFill>
+                  <a:schemeClr val="tx1"/>
+                </a:solidFill>
+                <a:latin typeface="+mn-lt"/>
+                <a:ea typeface="+mn-ea"/>
+                <a:cs typeface="+mn-cs"/>
+              </a:defRPr>
+            </a:lvl5pPr>
+            <a:lvl6pPr marL="2514600" indent="-228600" algn="l" defTabSz="457200" rtl="0" eaLnBrk="1" latinLnBrk="0" hangingPunct="1">
+              <a:spcBef>
+                <a:spcPct val="20000"/>
+              </a:spcBef>
+              <a:buFont typeface="Arial"/>
+              <a:buChar char="•"/>
+              <a:defRPr sz="2000" kern="1200">
+                <a:solidFill>
+                  <a:schemeClr val="tx1"/>
+                </a:solidFill>
+                <a:latin typeface="+mn-lt"/>
+                <a:ea typeface="+mn-ea"/>
+                <a:cs typeface="+mn-cs"/>
+              </a:defRPr>
+            </a:lvl6pPr>
+            <a:lvl7pPr marL="2971800" indent="-228600" algn="l" defTabSz="457200" rtl="0" eaLnBrk="1" latinLnBrk="0" hangingPunct="1">
+              <a:spcBef>
+                <a:spcPct val="20000"/>
+              </a:spcBef>
+              <a:buFont typeface="Arial"/>
+              <a:buChar char="•"/>
+              <a:defRPr sz="2000" kern="1200">
+                <a:solidFill>
+                  <a:schemeClr val="tx1"/>
+                </a:solidFill>
+                <a:latin typeface="+mn-lt"/>
+                <a:ea typeface="+mn-ea"/>
+                <a:cs typeface="+mn-cs"/>
+              </a:defRPr>
+            </a:lvl7pPr>
+            <a:lvl8pPr marL="3429000" indent="-228600" algn="l" defTabSz="457200" rtl="0" eaLnBrk="1" latinLnBrk="0" hangingPunct="1">
+              <a:spcBef>
+                <a:spcPct val="20000"/>
+              </a:spcBef>
+              <a:buFont typeface="Arial"/>
+              <a:buChar char="•"/>
+              <a:defRPr sz="2000" kern="1200">
+                <a:solidFill>
+                  <a:schemeClr val="tx1"/>
+                </a:solidFill>
+                <a:latin typeface="+mn-lt"/>
+                <a:ea typeface="+mn-ea"/>
+                <a:cs typeface="+mn-cs"/>
+              </a:defRPr>
+            </a:lvl8pPr>
+            <a:lvl9pPr marL="3886200" indent="-228600" algn="l" defTabSz="457200" rtl="0" eaLnBrk="1" latinLnBrk="0" hangingPunct="1">
+              <a:spcBef>
+                <a:spcPct val="20000"/>
+              </a:spcBef>
+              <a:buFont typeface="Arial"/>
+              <a:buChar char="•"/>
+              <a:defRPr sz="2000" kern="1200">
+                <a:solidFill>
+                  <a:schemeClr val="tx1"/>
+                </a:solidFill>
+                <a:latin typeface="+mn-lt"/>
+                <a:ea typeface="+mn-ea"/>
+                <a:cs typeface="+mn-cs"/>
+              </a:defRPr>
+            </a:lvl9pPr>
+          </a:lstStyle>
+          <a:p>
+            <a:r>
+              <a:rPr lang="en-US" sz="2400" dirty="0"/>
+              <a:t>Status</a:t>
+            </a:r>
+          </a:p>
+        </p:txBody>
+      </p:sp>
+    </p:spTree>
+    <p:extLst>
+      <p:ext uri="{BB962C8B-B14F-4D97-AF65-F5344CB8AC3E}">
+        <p14:creationId xmlns:p14="http://schemas.microsoft.com/office/powerpoint/2010/main" val="2572482272"/>
+      </p:ext>
+    </p:extLst>
+  </p:cSld>
+  <p:clrMapOvr>
+    <a:masterClrMapping/>
+  </p:clrMapOvr>
+</p:sld>
+</file>
+
+<file path=ppt/slides/slide15.xml><?xml version="1.0" encoding="utf-8"?>
+<p:sld xmlns:a="http://schemas.openxmlformats.org/drawingml/2006/main" xmlns:r="http://schemas.openxmlformats.org/officeDocument/2006/relationships" xmlns:p="http://schemas.openxmlformats.org/presentationml/2006/main">
+  <p:cSld>
+    <p:spTree>
+      <p:nvGrpSpPr>
+        <p:cNvPr id="1" name=""/>
+        <p:cNvGrpSpPr/>
+        <p:nvPr/>
+      </p:nvGrpSpPr>
+      <p:grpSpPr>
+        <a:xfrm>
+          <a:off x="0" y="0"/>
+          <a:ext cx="0" cy="0"/>
+          <a:chOff x="0" y="0"/>
+          <a:chExt cx="0" cy="0"/>
+        </a:xfrm>
+      </p:grpSpPr>
     </p:spTree>
     <p:extLst>
       <p:ext uri="{BB962C8B-B14F-4D97-AF65-F5344CB8AC3E}">
@@ -13601,7 +15244,7 @@
             </a:pPr>
             <a:r>
               <a:rPr lang="en-US" sz="1600" dirty="0"/>
-              <a:t>For Multicore cluster area reduction,</a:t>
+              <a:t>For Multicore cluster area reduction</a:t>
             </a:r>
           </a:p>
           <a:p>
@@ -16900,21 +18543,6 @@
 </file>
 
 <file path=customXml/item1.xml><?xml version="1.0" encoding="utf-8"?>
-<?mso-contentType ?>
-<FormTemplates xmlns="http://schemas.microsoft.com/sharepoint/v3/contenttype/forms">
-  <Display>DocumentLibraryForm</Display>
-  <Edit>DocumentLibraryForm</Edit>
-  <New>DocumentLibraryForm</New>
-</FormTemplates>
-</file>
-
-<file path=customXml/item2.xml><?xml version="1.0" encoding="utf-8"?>
-<p:properties xmlns:p="http://schemas.microsoft.com/office/2006/metadata/properties" xmlns:xsi="http://www.w3.org/2001/XMLSchema-instance" xmlns:pc="http://schemas.microsoft.com/office/infopath/2007/PartnerControls">
-  <documentManagement/>
-</p:properties>
-</file>
-
-<file path=customXml/item3.xml><?xml version="1.0" encoding="utf-8"?>
 <ct:contentTypeSchema xmlns:ct="http://schemas.microsoft.com/office/2006/metadata/contentType" xmlns:ma="http://schemas.microsoft.com/office/2006/metadata/properties/metaAttributes" ct:_="" ma:_="" ma:contentTypeName="Document" ma:contentTypeID="0x010100EFCF9BE3DDC69D46817A851BEC5550B1" ma:contentTypeVersion="4" ma:contentTypeDescription="Crée un document." ma:contentTypeScope="" ma:versionID="881c34f7cd5cf8fbf683d402ca8875d2">
   <xsd:schema xmlns:xsd="http://www.w3.org/2001/XMLSchema" xmlns:xs="http://www.w3.org/2001/XMLSchema" xmlns:p="http://schemas.microsoft.com/office/2006/metadata/properties" xmlns:ns2="cbd820e2-9c8a-4c01-9a9c-6b4c26777899" targetNamespace="http://schemas.microsoft.com/office/2006/metadata/properties" ma:root="true" ma:fieldsID="379e6705f51ca8044999aec7fce4d4f1" ns2:_="">
     <xsd:import namespace="cbd820e2-9c8a-4c01-9a9c-6b4c26777899"/>
@@ -17060,32 +18688,22 @@
 </ct:contentTypeSchema>
 </file>
 
-<file path=customXml/itemProps1.xml><?xml version="1.0" encoding="utf-8"?>
-<ds:datastoreItem xmlns:ds="http://schemas.openxmlformats.org/officeDocument/2006/customXml" ds:itemID="{DEAE14D7-05E3-479B-BCD1-AF329D982B93}">
-  <ds:schemaRefs>
-    <ds:schemaRef ds:uri="http://schemas.microsoft.com/sharepoint/v3/contenttype/forms"/>
-  </ds:schemaRefs>
-</ds:datastoreItem>
+<file path=customXml/item2.xml><?xml version="1.0" encoding="utf-8"?>
+<?mso-contentType ?>
+<FormTemplates xmlns="http://schemas.microsoft.com/sharepoint/v3/contenttype/forms">
+  <Display>DocumentLibraryForm</Display>
+  <Edit>DocumentLibraryForm</Edit>
+  <New>DocumentLibraryForm</New>
+</FormTemplates>
 </file>
 
-<file path=customXml/itemProps2.xml><?xml version="1.0" encoding="utf-8"?>
-<ds:datastoreItem xmlns:ds="http://schemas.openxmlformats.org/officeDocument/2006/customXml" ds:itemID="{DA29D2D9-84CE-4251-95C0-C75B8E422BE4}">
-  <ds:schemaRefs>
-    <ds:schemaRef ds:uri="http://schemas.microsoft.com/office/infopath/2007/PartnerControls"/>
-    <ds:schemaRef ds:uri="46e63d5d-6b23-41d0-aa16-3c51c7d97b4d"/>
-    <ds:schemaRef ds:uri="http://schemas.microsoft.com/office/2006/metadata/properties"/>
-    <ds:schemaRef ds:uri="http://www.w3.org/XML/1998/namespace"/>
-    <ds:schemaRef ds:uri="http://purl.org/dc/terms/"/>
-    <ds:schemaRef ds:uri="http://purl.org/dc/elements/1.1/"/>
-    <ds:schemaRef ds:uri="http://schemas.microsoft.com/office/2006/documentManagement/types"/>
-    <ds:schemaRef ds:uri="http://schemas.openxmlformats.org/package/2006/metadata/core-properties"/>
-    <ds:schemaRef ds:uri="0d1674fc-8abe-424a-8f7a-8b612c3adaf9"/>
-    <ds:schemaRef ds:uri="http://purl.org/dc/dcmitype/"/>
-  </ds:schemaRefs>
-</ds:datastoreItem>
+<file path=customXml/item3.xml><?xml version="1.0" encoding="utf-8"?>
+<p:properties xmlns:p="http://schemas.microsoft.com/office/2006/metadata/properties" xmlns:xsi="http://www.w3.org/2001/XMLSchema-instance" xmlns:pc="http://schemas.microsoft.com/office/infopath/2007/PartnerControls">
+  <documentManagement/>
+</p:properties>
 </file>
 
-<file path=customXml/itemProps3.xml><?xml version="1.0" encoding="utf-8"?>
+<file path=customXml/itemProps1.xml><?xml version="1.0" encoding="utf-8"?>
 <ds:datastoreItem xmlns:ds="http://schemas.openxmlformats.org/officeDocument/2006/customXml" ds:itemID="{C00FD520-DD61-4DE7-AD64-0906EDEE6446}">
   <ds:schemaRefs>
     <ds:schemaRef ds:uri="http://schemas.microsoft.com/office/2006/metadata/contentType"/>
@@ -17101,4 +18719,29 @@
     <ds:schemaRef ds:uri="http://schemas.microsoft.com/internal/obd"/>
   </ds:schemaRefs>
 </ds:datastoreItem>
+</file>
+
+<file path=customXml/itemProps2.xml><?xml version="1.0" encoding="utf-8"?>
+<ds:datastoreItem xmlns:ds="http://schemas.openxmlformats.org/officeDocument/2006/customXml" ds:itemID="{DEAE14D7-05E3-479B-BCD1-AF329D982B93}">
+  <ds:schemaRefs>
+    <ds:schemaRef ds:uri="http://schemas.microsoft.com/sharepoint/v3/contenttype/forms"/>
+  </ds:schemaRefs>
+</ds:datastoreItem>
+</file>
+
+<file path=customXml/itemProps3.xml><?xml version="1.0" encoding="utf-8"?>
+<ds:datastoreItem xmlns:ds="http://schemas.openxmlformats.org/officeDocument/2006/customXml" ds:itemID="{DA29D2D9-84CE-4251-95C0-C75B8E422BE4}">
+  <ds:schemaRefs>
+    <ds:schemaRef ds:uri="http://schemas.microsoft.com/office/infopath/2007/PartnerControls"/>
+    <ds:schemaRef ds:uri="46e63d5d-6b23-41d0-aa16-3c51c7d97b4d"/>
+    <ds:schemaRef ds:uri="http://schemas.microsoft.com/office/2006/metadata/properties"/>
+    <ds:schemaRef ds:uri="http://www.w3.org/XML/1998/namespace"/>
+    <ds:schemaRef ds:uri="http://purl.org/dc/terms/"/>
+    <ds:schemaRef ds:uri="http://purl.org/dc/elements/1.1/"/>
+    <ds:schemaRef ds:uri="http://schemas.microsoft.com/office/2006/documentManagement/types"/>
+    <ds:schemaRef ds:uri="http://schemas.openxmlformats.org/package/2006/metadata/core-properties"/>
+    <ds:schemaRef ds:uri="0d1674fc-8abe-424a-8f7a-8b612c3adaf9"/>
+    <ds:schemaRef ds:uri="http://purl.org/dc/dcmitype/"/>
+  </ds:schemaRefs>
+</ds:datastoreItem>
 </file>
</xml_diff>